<commit_message>
worked on presentation and verification plan
</commit_message>
<xml_diff>
--- a/Documents/FInal Presentation/Final_Presentation.pptx
+++ b/Documents/FInal Presentation/Final_Presentation.pptx
@@ -5,7 +5,7 @@
     <p:sldMasterId id="2147483648" r:id="rId4"/>
   </p:sldMasterIdLst>
   <p:notesMasterIdLst>
-    <p:notesMasterId r:id="rId24"/>
+    <p:notesMasterId r:id="rId27"/>
   </p:notesMasterIdLst>
   <p:sldIdLst>
     <p:sldId id="256" r:id="rId5"/>
@@ -15,18 +15,21 @@
     <p:sldId id="260" r:id="rId9"/>
     <p:sldId id="261" r:id="rId10"/>
     <p:sldId id="273" r:id="rId11"/>
-    <p:sldId id="268" r:id="rId12"/>
-    <p:sldId id="269" r:id="rId13"/>
-    <p:sldId id="270" r:id="rId14"/>
-    <p:sldId id="274" r:id="rId15"/>
-    <p:sldId id="262" r:id="rId16"/>
-    <p:sldId id="271" r:id="rId17"/>
-    <p:sldId id="263" r:id="rId18"/>
-    <p:sldId id="272" r:id="rId19"/>
-    <p:sldId id="264" r:id="rId20"/>
-    <p:sldId id="265" r:id="rId21"/>
-    <p:sldId id="266" r:id="rId22"/>
-    <p:sldId id="275" r:id="rId23"/>
+    <p:sldId id="277" r:id="rId12"/>
+    <p:sldId id="268" r:id="rId13"/>
+    <p:sldId id="276" r:id="rId14"/>
+    <p:sldId id="269" r:id="rId15"/>
+    <p:sldId id="270" r:id="rId16"/>
+    <p:sldId id="274" r:id="rId17"/>
+    <p:sldId id="262" r:id="rId18"/>
+    <p:sldId id="271" r:id="rId19"/>
+    <p:sldId id="263" r:id="rId20"/>
+    <p:sldId id="272" r:id="rId21"/>
+    <p:sldId id="264" r:id="rId22"/>
+    <p:sldId id="265" r:id="rId23"/>
+    <p:sldId id="266" r:id="rId24"/>
+    <p:sldId id="279" r:id="rId25"/>
+    <p:sldId id="275" r:id="rId26"/>
   </p:sldIdLst>
   <p:sldSz cx="12192000" cy="6858000"/>
   <p:notesSz cx="6858000" cy="9144000"/>
@@ -133,14 +136,6 @@
 </p:presentation>
 </file>
 
-<file path=ppt/revisionInfo.xml><?xml version="1.0" encoding="utf-8"?>
-<p1510:revInfo xmlns:a="http://schemas.openxmlformats.org/drawingml/2006/main" xmlns:r="http://schemas.openxmlformats.org/officeDocument/2006/relationships" xmlns:p1510="http://schemas.microsoft.com/office/powerpoint/2015/10/main">
-  <p1510:revLst>
-    <p1510:client id="{36DA765A-6406-4451-AB9D-F4E704F36BB7}" v="24" dt="2024-09-27T16:26:04.071"/>
-  </p1510:revLst>
-</p1510:revInfo>
-</file>
-
 <file path=ppt/notesMasters/notesMaster1.xml><?xml version="1.0" encoding="utf-8"?>
 <p:notesMaster xmlns:a="http://schemas.openxmlformats.org/drawingml/2006/main" xmlns:r="http://schemas.openxmlformats.org/officeDocument/2006/relationships" xmlns:p="http://schemas.openxmlformats.org/presentationml/2006/main">
   <p:cSld>
@@ -223,7 +218,7 @@
           <a:p>
             <a:fld id="{C3DCE7EF-75D0-4DB7-BD1A-FC94188B4058}" type="datetimeFigureOut">
               <a:rPr lang="en-US" smtClean="0"/>
-              <a:t>11/19/2024</a:t>
+              <a:t>24-Nov-24</a:t>
             </a:fld>
             <a:endParaRPr lang="en-US"/>
           </a:p>
@@ -721,7 +716,7 @@
           <a:p>
             <a:fld id="{A749A21A-B890-4700-B57E-1CFFBFCC9631}" type="datetimeFigureOut">
               <a:rPr lang="en-US" smtClean="0"/>
-              <a:t>11/19/2024</a:t>
+              <a:t>24-Nov-24</a:t>
             </a:fld>
             <a:endParaRPr lang="en-US"/>
           </a:p>
@@ -919,7 +914,7 @@
           <a:p>
             <a:fld id="{A749A21A-B890-4700-B57E-1CFFBFCC9631}" type="datetimeFigureOut">
               <a:rPr lang="en-US" smtClean="0"/>
-              <a:t>11/19/2024</a:t>
+              <a:t>24-Nov-24</a:t>
             </a:fld>
             <a:endParaRPr lang="en-US"/>
           </a:p>
@@ -1127,7 +1122,7 @@
           <a:p>
             <a:fld id="{A749A21A-B890-4700-B57E-1CFFBFCC9631}" type="datetimeFigureOut">
               <a:rPr lang="en-US" smtClean="0"/>
-              <a:t>11/19/2024</a:t>
+              <a:t>24-Nov-24</a:t>
             </a:fld>
             <a:endParaRPr lang="en-US"/>
           </a:p>
@@ -1325,7 +1320,7 @@
           <a:p>
             <a:fld id="{A749A21A-B890-4700-B57E-1CFFBFCC9631}" type="datetimeFigureOut">
               <a:rPr lang="en-US" smtClean="0"/>
-              <a:t>11/19/2024</a:t>
+              <a:t>24-Nov-24</a:t>
             </a:fld>
             <a:endParaRPr lang="en-US"/>
           </a:p>
@@ -1600,7 +1595,7 @@
           <a:p>
             <a:fld id="{A749A21A-B890-4700-B57E-1CFFBFCC9631}" type="datetimeFigureOut">
               <a:rPr lang="en-US" smtClean="0"/>
-              <a:t>11/19/2024</a:t>
+              <a:t>24-Nov-24</a:t>
             </a:fld>
             <a:endParaRPr lang="en-US"/>
           </a:p>
@@ -1865,7 +1860,7 @@
           <a:p>
             <a:fld id="{A749A21A-B890-4700-B57E-1CFFBFCC9631}" type="datetimeFigureOut">
               <a:rPr lang="en-US" smtClean="0"/>
-              <a:t>11/19/2024</a:t>
+              <a:t>24-Nov-24</a:t>
             </a:fld>
             <a:endParaRPr lang="en-US"/>
           </a:p>
@@ -2277,7 +2272,7 @@
           <a:p>
             <a:fld id="{A749A21A-B890-4700-B57E-1CFFBFCC9631}" type="datetimeFigureOut">
               <a:rPr lang="en-US" smtClean="0"/>
-              <a:t>11/19/2024</a:t>
+              <a:t>24-Nov-24</a:t>
             </a:fld>
             <a:endParaRPr lang="en-US"/>
           </a:p>
@@ -2418,7 +2413,7 @@
           <a:p>
             <a:fld id="{A749A21A-B890-4700-B57E-1CFFBFCC9631}" type="datetimeFigureOut">
               <a:rPr lang="en-US" smtClean="0"/>
-              <a:t>11/19/2024</a:t>
+              <a:t>24-Nov-24</a:t>
             </a:fld>
             <a:endParaRPr lang="en-US"/>
           </a:p>
@@ -2531,7 +2526,7 @@
           <a:p>
             <a:fld id="{A749A21A-B890-4700-B57E-1CFFBFCC9631}" type="datetimeFigureOut">
               <a:rPr lang="en-US" smtClean="0"/>
-              <a:t>11/19/2024</a:t>
+              <a:t>24-Nov-24</a:t>
             </a:fld>
             <a:endParaRPr lang="en-US"/>
           </a:p>
@@ -2842,7 +2837,7 @@
           <a:p>
             <a:fld id="{A749A21A-B890-4700-B57E-1CFFBFCC9631}" type="datetimeFigureOut">
               <a:rPr lang="en-US" smtClean="0"/>
-              <a:t>11/19/2024</a:t>
+              <a:t>24-Nov-24</a:t>
             </a:fld>
             <a:endParaRPr lang="en-US"/>
           </a:p>
@@ -3130,7 +3125,7 @@
           <a:p>
             <a:fld id="{A749A21A-B890-4700-B57E-1CFFBFCC9631}" type="datetimeFigureOut">
               <a:rPr lang="en-US" smtClean="0"/>
-              <a:t>11/19/2024</a:t>
+              <a:t>24-Nov-24</a:t>
             </a:fld>
             <a:endParaRPr lang="en-US"/>
           </a:p>
@@ -3371,7 +3366,7 @@
           <a:p>
             <a:fld id="{A749A21A-B890-4700-B57E-1CFFBFCC9631}" type="datetimeFigureOut">
               <a:rPr lang="en-US" smtClean="0"/>
-              <a:t>11/19/2024</a:t>
+              <a:t>24-Nov-24</a:t>
             </a:fld>
             <a:endParaRPr lang="en-US"/>
           </a:p>
@@ -4424,6 +4419,308 @@
 <file path=ppt/slides/slide10.xml><?xml version="1.0" encoding="utf-8"?>
 <p:sld xmlns:a="http://schemas.openxmlformats.org/drawingml/2006/main" xmlns:r="http://schemas.openxmlformats.org/officeDocument/2006/relationships" xmlns:p="http://schemas.openxmlformats.org/presentationml/2006/main">
   <p:cSld>
+    <p:spTree>
+      <p:nvGrpSpPr>
+        <p:cNvPr id="1" name=""/>
+        <p:cNvGrpSpPr/>
+        <p:nvPr/>
+      </p:nvGrpSpPr>
+      <p:grpSpPr>
+        <a:xfrm>
+          <a:off x="0" y="0"/>
+          <a:ext cx="0" cy="0"/>
+          <a:chOff x="0" y="0"/>
+          <a:chExt cx="0" cy="0"/>
+        </a:xfrm>
+      </p:grpSpPr>
+      <p:sp>
+        <p:nvSpPr>
+          <p:cNvPr id="2" name="Title 1">
+            <a:extLst>
+              <a:ext uri="{FF2B5EF4-FFF2-40B4-BE49-F238E27FC236}">
+                <a16:creationId xmlns:a16="http://schemas.microsoft.com/office/drawing/2014/main" id="{C165C2DD-EDA6-8488-10F1-2395F52AFE71}"/>
+              </a:ext>
+            </a:extLst>
+          </p:cNvPr>
+          <p:cNvSpPr>
+            <a:spLocks noGrp="1"/>
+          </p:cNvSpPr>
+          <p:nvPr>
+            <p:ph type="title"/>
+          </p:nvPr>
+        </p:nvSpPr>
+        <p:spPr/>
+        <p:txBody>
+          <a:bodyPr/>
+          <a:lstStyle/>
+          <a:p>
+            <a:endParaRPr lang="en-US"/>
+          </a:p>
+        </p:txBody>
+      </p:sp>
+      <p:sp>
+        <p:nvSpPr>
+          <p:cNvPr id="3" name="Content Placeholder 2">
+            <a:extLst>
+              <a:ext uri="{FF2B5EF4-FFF2-40B4-BE49-F238E27FC236}">
+                <a16:creationId xmlns:a16="http://schemas.microsoft.com/office/drawing/2014/main" id="{3E9FD559-B073-D481-7628-51261A022A10}"/>
+              </a:ext>
+            </a:extLst>
+          </p:cNvPr>
+          <p:cNvSpPr>
+            <a:spLocks noGrp="1"/>
+          </p:cNvSpPr>
+          <p:nvPr>
+            <p:ph idx="1"/>
+          </p:nvPr>
+        </p:nvSpPr>
+        <p:spPr/>
+        <p:txBody>
+          <a:bodyPr/>
+          <a:lstStyle/>
+          <a:p>
+            <a:endParaRPr lang="en-US"/>
+          </a:p>
+        </p:txBody>
+      </p:sp>
+      <p:pic>
+        <p:nvPicPr>
+          <p:cNvPr id="4" name="Picture 3" descr="A computer screen shot of a diagram&#10;&#10;Description automatically generated">
+            <a:extLst>
+              <a:ext uri="{FF2B5EF4-FFF2-40B4-BE49-F238E27FC236}">
+                <a16:creationId xmlns:a16="http://schemas.microsoft.com/office/drawing/2014/main" id="{4711F19B-43F3-3C14-D1A9-EC610D06B88B}"/>
+              </a:ext>
+            </a:extLst>
+          </p:cNvPr>
+          <p:cNvPicPr>
+            <a:picLocks noChangeAspect="1"/>
+          </p:cNvPicPr>
+          <p:nvPr/>
+        </p:nvPicPr>
+        <p:blipFill>
+          <a:blip r:embed="rId2"/>
+          <a:stretch>
+            <a:fillRect/>
+          </a:stretch>
+        </p:blipFill>
+        <p:spPr>
+          <a:xfrm>
+            <a:off x="0" y="-1"/>
+            <a:ext cx="12192000" cy="6860521"/>
+          </a:xfrm>
+          <a:prstGeom prst="rect">
+            <a:avLst/>
+          </a:prstGeom>
+        </p:spPr>
+      </p:pic>
+    </p:spTree>
+    <p:extLst>
+      <p:ext uri="{BB962C8B-B14F-4D97-AF65-F5344CB8AC3E}">
+        <p14:creationId xmlns:p14="http://schemas.microsoft.com/office/powerpoint/2010/main" val="2762645782"/>
+      </p:ext>
+    </p:extLst>
+  </p:cSld>
+  <p:clrMapOvr>
+    <a:masterClrMapping/>
+  </p:clrMapOvr>
+</p:sld>
+</file>
+
+<file path=ppt/slides/slide11.xml><?xml version="1.0" encoding="utf-8"?>
+<p:sld xmlns:a="http://schemas.openxmlformats.org/drawingml/2006/main" xmlns:r="http://schemas.openxmlformats.org/officeDocument/2006/relationships" xmlns:p="http://schemas.openxmlformats.org/presentationml/2006/main">
+  <p:cSld>
+    <p:bg>
+      <p:bgPr>
+        <a:solidFill>
+          <a:schemeClr val="bg1"/>
+        </a:solidFill>
+        <a:effectLst/>
+      </p:bgPr>
+    </p:bg>
+    <p:spTree>
+      <p:nvGrpSpPr>
+        <p:cNvPr id="1" name="">
+          <a:extLst>
+            <a:ext uri="{FF2B5EF4-FFF2-40B4-BE49-F238E27FC236}">
+              <a16:creationId xmlns:a16="http://schemas.microsoft.com/office/drawing/2014/main" id="{91272F61-320A-7B2D-0418-6BE491B5CEA2}"/>
+            </a:ext>
+          </a:extLst>
+        </p:cNvPr>
+        <p:cNvGrpSpPr/>
+        <p:nvPr/>
+      </p:nvGrpSpPr>
+      <p:grpSpPr>
+        <a:xfrm>
+          <a:off x="0" y="0"/>
+          <a:ext cx="0" cy="0"/>
+          <a:chOff x="0" y="0"/>
+          <a:chExt cx="0" cy="0"/>
+        </a:xfrm>
+      </p:grpSpPr>
+      <p:sp>
+        <p:nvSpPr>
+          <p:cNvPr id="15" name="Down Arrow 7">
+            <a:extLst>
+              <a:ext uri="{FF2B5EF4-FFF2-40B4-BE49-F238E27FC236}">
+                <a16:creationId xmlns:a16="http://schemas.microsoft.com/office/drawing/2014/main" id="{D4771268-CB57-404A-9271-370EB28F6090}"/>
+              </a:ext>
+              <a:ext uri="{C183D7F6-B498-43B3-948B-1728B52AA6E4}">
+                <adec:decorative xmlns:adec="http://schemas.microsoft.com/office/drawing/2017/decorative" val="1"/>
+              </a:ext>
+            </a:extLst>
+          </p:cNvPr>
+          <p:cNvSpPr>
+            <a:spLocks noGrp="1" noRot="1" noChangeAspect="1" noMove="1" noResize="1" noEditPoints="1" noAdjustHandles="1" noChangeArrowheads="1" noChangeShapeType="1" noTextEdit="1"/>
+          </p:cNvSpPr>
+          <p:nvPr>
+            <p:extLst>
+              <p:ext uri="{386F3935-93C4-4BCD-93E2-E3B085C9AB24}">
+                <p16:designElem xmlns:p16="http://schemas.microsoft.com/office/powerpoint/2015/main" val="1"/>
+              </p:ext>
+            </p:extLst>
+          </p:nvPr>
+        </p:nvSpPr>
+        <p:spPr>
+          <a:xfrm rot="16200000">
+            <a:off x="800100" y="1491343"/>
+            <a:ext cx="3333749" cy="3499103"/>
+          </a:xfrm>
+          <a:prstGeom prst="downArrow">
+            <a:avLst>
+              <a:gd name="adj1" fmla="val 100000"/>
+              <a:gd name="adj2" fmla="val 15788"/>
+            </a:avLst>
+          </a:prstGeom>
+          <a:solidFill>
+            <a:srgbClr val="404040"/>
+          </a:solidFill>
+          <a:ln w="53975">
+            <a:noFill/>
+          </a:ln>
+        </p:spPr>
+        <p:style>
+          <a:lnRef idx="2">
+            <a:schemeClr val="accent1">
+              <a:shade val="50000"/>
+            </a:schemeClr>
+          </a:lnRef>
+          <a:fillRef idx="1">
+            <a:schemeClr val="accent1"/>
+          </a:fillRef>
+          <a:effectRef idx="0">
+            <a:schemeClr val="accent1"/>
+          </a:effectRef>
+          <a:fontRef idx="minor">
+            <a:schemeClr val="lt1"/>
+          </a:fontRef>
+        </p:style>
+        <p:txBody>
+          <a:bodyPr rtlCol="0" anchor="ctr"/>
+          <a:lstStyle/>
+          <a:p>
+            <a:pPr algn="ctr"/>
+            <a:endParaRPr lang="en-US"/>
+          </a:p>
+        </p:txBody>
+      </p:sp>
+      <p:sp>
+        <p:nvSpPr>
+          <p:cNvPr id="2" name="Title 1">
+            <a:extLst>
+              <a:ext uri="{FF2B5EF4-FFF2-40B4-BE49-F238E27FC236}">
+                <a16:creationId xmlns:a16="http://schemas.microsoft.com/office/drawing/2014/main" id="{B503C663-34EE-AD0C-3644-4A946BB57285}"/>
+              </a:ext>
+            </a:extLst>
+          </p:cNvPr>
+          <p:cNvSpPr>
+            <a:spLocks noGrp="1"/>
+          </p:cNvSpPr>
+          <p:nvPr>
+            <p:ph type="title"/>
+          </p:nvPr>
+        </p:nvSpPr>
+        <p:spPr>
+          <a:xfrm>
+            <a:off x="1028700" y="1967266"/>
+            <a:ext cx="2628900" cy="2547257"/>
+          </a:xfrm>
+          <a:noFill/>
+        </p:spPr>
+        <p:txBody>
+          <a:bodyPr vert="horz" lIns="91440" tIns="45720" rIns="91440" bIns="45720" rtlCol="0" anchor="ctr">
+            <a:normAutofit/>
+          </a:bodyPr>
+          <a:lstStyle/>
+          <a:p>
+            <a:pPr algn="ctr"/>
+            <a:r>
+              <a:rPr lang="en-US" sz="3600" kern="1200" dirty="0">
+                <a:solidFill>
+                  <a:srgbClr val="FFFFFF"/>
+                </a:solidFill>
+                <a:latin typeface="+mj-lt"/>
+                <a:ea typeface="+mj-ea"/>
+                <a:cs typeface="+mj-cs"/>
+              </a:rPr>
+              <a:t>Approach – Code Block Diagram </a:t>
+            </a:r>
+          </a:p>
+        </p:txBody>
+      </p:sp>
+      <p:pic>
+        <p:nvPicPr>
+          <p:cNvPr id="5" name="Content Placeholder 4">
+            <a:extLst>
+              <a:ext uri="{FF2B5EF4-FFF2-40B4-BE49-F238E27FC236}">
+                <a16:creationId xmlns:a16="http://schemas.microsoft.com/office/drawing/2014/main" id="{9BE5538A-12FB-7DE9-2D7F-81657C72626A}"/>
+              </a:ext>
+            </a:extLst>
+          </p:cNvPr>
+          <p:cNvPicPr>
+            <a:picLocks noGrp="1" noChangeAspect="1"/>
+          </p:cNvPicPr>
+          <p:nvPr>
+            <p:ph idx="1"/>
+          </p:nvPr>
+        </p:nvPicPr>
+        <p:blipFill>
+          <a:blip r:embed="rId2">
+            <a:extLst>
+              <a:ext uri="{28A0092B-C50C-407E-A947-70E740481C1C}">
+                <a14:useLocalDpi xmlns:a14="http://schemas.microsoft.com/office/drawing/2010/main" val="0"/>
+              </a:ext>
+            </a:extLst>
+          </a:blip>
+          <a:stretch>
+            <a:fillRect/>
+          </a:stretch>
+        </p:blipFill>
+        <p:spPr>
+          <a:xfrm>
+            <a:off x="4815192" y="372965"/>
+            <a:ext cx="6925856" cy="6112069"/>
+          </a:xfrm>
+          <a:prstGeom prst="rect">
+            <a:avLst/>
+          </a:prstGeom>
+        </p:spPr>
+      </p:pic>
+    </p:spTree>
+    <p:extLst>
+      <p:ext uri="{BB962C8B-B14F-4D97-AF65-F5344CB8AC3E}">
+        <p14:creationId xmlns:p14="http://schemas.microsoft.com/office/powerpoint/2010/main" val="236307831"/>
+      </p:ext>
+    </p:extLst>
+  </p:cSld>
+  <p:clrMapOvr>
+    <a:masterClrMapping/>
+  </p:clrMapOvr>
+</p:sld>
+</file>
+
+<file path=ppt/slides/slide12.xml><?xml version="1.0" encoding="utf-8"?>
+<p:sld xmlns:a="http://schemas.openxmlformats.org/drawingml/2006/main" xmlns:r="http://schemas.openxmlformats.org/officeDocument/2006/relationships" xmlns:p="http://schemas.openxmlformats.org/presentationml/2006/main">
+  <p:cSld>
     <p:bg>
       <p:bgPr>
         <a:solidFill>
@@ -5245,7 +5542,7 @@
 </p:sld>
 </file>
 
-<file path=ppt/slides/slide11.xml><?xml version="1.0" encoding="utf-8"?>
+<file path=ppt/slides/slide13.xml><?xml version="1.0" encoding="utf-8"?>
 <p:sld xmlns:a="http://schemas.openxmlformats.org/drawingml/2006/main" xmlns:r="http://schemas.openxmlformats.org/officeDocument/2006/relationships" xmlns:p="http://schemas.openxmlformats.org/presentationml/2006/main">
   <p:cSld>
     <p:bg>
@@ -6056,6 +6353,12 @@
             </a:r>
           </a:p>
           <a:p>
+            <a:r>
+              <a:rPr lang="en-US" sz="2200" dirty="0"/>
+              <a:t>C++ - “The current ISO C++ standard is officially known as ISO International Standard ISO/IEC 14882:2020(E) – Programming Language C++ (International Organization for Standardization).”</a:t>
+            </a:r>
+          </a:p>
+          <a:p>
             <a:endParaRPr lang="en-US" sz="2200" dirty="0"/>
           </a:p>
         </p:txBody>
@@ -6073,7 +6376,7 @@
 </p:sld>
 </file>
 
-<file path=ppt/slides/slide12.xml><?xml version="1.0" encoding="utf-8"?>
+<file path=ppt/slides/slide14.xml><?xml version="1.0" encoding="utf-8"?>
 <p:sld xmlns:a="http://schemas.openxmlformats.org/drawingml/2006/main" xmlns:r="http://schemas.openxmlformats.org/officeDocument/2006/relationships" xmlns:p="http://schemas.openxmlformats.org/presentationml/2006/main">
   <p:cSld>
     <p:bg>
@@ -6876,7 +7179,7 @@
 </p:sld>
 </file>
 
-<file path=ppt/slides/slide13.xml><?xml version="1.0" encoding="utf-8"?>
+<file path=ppt/slides/slide15.xml><?xml version="1.0" encoding="utf-8"?>
 <p:sld xmlns:a="http://schemas.openxmlformats.org/drawingml/2006/main" xmlns:r="http://schemas.openxmlformats.org/officeDocument/2006/relationships" xmlns:p="http://schemas.openxmlformats.org/presentationml/2006/main">
   <p:cSld>
     <p:bg>
@@ -7359,7 +7662,7 @@
 </p:sld>
 </file>
 
-<file path=ppt/slides/slide14.xml><?xml version="1.0" encoding="utf-8"?>
+<file path=ppt/slides/slide16.xml><?xml version="1.0" encoding="utf-8"?>
 <p:sld xmlns:a="http://schemas.openxmlformats.org/drawingml/2006/main" xmlns:r="http://schemas.openxmlformats.org/officeDocument/2006/relationships" xmlns:p="http://schemas.openxmlformats.org/presentationml/2006/main">
   <p:cSld>
     <p:bg>
@@ -7473,7 +7776,7 @@
           <a:lstStyle/>
           <a:p>
             <a:r>
-              <a:rPr lang="en-US" sz="5400"/>
+              <a:rPr lang="en-US" sz="5400" dirty="0"/>
               <a:t>Verification Plan</a:t>
             </a:r>
           </a:p>
@@ -8147,7 +8450,7 @@
           <a:p>
             <a:r>
               <a:rPr lang="en-US" sz="2200" dirty="0"/>
-              <a:t>Test that shit</a:t>
+              <a:t>Need to add numbers to verification chart.</a:t>
             </a:r>
           </a:p>
         </p:txBody>
@@ -8165,7 +8468,7 @@
 </p:sld>
 </file>
 
-<file path=ppt/slides/slide15.xml><?xml version="1.0" encoding="utf-8"?>
+<file path=ppt/slides/slide17.xml><?xml version="1.0" encoding="utf-8"?>
 <p:sld xmlns:a="http://schemas.openxmlformats.org/drawingml/2006/main" xmlns:r="http://schemas.openxmlformats.org/officeDocument/2006/relationships" xmlns:p="http://schemas.openxmlformats.org/presentationml/2006/main">
   <p:cSld>
     <p:bg>
@@ -9043,7 +9346,7 @@
 </p:sld>
 </file>
 
-<file path=ppt/slides/slide16.xml><?xml version="1.0" encoding="utf-8"?>
+<file path=ppt/slides/slide18.xml><?xml version="1.0" encoding="utf-8"?>
 <p:sld xmlns:a="http://schemas.openxmlformats.org/drawingml/2006/main" xmlns:r="http://schemas.openxmlformats.org/officeDocument/2006/relationships" xmlns:p="http://schemas.openxmlformats.org/presentationml/2006/main">
   <p:cSld>
     <p:bg>
@@ -9849,7 +10152,7 @@
 </p:sld>
 </file>
 
-<file path=ppt/slides/slide17.xml><?xml version="1.0" encoding="utf-8"?>
+<file path=ppt/slides/slide19.xml><?xml version="1.0" encoding="utf-8"?>
 <p:sld xmlns:a="http://schemas.openxmlformats.org/drawingml/2006/main" xmlns:r="http://schemas.openxmlformats.org/officeDocument/2006/relationships" xmlns:p="http://schemas.openxmlformats.org/presentationml/2006/main">
   <p:cSld>
     <p:bg>
@@ -13638,7 +13941,7 @@
 </p:sld>
 </file>
 
-<file path=ppt/slides/slide18.xml><?xml version="1.0" encoding="utf-8"?>
+<file path=ppt/slides/slide2.xml><?xml version="1.0" encoding="utf-8"?>
 <p:sld xmlns:a="http://schemas.openxmlformats.org/drawingml/2006/main" xmlns:r="http://schemas.openxmlformats.org/officeDocument/2006/relationships" xmlns:p="http://schemas.openxmlformats.org/presentationml/2006/main">
   <p:cSld>
     <p:bg>
@@ -13728,7 +14031,7 @@
           <p:cNvPr id="2" name="Title 1">
             <a:extLst>
               <a:ext uri="{FF2B5EF4-FFF2-40B4-BE49-F238E27FC236}">
-                <a16:creationId xmlns:a16="http://schemas.microsoft.com/office/drawing/2014/main" id="{4B1E27C4-F89D-CFE7-2F18-9B5E3A72550B}"/>
+                <a16:creationId xmlns:a16="http://schemas.microsoft.com/office/drawing/2014/main" id="{DBE75319-DCBD-C53A-118E-BF8F5E5AC2E3}"/>
               </a:ext>
             </a:extLst>
           </p:cNvPr>
@@ -13753,7 +14056,7 @@
           <a:p>
             <a:r>
               <a:rPr lang="en-US" sz="5400"/>
-              <a:t>Feasibility Assessment</a:t>
+              <a:t>Objectives</a:t>
             </a:r>
           </a:p>
         </p:txBody>
@@ -14401,6 +14704,841 @@
           <p:cNvPr id="3" name="Content Placeholder 2">
             <a:extLst>
               <a:ext uri="{FF2B5EF4-FFF2-40B4-BE49-F238E27FC236}">
+                <a16:creationId xmlns:a16="http://schemas.microsoft.com/office/drawing/2014/main" id="{21DACDEB-6882-22BF-55E9-76D9F9E5F7B9}"/>
+              </a:ext>
+            </a:extLst>
+          </p:cNvPr>
+          <p:cNvSpPr>
+            <a:spLocks noGrp="1"/>
+          </p:cNvSpPr>
+          <p:nvPr>
+            <p:ph idx="1"/>
+          </p:nvPr>
+        </p:nvSpPr>
+        <p:spPr>
+          <a:xfrm>
+            <a:off x="838200" y="1929384"/>
+            <a:ext cx="10515600" cy="4251960"/>
+          </a:xfrm>
+        </p:spPr>
+        <p:txBody>
+          <a:bodyPr>
+            <a:normAutofit/>
+          </a:bodyPr>
+          <a:lstStyle/>
+          <a:p>
+            <a:r>
+              <a:rPr lang="en-US" sz="2200" dirty="0"/>
+              <a:t>Design and build a traditional flight computer for Wildcat Rocketry</a:t>
+            </a:r>
+          </a:p>
+          <a:p>
+            <a:r>
+              <a:rPr lang="en-US" sz="2200" dirty="0"/>
+              <a:t>Be able to receive data during flight.</a:t>
+            </a:r>
+          </a:p>
+          <a:p>
+            <a:r>
+              <a:rPr lang="en-US" sz="2200" dirty="0"/>
+              <a:t>Accurately display flight data via </a:t>
+            </a:r>
+            <a:r>
+              <a:rPr lang="en-US" sz="2200" dirty="0" err="1"/>
+              <a:t>WiFi</a:t>
+            </a:r>
+            <a:r>
+              <a:rPr lang="en-US" sz="2200" dirty="0"/>
+              <a:t> or data export USB.</a:t>
+            </a:r>
+          </a:p>
+          <a:p>
+            <a:endParaRPr lang="en-US" sz="2200" dirty="0"/>
+          </a:p>
+          <a:p>
+            <a:r>
+              <a:rPr lang="en-US" sz="2200" dirty="0"/>
+              <a:t>POSSIBLY ADD PICTURE</a:t>
+            </a:r>
+          </a:p>
+        </p:txBody>
+      </p:sp>
+    </p:spTree>
+    <p:extLst>
+      <p:ext uri="{BB962C8B-B14F-4D97-AF65-F5344CB8AC3E}">
+        <p14:creationId xmlns:p14="http://schemas.microsoft.com/office/powerpoint/2010/main" val="1272993298"/>
+      </p:ext>
+    </p:extLst>
+  </p:cSld>
+  <p:clrMapOvr>
+    <a:masterClrMapping/>
+  </p:clrMapOvr>
+</p:sld>
+</file>
+
+<file path=ppt/slides/slide20.xml><?xml version="1.0" encoding="utf-8"?>
+<p:sld xmlns:a="http://schemas.openxmlformats.org/drawingml/2006/main" xmlns:r="http://schemas.openxmlformats.org/officeDocument/2006/relationships" xmlns:p="http://schemas.openxmlformats.org/presentationml/2006/main">
+  <p:cSld>
+    <p:bg>
+      <p:bgPr>
+        <a:solidFill>
+          <a:schemeClr val="bg1"/>
+        </a:solidFill>
+        <a:effectLst/>
+      </p:bgPr>
+    </p:bg>
+    <p:spTree>
+      <p:nvGrpSpPr>
+        <p:cNvPr id="1" name=""/>
+        <p:cNvGrpSpPr/>
+        <p:nvPr/>
+      </p:nvGrpSpPr>
+      <p:grpSpPr>
+        <a:xfrm>
+          <a:off x="0" y="0"/>
+          <a:ext cx="0" cy="0"/>
+          <a:chOff x="0" y="0"/>
+          <a:chExt cx="0" cy="0"/>
+        </a:xfrm>
+      </p:grpSpPr>
+      <p:sp useBgFill="1">
+        <p:nvSpPr>
+          <p:cNvPr id="8" name="Rectangle 7">
+            <a:extLst>
+              <a:ext uri="{FF2B5EF4-FFF2-40B4-BE49-F238E27FC236}">
+                <a16:creationId xmlns:a16="http://schemas.microsoft.com/office/drawing/2014/main" id="{100EDD19-6802-4EC3-95CE-CFFAB042CFD6}"/>
+              </a:ext>
+              <a:ext uri="{C183D7F6-B498-43B3-948B-1728B52AA6E4}">
+                <adec:decorative xmlns:adec="http://schemas.microsoft.com/office/drawing/2017/decorative" val="1"/>
+              </a:ext>
+            </a:extLst>
+          </p:cNvPr>
+          <p:cNvSpPr>
+            <a:spLocks noGrp="1" noRot="1" noChangeAspect="1" noMove="1" noResize="1" noEditPoints="1" noAdjustHandles="1" noChangeArrowheads="1" noChangeShapeType="1" noTextEdit="1"/>
+          </p:cNvSpPr>
+          <p:nvPr>
+            <p:extLst>
+              <p:ext uri="{386F3935-93C4-4BCD-93E2-E3B085C9AB24}">
+                <p16:designElem xmlns:p16="http://schemas.microsoft.com/office/powerpoint/2015/main" val="1"/>
+              </p:ext>
+            </p:extLst>
+          </p:nvPr>
+        </p:nvSpPr>
+        <p:spPr>
+          <a:xfrm>
+            <a:off x="0" y="0"/>
+            <a:ext cx="12188952" cy="6858000"/>
+          </a:xfrm>
+          <a:prstGeom prst="rect">
+            <a:avLst/>
+          </a:prstGeom>
+          <a:ln>
+            <a:noFill/>
+          </a:ln>
+        </p:spPr>
+        <p:style>
+          <a:lnRef idx="2">
+            <a:schemeClr val="accent1">
+              <a:shade val="50000"/>
+            </a:schemeClr>
+          </a:lnRef>
+          <a:fillRef idx="1">
+            <a:schemeClr val="accent1"/>
+          </a:fillRef>
+          <a:effectRef idx="0">
+            <a:schemeClr val="accent1"/>
+          </a:effectRef>
+          <a:fontRef idx="minor">
+            <a:schemeClr val="lt1"/>
+          </a:fontRef>
+        </p:style>
+        <p:txBody>
+          <a:bodyPr rtlCol="0" anchor="ctr"/>
+          <a:lstStyle/>
+          <a:p>
+            <a:pPr algn="ctr"/>
+            <a:endParaRPr lang="en-US"/>
+          </a:p>
+        </p:txBody>
+      </p:sp>
+      <p:sp>
+        <p:nvSpPr>
+          <p:cNvPr id="2" name="Title 1">
+            <a:extLst>
+              <a:ext uri="{FF2B5EF4-FFF2-40B4-BE49-F238E27FC236}">
+                <a16:creationId xmlns:a16="http://schemas.microsoft.com/office/drawing/2014/main" id="{4B1E27C4-F89D-CFE7-2F18-9B5E3A72550B}"/>
+              </a:ext>
+            </a:extLst>
+          </p:cNvPr>
+          <p:cNvSpPr>
+            <a:spLocks noGrp="1"/>
+          </p:cNvSpPr>
+          <p:nvPr>
+            <p:ph type="title"/>
+          </p:nvPr>
+        </p:nvSpPr>
+        <p:spPr>
+          <a:xfrm>
+            <a:off x="838200" y="365125"/>
+            <a:ext cx="10515600" cy="1325563"/>
+          </a:xfrm>
+        </p:spPr>
+        <p:txBody>
+          <a:bodyPr>
+            <a:normAutofit/>
+          </a:bodyPr>
+          <a:lstStyle/>
+          <a:p>
+            <a:r>
+              <a:rPr lang="en-US" sz="5400"/>
+              <a:t>Feasibility Assessment</a:t>
+            </a:r>
+          </a:p>
+        </p:txBody>
+      </p:sp>
+      <p:sp>
+        <p:nvSpPr>
+          <p:cNvPr id="10" name="sketch line">
+            <a:extLst>
+              <a:ext uri="{FF2B5EF4-FFF2-40B4-BE49-F238E27FC236}">
+                <a16:creationId xmlns:a16="http://schemas.microsoft.com/office/drawing/2014/main" id="{DB17E863-922E-4C26-BD64-E8FD41D28661}"/>
+              </a:ext>
+              <a:ext uri="{C183D7F6-B498-43B3-948B-1728B52AA6E4}">
+                <adec:decorative xmlns:adec="http://schemas.microsoft.com/office/drawing/2017/decorative" val="1"/>
+              </a:ext>
+            </a:extLst>
+          </p:cNvPr>
+          <p:cNvSpPr>
+            <a:spLocks noGrp="1" noRot="1" noChangeAspect="1" noMove="1" noResize="1" noEditPoints="1" noAdjustHandles="1" noChangeArrowheads="1" noChangeShapeType="1" noTextEdit="1"/>
+          </p:cNvSpPr>
+          <p:nvPr>
+            <p:extLst>
+              <p:ext uri="{386F3935-93C4-4BCD-93E2-E3B085C9AB24}">
+                <p16:designElem xmlns:p16="http://schemas.microsoft.com/office/powerpoint/2015/main" val="1"/>
+              </p:ext>
+            </p:extLst>
+          </p:nvPr>
+        </p:nvSpPr>
+        <p:spPr>
+          <a:xfrm>
+            <a:off x="669036" y="1677373"/>
+            <a:ext cx="10853928" cy="18288"/>
+          </a:xfrm>
+          <a:custGeom>
+            <a:avLst/>
+            <a:gdLst>
+              <a:gd name="connsiteX0" fmla="*/ 0 w 10853928"/>
+              <a:gd name="connsiteY0" fmla="*/ 0 h 18288"/>
+              <a:gd name="connsiteX1" fmla="*/ 461292 w 10853928"/>
+              <a:gd name="connsiteY1" fmla="*/ 0 h 18288"/>
+              <a:gd name="connsiteX2" fmla="*/ 1139662 w 10853928"/>
+              <a:gd name="connsiteY2" fmla="*/ 0 h 18288"/>
+              <a:gd name="connsiteX3" fmla="*/ 1926572 w 10853928"/>
+              <a:gd name="connsiteY3" fmla="*/ 0 h 18288"/>
+              <a:gd name="connsiteX4" fmla="*/ 2279325 w 10853928"/>
+              <a:gd name="connsiteY4" fmla="*/ 0 h 18288"/>
+              <a:gd name="connsiteX5" fmla="*/ 2632078 w 10853928"/>
+              <a:gd name="connsiteY5" fmla="*/ 0 h 18288"/>
+              <a:gd name="connsiteX6" fmla="*/ 3527527 w 10853928"/>
+              <a:gd name="connsiteY6" fmla="*/ 0 h 18288"/>
+              <a:gd name="connsiteX7" fmla="*/ 4205897 w 10853928"/>
+              <a:gd name="connsiteY7" fmla="*/ 0 h 18288"/>
+              <a:gd name="connsiteX8" fmla="*/ 4558650 w 10853928"/>
+              <a:gd name="connsiteY8" fmla="*/ 0 h 18288"/>
+              <a:gd name="connsiteX9" fmla="*/ 5237020 w 10853928"/>
+              <a:gd name="connsiteY9" fmla="*/ 0 h 18288"/>
+              <a:gd name="connsiteX10" fmla="*/ 6132469 w 10853928"/>
+              <a:gd name="connsiteY10" fmla="*/ 0 h 18288"/>
+              <a:gd name="connsiteX11" fmla="*/ 6702301 w 10853928"/>
+              <a:gd name="connsiteY11" fmla="*/ 0 h 18288"/>
+              <a:gd name="connsiteX12" fmla="*/ 7272132 w 10853928"/>
+              <a:gd name="connsiteY12" fmla="*/ 0 h 18288"/>
+              <a:gd name="connsiteX13" fmla="*/ 7950502 w 10853928"/>
+              <a:gd name="connsiteY13" fmla="*/ 0 h 18288"/>
+              <a:gd name="connsiteX14" fmla="*/ 8737412 w 10853928"/>
+              <a:gd name="connsiteY14" fmla="*/ 0 h 18288"/>
+              <a:gd name="connsiteX15" fmla="*/ 9524322 w 10853928"/>
+              <a:gd name="connsiteY15" fmla="*/ 0 h 18288"/>
+              <a:gd name="connsiteX16" fmla="*/ 10853928 w 10853928"/>
+              <a:gd name="connsiteY16" fmla="*/ 0 h 18288"/>
+              <a:gd name="connsiteX17" fmla="*/ 10853928 w 10853928"/>
+              <a:gd name="connsiteY17" fmla="*/ 18288 h 18288"/>
+              <a:gd name="connsiteX18" fmla="*/ 10392636 w 10853928"/>
+              <a:gd name="connsiteY18" fmla="*/ 18288 h 18288"/>
+              <a:gd name="connsiteX19" fmla="*/ 9497187 w 10853928"/>
+              <a:gd name="connsiteY19" fmla="*/ 18288 h 18288"/>
+              <a:gd name="connsiteX20" fmla="*/ 8818817 w 10853928"/>
+              <a:gd name="connsiteY20" fmla="*/ 18288 h 18288"/>
+              <a:gd name="connsiteX21" fmla="*/ 8466064 w 10853928"/>
+              <a:gd name="connsiteY21" fmla="*/ 18288 h 18288"/>
+              <a:gd name="connsiteX22" fmla="*/ 7787693 w 10853928"/>
+              <a:gd name="connsiteY22" fmla="*/ 18288 h 18288"/>
+              <a:gd name="connsiteX23" fmla="*/ 7217862 w 10853928"/>
+              <a:gd name="connsiteY23" fmla="*/ 18288 h 18288"/>
+              <a:gd name="connsiteX24" fmla="*/ 6648031 w 10853928"/>
+              <a:gd name="connsiteY24" fmla="*/ 18288 h 18288"/>
+              <a:gd name="connsiteX25" fmla="*/ 6078200 w 10853928"/>
+              <a:gd name="connsiteY25" fmla="*/ 18288 h 18288"/>
+              <a:gd name="connsiteX26" fmla="*/ 5508368 w 10853928"/>
+              <a:gd name="connsiteY26" fmla="*/ 18288 h 18288"/>
+              <a:gd name="connsiteX27" fmla="*/ 4721459 w 10853928"/>
+              <a:gd name="connsiteY27" fmla="*/ 18288 h 18288"/>
+              <a:gd name="connsiteX28" fmla="*/ 4043088 w 10853928"/>
+              <a:gd name="connsiteY28" fmla="*/ 18288 h 18288"/>
+              <a:gd name="connsiteX29" fmla="*/ 3690336 w 10853928"/>
+              <a:gd name="connsiteY29" fmla="*/ 18288 h 18288"/>
+              <a:gd name="connsiteX30" fmla="*/ 3120504 w 10853928"/>
+              <a:gd name="connsiteY30" fmla="*/ 18288 h 18288"/>
+              <a:gd name="connsiteX31" fmla="*/ 2333595 w 10853928"/>
+              <a:gd name="connsiteY31" fmla="*/ 18288 h 18288"/>
+              <a:gd name="connsiteX32" fmla="*/ 1872303 w 10853928"/>
+              <a:gd name="connsiteY32" fmla="*/ 18288 h 18288"/>
+              <a:gd name="connsiteX33" fmla="*/ 976854 w 10853928"/>
+              <a:gd name="connsiteY33" fmla="*/ 18288 h 18288"/>
+              <a:gd name="connsiteX34" fmla="*/ 0 w 10853928"/>
+              <a:gd name="connsiteY34" fmla="*/ 18288 h 18288"/>
+              <a:gd name="connsiteX35" fmla="*/ 0 w 10853928"/>
+              <a:gd name="connsiteY35" fmla="*/ 0 h 18288"/>
+            </a:gdLst>
+            <a:ahLst/>
+            <a:cxnLst>
+              <a:cxn ang="0">
+                <a:pos x="connsiteX0" y="connsiteY0"/>
+              </a:cxn>
+              <a:cxn ang="0">
+                <a:pos x="connsiteX1" y="connsiteY1"/>
+              </a:cxn>
+              <a:cxn ang="0">
+                <a:pos x="connsiteX2" y="connsiteY2"/>
+              </a:cxn>
+              <a:cxn ang="0">
+                <a:pos x="connsiteX3" y="connsiteY3"/>
+              </a:cxn>
+              <a:cxn ang="0">
+                <a:pos x="connsiteX4" y="connsiteY4"/>
+              </a:cxn>
+              <a:cxn ang="0">
+                <a:pos x="connsiteX5" y="connsiteY5"/>
+              </a:cxn>
+              <a:cxn ang="0">
+                <a:pos x="connsiteX6" y="connsiteY6"/>
+              </a:cxn>
+              <a:cxn ang="0">
+                <a:pos x="connsiteX7" y="connsiteY7"/>
+              </a:cxn>
+              <a:cxn ang="0">
+                <a:pos x="connsiteX8" y="connsiteY8"/>
+              </a:cxn>
+              <a:cxn ang="0">
+                <a:pos x="connsiteX9" y="connsiteY9"/>
+              </a:cxn>
+              <a:cxn ang="0">
+                <a:pos x="connsiteX10" y="connsiteY10"/>
+              </a:cxn>
+              <a:cxn ang="0">
+                <a:pos x="connsiteX11" y="connsiteY11"/>
+              </a:cxn>
+              <a:cxn ang="0">
+                <a:pos x="connsiteX12" y="connsiteY12"/>
+              </a:cxn>
+              <a:cxn ang="0">
+                <a:pos x="connsiteX13" y="connsiteY13"/>
+              </a:cxn>
+              <a:cxn ang="0">
+                <a:pos x="connsiteX14" y="connsiteY14"/>
+              </a:cxn>
+              <a:cxn ang="0">
+                <a:pos x="connsiteX15" y="connsiteY15"/>
+              </a:cxn>
+              <a:cxn ang="0">
+                <a:pos x="connsiteX16" y="connsiteY16"/>
+              </a:cxn>
+              <a:cxn ang="0">
+                <a:pos x="connsiteX17" y="connsiteY17"/>
+              </a:cxn>
+              <a:cxn ang="0">
+                <a:pos x="connsiteX18" y="connsiteY18"/>
+              </a:cxn>
+              <a:cxn ang="0">
+                <a:pos x="connsiteX19" y="connsiteY19"/>
+              </a:cxn>
+              <a:cxn ang="0">
+                <a:pos x="connsiteX20" y="connsiteY20"/>
+              </a:cxn>
+              <a:cxn ang="0">
+                <a:pos x="connsiteX21" y="connsiteY21"/>
+              </a:cxn>
+              <a:cxn ang="0">
+                <a:pos x="connsiteX22" y="connsiteY22"/>
+              </a:cxn>
+              <a:cxn ang="0">
+                <a:pos x="connsiteX23" y="connsiteY23"/>
+              </a:cxn>
+              <a:cxn ang="0">
+                <a:pos x="connsiteX24" y="connsiteY24"/>
+              </a:cxn>
+              <a:cxn ang="0">
+                <a:pos x="connsiteX25" y="connsiteY25"/>
+              </a:cxn>
+              <a:cxn ang="0">
+                <a:pos x="connsiteX26" y="connsiteY26"/>
+              </a:cxn>
+              <a:cxn ang="0">
+                <a:pos x="connsiteX27" y="connsiteY27"/>
+              </a:cxn>
+              <a:cxn ang="0">
+                <a:pos x="connsiteX28" y="connsiteY28"/>
+              </a:cxn>
+              <a:cxn ang="0">
+                <a:pos x="connsiteX29" y="connsiteY29"/>
+              </a:cxn>
+              <a:cxn ang="0">
+                <a:pos x="connsiteX30" y="connsiteY30"/>
+              </a:cxn>
+              <a:cxn ang="0">
+                <a:pos x="connsiteX31" y="connsiteY31"/>
+              </a:cxn>
+              <a:cxn ang="0">
+                <a:pos x="connsiteX32" y="connsiteY32"/>
+              </a:cxn>
+              <a:cxn ang="0">
+                <a:pos x="connsiteX33" y="connsiteY33"/>
+              </a:cxn>
+              <a:cxn ang="0">
+                <a:pos x="connsiteX34" y="connsiteY34"/>
+              </a:cxn>
+              <a:cxn ang="0">
+                <a:pos x="connsiteX35" y="connsiteY35"/>
+              </a:cxn>
+            </a:cxnLst>
+            <a:rect l="l" t="t" r="r" b="b"/>
+            <a:pathLst>
+              <a:path w="10853928" h="18288" fill="none" extrusionOk="0">
+                <a:moveTo>
+                  <a:pt x="0" y="0"/>
+                </a:moveTo>
+                <a:cubicBezTo>
+                  <a:pt x="146993" y="-19076"/>
+                  <a:pt x="347684" y="-4790"/>
+                  <a:pt x="461292" y="0"/>
+                </a:cubicBezTo>
+                <a:cubicBezTo>
+                  <a:pt x="574900" y="4790"/>
+                  <a:pt x="808367" y="19821"/>
+                  <a:pt x="1139662" y="0"/>
+                </a:cubicBezTo>
+                <a:cubicBezTo>
+                  <a:pt x="1470957" y="-19821"/>
+                  <a:pt x="1627405" y="5721"/>
+                  <a:pt x="1926572" y="0"/>
+                </a:cubicBezTo>
+                <a:cubicBezTo>
+                  <a:pt x="2225739" y="-5721"/>
+                  <a:pt x="2137730" y="-3235"/>
+                  <a:pt x="2279325" y="0"/>
+                </a:cubicBezTo>
+                <a:cubicBezTo>
+                  <a:pt x="2420920" y="3235"/>
+                  <a:pt x="2456518" y="9685"/>
+                  <a:pt x="2632078" y="0"/>
+                </a:cubicBezTo>
+                <a:cubicBezTo>
+                  <a:pt x="2807638" y="-9685"/>
+                  <a:pt x="3211516" y="-43007"/>
+                  <a:pt x="3527527" y="0"/>
+                </a:cubicBezTo>
+                <a:cubicBezTo>
+                  <a:pt x="3843538" y="43007"/>
+                  <a:pt x="4058833" y="22042"/>
+                  <a:pt x="4205897" y="0"/>
+                </a:cubicBezTo>
+                <a:cubicBezTo>
+                  <a:pt x="4352961" y="-22042"/>
+                  <a:pt x="4474805" y="-11846"/>
+                  <a:pt x="4558650" y="0"/>
+                </a:cubicBezTo>
+                <a:cubicBezTo>
+                  <a:pt x="4642495" y="11846"/>
+                  <a:pt x="5041928" y="-6069"/>
+                  <a:pt x="5237020" y="0"/>
+                </a:cubicBezTo>
+                <a:cubicBezTo>
+                  <a:pt x="5432112" y="6069"/>
+                  <a:pt x="5943266" y="-17479"/>
+                  <a:pt x="6132469" y="0"/>
+                </a:cubicBezTo>
+                <a:cubicBezTo>
+                  <a:pt x="6321672" y="17479"/>
+                  <a:pt x="6483872" y="26234"/>
+                  <a:pt x="6702301" y="0"/>
+                </a:cubicBezTo>
+                <a:cubicBezTo>
+                  <a:pt x="6920730" y="-26234"/>
+                  <a:pt x="6991194" y="-15156"/>
+                  <a:pt x="7272132" y="0"/>
+                </a:cubicBezTo>
+                <a:cubicBezTo>
+                  <a:pt x="7553070" y="15156"/>
+                  <a:pt x="7684444" y="-32961"/>
+                  <a:pt x="7950502" y="0"/>
+                </a:cubicBezTo>
+                <a:cubicBezTo>
+                  <a:pt x="8216560" y="32961"/>
+                  <a:pt x="8493290" y="-10491"/>
+                  <a:pt x="8737412" y="0"/>
+                </a:cubicBezTo>
+                <a:cubicBezTo>
+                  <a:pt x="8981534" y="10491"/>
+                  <a:pt x="9191586" y="-13899"/>
+                  <a:pt x="9524322" y="0"/>
+                </a:cubicBezTo>
+                <a:cubicBezTo>
+                  <a:pt x="9857058" y="13899"/>
+                  <a:pt x="10297509" y="7485"/>
+                  <a:pt x="10853928" y="0"/>
+                </a:cubicBezTo>
+                <a:cubicBezTo>
+                  <a:pt x="10854574" y="4451"/>
+                  <a:pt x="10854418" y="9226"/>
+                  <a:pt x="10853928" y="18288"/>
+                </a:cubicBezTo>
+                <a:cubicBezTo>
+                  <a:pt x="10691638" y="28522"/>
+                  <a:pt x="10574319" y="29578"/>
+                  <a:pt x="10392636" y="18288"/>
+                </a:cubicBezTo>
+                <a:cubicBezTo>
+                  <a:pt x="10210953" y="6998"/>
+                  <a:pt x="9836277" y="-16742"/>
+                  <a:pt x="9497187" y="18288"/>
+                </a:cubicBezTo>
+                <a:cubicBezTo>
+                  <a:pt x="9158097" y="53318"/>
+                  <a:pt x="9119479" y="30714"/>
+                  <a:pt x="8818817" y="18288"/>
+                </a:cubicBezTo>
+                <a:cubicBezTo>
+                  <a:pt x="8518155" y="5863"/>
+                  <a:pt x="8640037" y="6483"/>
+                  <a:pt x="8466064" y="18288"/>
+                </a:cubicBezTo>
+                <a:cubicBezTo>
+                  <a:pt x="8292091" y="30093"/>
+                  <a:pt x="7997656" y="18914"/>
+                  <a:pt x="7787693" y="18288"/>
+                </a:cubicBezTo>
+                <a:cubicBezTo>
+                  <a:pt x="7577730" y="17662"/>
+                  <a:pt x="7412468" y="21416"/>
+                  <a:pt x="7217862" y="18288"/>
+                </a:cubicBezTo>
+                <a:cubicBezTo>
+                  <a:pt x="7023256" y="15160"/>
+                  <a:pt x="6898018" y="14824"/>
+                  <a:pt x="6648031" y="18288"/>
+                </a:cubicBezTo>
+                <a:cubicBezTo>
+                  <a:pt x="6398044" y="21752"/>
+                  <a:pt x="6254402" y="38625"/>
+                  <a:pt x="6078200" y="18288"/>
+                </a:cubicBezTo>
+                <a:cubicBezTo>
+                  <a:pt x="5901998" y="-2049"/>
+                  <a:pt x="5622886" y="3213"/>
+                  <a:pt x="5508368" y="18288"/>
+                </a:cubicBezTo>
+                <a:cubicBezTo>
+                  <a:pt x="5393850" y="33363"/>
+                  <a:pt x="5036260" y="26830"/>
+                  <a:pt x="4721459" y="18288"/>
+                </a:cubicBezTo>
+                <a:cubicBezTo>
+                  <a:pt x="4406658" y="9746"/>
+                  <a:pt x="4239221" y="41551"/>
+                  <a:pt x="4043088" y="18288"/>
+                </a:cubicBezTo>
+                <a:cubicBezTo>
+                  <a:pt x="3846955" y="-4975"/>
+                  <a:pt x="3818802" y="34658"/>
+                  <a:pt x="3690336" y="18288"/>
+                </a:cubicBezTo>
+                <a:cubicBezTo>
+                  <a:pt x="3561870" y="1918"/>
+                  <a:pt x="3265491" y="42194"/>
+                  <a:pt x="3120504" y="18288"/>
+                </a:cubicBezTo>
+                <a:cubicBezTo>
+                  <a:pt x="2975517" y="-5618"/>
+                  <a:pt x="2720254" y="36673"/>
+                  <a:pt x="2333595" y="18288"/>
+                </a:cubicBezTo>
+                <a:cubicBezTo>
+                  <a:pt x="1946936" y="-97"/>
+                  <a:pt x="2097241" y="5776"/>
+                  <a:pt x="1872303" y="18288"/>
+                </a:cubicBezTo>
+                <a:cubicBezTo>
+                  <a:pt x="1647365" y="30800"/>
+                  <a:pt x="1282708" y="45380"/>
+                  <a:pt x="976854" y="18288"/>
+                </a:cubicBezTo>
+                <a:cubicBezTo>
+                  <a:pt x="671000" y="-8804"/>
+                  <a:pt x="408401" y="-12775"/>
+                  <a:pt x="0" y="18288"/>
+                </a:cubicBezTo>
+                <a:cubicBezTo>
+                  <a:pt x="-213" y="9468"/>
+                  <a:pt x="187" y="4459"/>
+                  <a:pt x="0" y="0"/>
+                </a:cubicBezTo>
+                <a:close/>
+              </a:path>
+              <a:path w="10853928" h="18288" stroke="0" extrusionOk="0">
+                <a:moveTo>
+                  <a:pt x="0" y="0"/>
+                </a:moveTo>
+                <a:cubicBezTo>
+                  <a:pt x="267322" y="15284"/>
+                  <a:pt x="415388" y="-21048"/>
+                  <a:pt x="569831" y="0"/>
+                </a:cubicBezTo>
+                <a:cubicBezTo>
+                  <a:pt x="724274" y="21048"/>
+                  <a:pt x="769333" y="-2353"/>
+                  <a:pt x="922584" y="0"/>
+                </a:cubicBezTo>
+                <a:cubicBezTo>
+                  <a:pt x="1075835" y="2353"/>
+                  <a:pt x="1399490" y="-145"/>
+                  <a:pt x="1818033" y="0"/>
+                </a:cubicBezTo>
+                <a:cubicBezTo>
+                  <a:pt x="2236576" y="145"/>
+                  <a:pt x="2145330" y="5482"/>
+                  <a:pt x="2387864" y="0"/>
+                </a:cubicBezTo>
+                <a:cubicBezTo>
+                  <a:pt x="2630398" y="-5482"/>
+                  <a:pt x="2793207" y="18487"/>
+                  <a:pt x="2957695" y="0"/>
+                </a:cubicBezTo>
+                <a:cubicBezTo>
+                  <a:pt x="3122183" y="-18487"/>
+                  <a:pt x="3579141" y="19003"/>
+                  <a:pt x="3853144" y="0"/>
+                </a:cubicBezTo>
+                <a:cubicBezTo>
+                  <a:pt x="4127147" y="-19003"/>
+                  <a:pt x="4209857" y="12211"/>
+                  <a:pt x="4314436" y="0"/>
+                </a:cubicBezTo>
+                <a:cubicBezTo>
+                  <a:pt x="4419015" y="-12211"/>
+                  <a:pt x="4762459" y="-17220"/>
+                  <a:pt x="5209885" y="0"/>
+                </a:cubicBezTo>
+                <a:cubicBezTo>
+                  <a:pt x="5657311" y="17220"/>
+                  <a:pt x="5692663" y="-3290"/>
+                  <a:pt x="6105335" y="0"/>
+                </a:cubicBezTo>
+                <a:cubicBezTo>
+                  <a:pt x="6518007" y="3290"/>
+                  <a:pt x="6455516" y="-5124"/>
+                  <a:pt x="6783705" y="0"/>
+                </a:cubicBezTo>
+                <a:cubicBezTo>
+                  <a:pt x="7111894" y="5124"/>
+                  <a:pt x="7441941" y="-17829"/>
+                  <a:pt x="7679154" y="0"/>
+                </a:cubicBezTo>
+                <a:cubicBezTo>
+                  <a:pt x="7916367" y="17829"/>
+                  <a:pt x="8102967" y="-24363"/>
+                  <a:pt x="8248985" y="0"/>
+                </a:cubicBezTo>
+                <a:cubicBezTo>
+                  <a:pt x="8395003" y="24363"/>
+                  <a:pt x="8552393" y="25505"/>
+                  <a:pt x="8818817" y="0"/>
+                </a:cubicBezTo>
+                <a:cubicBezTo>
+                  <a:pt x="9085241" y="-25505"/>
+                  <a:pt x="9411308" y="38000"/>
+                  <a:pt x="9605726" y="0"/>
+                </a:cubicBezTo>
+                <a:cubicBezTo>
+                  <a:pt x="9800144" y="-38000"/>
+                  <a:pt x="10006468" y="-25741"/>
+                  <a:pt x="10175558" y="0"/>
+                </a:cubicBezTo>
+                <a:cubicBezTo>
+                  <a:pt x="10344648" y="25741"/>
+                  <a:pt x="10696282" y="695"/>
+                  <a:pt x="10853928" y="0"/>
+                </a:cubicBezTo>
+                <a:cubicBezTo>
+                  <a:pt x="10853521" y="8690"/>
+                  <a:pt x="10853774" y="14141"/>
+                  <a:pt x="10853928" y="18288"/>
+                </a:cubicBezTo>
+                <a:cubicBezTo>
+                  <a:pt x="10608124" y="24255"/>
+                  <a:pt x="10343415" y="22307"/>
+                  <a:pt x="10067018" y="18288"/>
+                </a:cubicBezTo>
+                <a:cubicBezTo>
+                  <a:pt x="9790621" y="14270"/>
+                  <a:pt x="9843266" y="3564"/>
+                  <a:pt x="9714266" y="18288"/>
+                </a:cubicBezTo>
+                <a:cubicBezTo>
+                  <a:pt x="9585266" y="33012"/>
+                  <a:pt x="9379484" y="1875"/>
+                  <a:pt x="9252974" y="18288"/>
+                </a:cubicBezTo>
+                <a:cubicBezTo>
+                  <a:pt x="9126464" y="34701"/>
+                  <a:pt x="8580678" y="-4904"/>
+                  <a:pt x="8357525" y="18288"/>
+                </a:cubicBezTo>
+                <a:cubicBezTo>
+                  <a:pt x="8134372" y="41480"/>
+                  <a:pt x="7903199" y="26458"/>
+                  <a:pt x="7679154" y="18288"/>
+                </a:cubicBezTo>
+                <a:cubicBezTo>
+                  <a:pt x="7455109" y="10118"/>
+                  <a:pt x="7435944" y="27109"/>
+                  <a:pt x="7217862" y="18288"/>
+                </a:cubicBezTo>
+                <a:cubicBezTo>
+                  <a:pt x="6999780" y="9467"/>
+                  <a:pt x="6680409" y="18985"/>
+                  <a:pt x="6539492" y="18288"/>
+                </a:cubicBezTo>
+                <a:cubicBezTo>
+                  <a:pt x="6398575" y="17592"/>
+                  <a:pt x="6312077" y="33018"/>
+                  <a:pt x="6186739" y="18288"/>
+                </a:cubicBezTo>
+                <a:cubicBezTo>
+                  <a:pt x="6061401" y="3558"/>
+                  <a:pt x="5947033" y="12075"/>
+                  <a:pt x="5833986" y="18288"/>
+                </a:cubicBezTo>
+                <a:cubicBezTo>
+                  <a:pt x="5720939" y="24501"/>
+                  <a:pt x="5482226" y="8586"/>
+                  <a:pt x="5155616" y="18288"/>
+                </a:cubicBezTo>
+                <a:cubicBezTo>
+                  <a:pt x="4829006" y="27991"/>
+                  <a:pt x="4841274" y="29316"/>
+                  <a:pt x="4694324" y="18288"/>
+                </a:cubicBezTo>
+                <a:cubicBezTo>
+                  <a:pt x="4547374" y="7260"/>
+                  <a:pt x="4077675" y="7013"/>
+                  <a:pt x="3907414" y="18288"/>
+                </a:cubicBezTo>
+                <a:cubicBezTo>
+                  <a:pt x="3737153" y="29564"/>
+                  <a:pt x="3538393" y="21630"/>
+                  <a:pt x="3446122" y="18288"/>
+                </a:cubicBezTo>
+                <a:cubicBezTo>
+                  <a:pt x="3353851" y="14946"/>
+                  <a:pt x="2990320" y="-8091"/>
+                  <a:pt x="2659212" y="18288"/>
+                </a:cubicBezTo>
+                <a:cubicBezTo>
+                  <a:pt x="2328104" y="44667"/>
+                  <a:pt x="2427653" y="9607"/>
+                  <a:pt x="2306460" y="18288"/>
+                </a:cubicBezTo>
+                <a:cubicBezTo>
+                  <a:pt x="2185267" y="26969"/>
+                  <a:pt x="1719763" y="3717"/>
+                  <a:pt x="1519550" y="18288"/>
+                </a:cubicBezTo>
+                <a:cubicBezTo>
+                  <a:pt x="1319337" y="32860"/>
+                  <a:pt x="1167371" y="17040"/>
+                  <a:pt x="1058258" y="18288"/>
+                </a:cubicBezTo>
+                <a:cubicBezTo>
+                  <a:pt x="949145" y="19536"/>
+                  <a:pt x="780234" y="31447"/>
+                  <a:pt x="705505" y="18288"/>
+                </a:cubicBezTo>
+                <a:cubicBezTo>
+                  <a:pt x="630776" y="5129"/>
+                  <a:pt x="215796" y="30056"/>
+                  <a:pt x="0" y="18288"/>
+                </a:cubicBezTo>
+                <a:cubicBezTo>
+                  <a:pt x="-53" y="11301"/>
+                  <a:pt x="-649" y="7756"/>
+                  <a:pt x="0" y="0"/>
+                </a:cubicBezTo>
+                <a:close/>
+              </a:path>
+            </a:pathLst>
+          </a:custGeom>
+          <a:solidFill>
+            <a:schemeClr val="accent2"/>
+          </a:solidFill>
+          <a:ln w="41275" cap="rnd">
+            <a:solidFill>
+              <a:schemeClr val="accent2"/>
+            </a:solidFill>
+            <a:round/>
+            <a:extLst>
+              <a:ext uri="{C807C97D-BFC1-408E-A445-0C87EB9F89A2}">
+                <ask:lineSketchStyleProps xmlns:ask="http://schemas.microsoft.com/office/drawing/2018/sketchyshapes" sd="1219033472">
+                  <a:prstGeom prst="rect">
+                    <a:avLst/>
+                  </a:prstGeom>
+                  <ask:type>
+                    <ask:lineSketchFreehand/>
+                  </ask:type>
+                </ask:lineSketchStyleProps>
+              </a:ext>
+            </a:extLst>
+          </a:ln>
+        </p:spPr>
+        <p:style>
+          <a:lnRef idx="2">
+            <a:schemeClr val="accent1">
+              <a:shade val="50000"/>
+            </a:schemeClr>
+          </a:lnRef>
+          <a:fillRef idx="1">
+            <a:schemeClr val="accent1"/>
+          </a:fillRef>
+          <a:effectRef idx="0">
+            <a:schemeClr val="accent1"/>
+          </a:effectRef>
+          <a:fontRef idx="minor">
+            <a:schemeClr val="lt1"/>
+          </a:fontRef>
+        </p:style>
+        <p:txBody>
+          <a:bodyPr rtlCol="0" anchor="ctr"/>
+          <a:lstStyle/>
+          <a:p>
+            <a:pPr algn="ctr"/>
+            <a:endParaRPr lang="en-US"/>
+          </a:p>
+        </p:txBody>
+      </p:sp>
+      <p:sp>
+        <p:nvSpPr>
+          <p:cNvPr id="3" name="Content Placeholder 2">
+            <a:extLst>
+              <a:ext uri="{FF2B5EF4-FFF2-40B4-BE49-F238E27FC236}">
                 <a16:creationId xmlns:a16="http://schemas.microsoft.com/office/drawing/2014/main" id="{9F7AB586-525F-7119-210E-93808F4331F4}"/>
               </a:ext>
             </a:extLst>
@@ -14503,7 +15641,114 @@
 </p:sld>
 </file>
 
-<file path=ppt/slides/slide19.xml><?xml version="1.0" encoding="utf-8"?>
+<file path=ppt/slides/slide21.xml><?xml version="1.0" encoding="utf-8"?>
+<p:sld xmlns:a="http://schemas.openxmlformats.org/drawingml/2006/main" xmlns:r="http://schemas.openxmlformats.org/officeDocument/2006/relationships" xmlns:p="http://schemas.openxmlformats.org/presentationml/2006/main">
+  <p:cSld>
+    <p:spTree>
+      <p:nvGrpSpPr>
+        <p:cNvPr id="1" name="">
+          <a:extLst>
+            <a:ext uri="{FF2B5EF4-FFF2-40B4-BE49-F238E27FC236}">
+              <a16:creationId xmlns:a16="http://schemas.microsoft.com/office/drawing/2014/main" id="{7D655161-1E84-7CF0-EF01-A60208EF61BF}"/>
+            </a:ext>
+          </a:extLst>
+        </p:cNvPr>
+        <p:cNvGrpSpPr/>
+        <p:nvPr/>
+      </p:nvGrpSpPr>
+      <p:grpSpPr>
+        <a:xfrm>
+          <a:off x="0" y="0"/>
+          <a:ext cx="0" cy="0"/>
+          <a:chOff x="0" y="0"/>
+          <a:chExt cx="0" cy="0"/>
+        </a:xfrm>
+      </p:grpSpPr>
+      <p:sp>
+        <p:nvSpPr>
+          <p:cNvPr id="2" name="Title 1">
+            <a:extLst>
+              <a:ext uri="{FF2B5EF4-FFF2-40B4-BE49-F238E27FC236}">
+                <a16:creationId xmlns:a16="http://schemas.microsoft.com/office/drawing/2014/main" id="{2080D5DC-4C54-A299-6FBB-98861EB4409D}"/>
+              </a:ext>
+            </a:extLst>
+          </p:cNvPr>
+          <p:cNvSpPr>
+            <a:spLocks noGrp="1"/>
+          </p:cNvSpPr>
+          <p:nvPr>
+            <p:ph type="title"/>
+          </p:nvPr>
+        </p:nvSpPr>
+        <p:spPr>
+          <a:xfrm>
+            <a:off x="838200" y="365125"/>
+            <a:ext cx="10515600" cy="1325563"/>
+          </a:xfrm>
+        </p:spPr>
+        <p:txBody>
+          <a:bodyPr>
+            <a:normAutofit/>
+          </a:bodyPr>
+          <a:lstStyle/>
+          <a:p>
+            <a:r>
+              <a:rPr lang="en-US" sz="5400" dirty="0"/>
+              <a:t>References</a:t>
+            </a:r>
+          </a:p>
+        </p:txBody>
+      </p:sp>
+      <p:sp>
+        <p:nvSpPr>
+          <p:cNvPr id="3" name="Content Placeholder 2">
+            <a:extLst>
+              <a:ext uri="{FF2B5EF4-FFF2-40B4-BE49-F238E27FC236}">
+                <a16:creationId xmlns:a16="http://schemas.microsoft.com/office/drawing/2014/main" id="{1A4F51D5-6BC1-1274-8E2F-F3C8FF7076CB}"/>
+              </a:ext>
+            </a:extLst>
+          </p:cNvPr>
+          <p:cNvSpPr>
+            <a:spLocks noGrp="1"/>
+          </p:cNvSpPr>
+          <p:nvPr>
+            <p:ph idx="1"/>
+          </p:nvPr>
+        </p:nvSpPr>
+        <p:spPr>
+          <a:xfrm>
+            <a:off x="838200" y="1929384"/>
+            <a:ext cx="10515600" cy="4251960"/>
+          </a:xfrm>
+        </p:spPr>
+        <p:txBody>
+          <a:bodyPr>
+            <a:normAutofit/>
+          </a:bodyPr>
+          <a:lstStyle/>
+          <a:p>
+            <a:pPr lvl="1"/>
+            <a:r>
+              <a:rPr lang="en-US" sz="1800" dirty="0"/>
+              <a:t>Nathan will do this near the end c:</a:t>
+            </a:r>
+          </a:p>
+        </p:txBody>
+      </p:sp>
+    </p:spTree>
+    <p:extLst>
+      <p:ext uri="{BB962C8B-B14F-4D97-AF65-F5344CB8AC3E}">
+        <p14:creationId xmlns:p14="http://schemas.microsoft.com/office/powerpoint/2010/main" val="992601287"/>
+      </p:ext>
+    </p:extLst>
+  </p:cSld>
+  <p:clrMapOvr>
+    <a:masterClrMapping/>
+  </p:clrMapOvr>
+</p:sld>
+</file>
+
+<file path=ppt/slides/slide22.xml><?xml version="1.0" encoding="utf-8"?>
 <p:sld xmlns:a="http://schemas.openxmlformats.org/drawingml/2006/main" xmlns:r="http://schemas.openxmlformats.org/officeDocument/2006/relationships" xmlns:p="http://schemas.openxmlformats.org/presentationml/2006/main">
   <p:cSld>
     <p:spTree>
@@ -14728,841 +15973,6 @@
     <p:extLst>
       <p:ext uri="{BB962C8B-B14F-4D97-AF65-F5344CB8AC3E}">
         <p14:creationId xmlns:p14="http://schemas.microsoft.com/office/powerpoint/2010/main" val="3288662779"/>
-      </p:ext>
-    </p:extLst>
-  </p:cSld>
-  <p:clrMapOvr>
-    <a:masterClrMapping/>
-  </p:clrMapOvr>
-</p:sld>
-</file>
-
-<file path=ppt/slides/slide2.xml><?xml version="1.0" encoding="utf-8"?>
-<p:sld xmlns:a="http://schemas.openxmlformats.org/drawingml/2006/main" xmlns:r="http://schemas.openxmlformats.org/officeDocument/2006/relationships" xmlns:p="http://schemas.openxmlformats.org/presentationml/2006/main">
-  <p:cSld>
-    <p:bg>
-      <p:bgPr>
-        <a:solidFill>
-          <a:schemeClr val="bg1"/>
-        </a:solidFill>
-        <a:effectLst/>
-      </p:bgPr>
-    </p:bg>
-    <p:spTree>
-      <p:nvGrpSpPr>
-        <p:cNvPr id="1" name=""/>
-        <p:cNvGrpSpPr/>
-        <p:nvPr/>
-      </p:nvGrpSpPr>
-      <p:grpSpPr>
-        <a:xfrm>
-          <a:off x="0" y="0"/>
-          <a:ext cx="0" cy="0"/>
-          <a:chOff x="0" y="0"/>
-          <a:chExt cx="0" cy="0"/>
-        </a:xfrm>
-      </p:grpSpPr>
-      <p:sp useBgFill="1">
-        <p:nvSpPr>
-          <p:cNvPr id="8" name="Rectangle 7">
-            <a:extLst>
-              <a:ext uri="{FF2B5EF4-FFF2-40B4-BE49-F238E27FC236}">
-                <a16:creationId xmlns:a16="http://schemas.microsoft.com/office/drawing/2014/main" id="{100EDD19-6802-4EC3-95CE-CFFAB042CFD6}"/>
-              </a:ext>
-              <a:ext uri="{C183D7F6-B498-43B3-948B-1728B52AA6E4}">
-                <adec:decorative xmlns:adec="http://schemas.microsoft.com/office/drawing/2017/decorative" val="1"/>
-              </a:ext>
-            </a:extLst>
-          </p:cNvPr>
-          <p:cNvSpPr>
-            <a:spLocks noGrp="1" noRot="1" noChangeAspect="1" noMove="1" noResize="1" noEditPoints="1" noAdjustHandles="1" noChangeArrowheads="1" noChangeShapeType="1" noTextEdit="1"/>
-          </p:cNvSpPr>
-          <p:nvPr>
-            <p:extLst>
-              <p:ext uri="{386F3935-93C4-4BCD-93E2-E3B085C9AB24}">
-                <p16:designElem xmlns:p16="http://schemas.microsoft.com/office/powerpoint/2015/main" val="1"/>
-              </p:ext>
-            </p:extLst>
-          </p:nvPr>
-        </p:nvSpPr>
-        <p:spPr>
-          <a:xfrm>
-            <a:off x="0" y="0"/>
-            <a:ext cx="12188952" cy="6858000"/>
-          </a:xfrm>
-          <a:prstGeom prst="rect">
-            <a:avLst/>
-          </a:prstGeom>
-          <a:ln>
-            <a:noFill/>
-          </a:ln>
-        </p:spPr>
-        <p:style>
-          <a:lnRef idx="2">
-            <a:schemeClr val="accent1">
-              <a:shade val="50000"/>
-            </a:schemeClr>
-          </a:lnRef>
-          <a:fillRef idx="1">
-            <a:schemeClr val="accent1"/>
-          </a:fillRef>
-          <a:effectRef idx="0">
-            <a:schemeClr val="accent1"/>
-          </a:effectRef>
-          <a:fontRef idx="minor">
-            <a:schemeClr val="lt1"/>
-          </a:fontRef>
-        </p:style>
-        <p:txBody>
-          <a:bodyPr rtlCol="0" anchor="ctr"/>
-          <a:lstStyle/>
-          <a:p>
-            <a:pPr algn="ctr"/>
-            <a:endParaRPr lang="en-US"/>
-          </a:p>
-        </p:txBody>
-      </p:sp>
-      <p:sp>
-        <p:nvSpPr>
-          <p:cNvPr id="2" name="Title 1">
-            <a:extLst>
-              <a:ext uri="{FF2B5EF4-FFF2-40B4-BE49-F238E27FC236}">
-                <a16:creationId xmlns:a16="http://schemas.microsoft.com/office/drawing/2014/main" id="{DBE75319-DCBD-C53A-118E-BF8F5E5AC2E3}"/>
-              </a:ext>
-            </a:extLst>
-          </p:cNvPr>
-          <p:cNvSpPr>
-            <a:spLocks noGrp="1"/>
-          </p:cNvSpPr>
-          <p:nvPr>
-            <p:ph type="title"/>
-          </p:nvPr>
-        </p:nvSpPr>
-        <p:spPr>
-          <a:xfrm>
-            <a:off x="838200" y="365125"/>
-            <a:ext cx="10515600" cy="1325563"/>
-          </a:xfrm>
-        </p:spPr>
-        <p:txBody>
-          <a:bodyPr>
-            <a:normAutofit/>
-          </a:bodyPr>
-          <a:lstStyle/>
-          <a:p>
-            <a:r>
-              <a:rPr lang="en-US" sz="5400"/>
-              <a:t>Objectives</a:t>
-            </a:r>
-          </a:p>
-        </p:txBody>
-      </p:sp>
-      <p:sp>
-        <p:nvSpPr>
-          <p:cNvPr id="10" name="sketch line">
-            <a:extLst>
-              <a:ext uri="{FF2B5EF4-FFF2-40B4-BE49-F238E27FC236}">
-                <a16:creationId xmlns:a16="http://schemas.microsoft.com/office/drawing/2014/main" id="{DB17E863-922E-4C26-BD64-E8FD41D28661}"/>
-              </a:ext>
-              <a:ext uri="{C183D7F6-B498-43B3-948B-1728B52AA6E4}">
-                <adec:decorative xmlns:adec="http://schemas.microsoft.com/office/drawing/2017/decorative" val="1"/>
-              </a:ext>
-            </a:extLst>
-          </p:cNvPr>
-          <p:cNvSpPr>
-            <a:spLocks noGrp="1" noRot="1" noChangeAspect="1" noMove="1" noResize="1" noEditPoints="1" noAdjustHandles="1" noChangeArrowheads="1" noChangeShapeType="1" noTextEdit="1"/>
-          </p:cNvSpPr>
-          <p:nvPr>
-            <p:extLst>
-              <p:ext uri="{386F3935-93C4-4BCD-93E2-E3B085C9AB24}">
-                <p16:designElem xmlns:p16="http://schemas.microsoft.com/office/powerpoint/2015/main" val="1"/>
-              </p:ext>
-            </p:extLst>
-          </p:nvPr>
-        </p:nvSpPr>
-        <p:spPr>
-          <a:xfrm>
-            <a:off x="669036" y="1677373"/>
-            <a:ext cx="10853928" cy="18288"/>
-          </a:xfrm>
-          <a:custGeom>
-            <a:avLst/>
-            <a:gdLst>
-              <a:gd name="connsiteX0" fmla="*/ 0 w 10853928"/>
-              <a:gd name="connsiteY0" fmla="*/ 0 h 18288"/>
-              <a:gd name="connsiteX1" fmla="*/ 461292 w 10853928"/>
-              <a:gd name="connsiteY1" fmla="*/ 0 h 18288"/>
-              <a:gd name="connsiteX2" fmla="*/ 1139662 w 10853928"/>
-              <a:gd name="connsiteY2" fmla="*/ 0 h 18288"/>
-              <a:gd name="connsiteX3" fmla="*/ 1926572 w 10853928"/>
-              <a:gd name="connsiteY3" fmla="*/ 0 h 18288"/>
-              <a:gd name="connsiteX4" fmla="*/ 2279325 w 10853928"/>
-              <a:gd name="connsiteY4" fmla="*/ 0 h 18288"/>
-              <a:gd name="connsiteX5" fmla="*/ 2632078 w 10853928"/>
-              <a:gd name="connsiteY5" fmla="*/ 0 h 18288"/>
-              <a:gd name="connsiteX6" fmla="*/ 3527527 w 10853928"/>
-              <a:gd name="connsiteY6" fmla="*/ 0 h 18288"/>
-              <a:gd name="connsiteX7" fmla="*/ 4205897 w 10853928"/>
-              <a:gd name="connsiteY7" fmla="*/ 0 h 18288"/>
-              <a:gd name="connsiteX8" fmla="*/ 4558650 w 10853928"/>
-              <a:gd name="connsiteY8" fmla="*/ 0 h 18288"/>
-              <a:gd name="connsiteX9" fmla="*/ 5237020 w 10853928"/>
-              <a:gd name="connsiteY9" fmla="*/ 0 h 18288"/>
-              <a:gd name="connsiteX10" fmla="*/ 6132469 w 10853928"/>
-              <a:gd name="connsiteY10" fmla="*/ 0 h 18288"/>
-              <a:gd name="connsiteX11" fmla="*/ 6702301 w 10853928"/>
-              <a:gd name="connsiteY11" fmla="*/ 0 h 18288"/>
-              <a:gd name="connsiteX12" fmla="*/ 7272132 w 10853928"/>
-              <a:gd name="connsiteY12" fmla="*/ 0 h 18288"/>
-              <a:gd name="connsiteX13" fmla="*/ 7950502 w 10853928"/>
-              <a:gd name="connsiteY13" fmla="*/ 0 h 18288"/>
-              <a:gd name="connsiteX14" fmla="*/ 8737412 w 10853928"/>
-              <a:gd name="connsiteY14" fmla="*/ 0 h 18288"/>
-              <a:gd name="connsiteX15" fmla="*/ 9524322 w 10853928"/>
-              <a:gd name="connsiteY15" fmla="*/ 0 h 18288"/>
-              <a:gd name="connsiteX16" fmla="*/ 10853928 w 10853928"/>
-              <a:gd name="connsiteY16" fmla="*/ 0 h 18288"/>
-              <a:gd name="connsiteX17" fmla="*/ 10853928 w 10853928"/>
-              <a:gd name="connsiteY17" fmla="*/ 18288 h 18288"/>
-              <a:gd name="connsiteX18" fmla="*/ 10392636 w 10853928"/>
-              <a:gd name="connsiteY18" fmla="*/ 18288 h 18288"/>
-              <a:gd name="connsiteX19" fmla="*/ 9497187 w 10853928"/>
-              <a:gd name="connsiteY19" fmla="*/ 18288 h 18288"/>
-              <a:gd name="connsiteX20" fmla="*/ 8818817 w 10853928"/>
-              <a:gd name="connsiteY20" fmla="*/ 18288 h 18288"/>
-              <a:gd name="connsiteX21" fmla="*/ 8466064 w 10853928"/>
-              <a:gd name="connsiteY21" fmla="*/ 18288 h 18288"/>
-              <a:gd name="connsiteX22" fmla="*/ 7787693 w 10853928"/>
-              <a:gd name="connsiteY22" fmla="*/ 18288 h 18288"/>
-              <a:gd name="connsiteX23" fmla="*/ 7217862 w 10853928"/>
-              <a:gd name="connsiteY23" fmla="*/ 18288 h 18288"/>
-              <a:gd name="connsiteX24" fmla="*/ 6648031 w 10853928"/>
-              <a:gd name="connsiteY24" fmla="*/ 18288 h 18288"/>
-              <a:gd name="connsiteX25" fmla="*/ 6078200 w 10853928"/>
-              <a:gd name="connsiteY25" fmla="*/ 18288 h 18288"/>
-              <a:gd name="connsiteX26" fmla="*/ 5508368 w 10853928"/>
-              <a:gd name="connsiteY26" fmla="*/ 18288 h 18288"/>
-              <a:gd name="connsiteX27" fmla="*/ 4721459 w 10853928"/>
-              <a:gd name="connsiteY27" fmla="*/ 18288 h 18288"/>
-              <a:gd name="connsiteX28" fmla="*/ 4043088 w 10853928"/>
-              <a:gd name="connsiteY28" fmla="*/ 18288 h 18288"/>
-              <a:gd name="connsiteX29" fmla="*/ 3690336 w 10853928"/>
-              <a:gd name="connsiteY29" fmla="*/ 18288 h 18288"/>
-              <a:gd name="connsiteX30" fmla="*/ 3120504 w 10853928"/>
-              <a:gd name="connsiteY30" fmla="*/ 18288 h 18288"/>
-              <a:gd name="connsiteX31" fmla="*/ 2333595 w 10853928"/>
-              <a:gd name="connsiteY31" fmla="*/ 18288 h 18288"/>
-              <a:gd name="connsiteX32" fmla="*/ 1872303 w 10853928"/>
-              <a:gd name="connsiteY32" fmla="*/ 18288 h 18288"/>
-              <a:gd name="connsiteX33" fmla="*/ 976854 w 10853928"/>
-              <a:gd name="connsiteY33" fmla="*/ 18288 h 18288"/>
-              <a:gd name="connsiteX34" fmla="*/ 0 w 10853928"/>
-              <a:gd name="connsiteY34" fmla="*/ 18288 h 18288"/>
-              <a:gd name="connsiteX35" fmla="*/ 0 w 10853928"/>
-              <a:gd name="connsiteY35" fmla="*/ 0 h 18288"/>
-            </a:gdLst>
-            <a:ahLst/>
-            <a:cxnLst>
-              <a:cxn ang="0">
-                <a:pos x="connsiteX0" y="connsiteY0"/>
-              </a:cxn>
-              <a:cxn ang="0">
-                <a:pos x="connsiteX1" y="connsiteY1"/>
-              </a:cxn>
-              <a:cxn ang="0">
-                <a:pos x="connsiteX2" y="connsiteY2"/>
-              </a:cxn>
-              <a:cxn ang="0">
-                <a:pos x="connsiteX3" y="connsiteY3"/>
-              </a:cxn>
-              <a:cxn ang="0">
-                <a:pos x="connsiteX4" y="connsiteY4"/>
-              </a:cxn>
-              <a:cxn ang="0">
-                <a:pos x="connsiteX5" y="connsiteY5"/>
-              </a:cxn>
-              <a:cxn ang="0">
-                <a:pos x="connsiteX6" y="connsiteY6"/>
-              </a:cxn>
-              <a:cxn ang="0">
-                <a:pos x="connsiteX7" y="connsiteY7"/>
-              </a:cxn>
-              <a:cxn ang="0">
-                <a:pos x="connsiteX8" y="connsiteY8"/>
-              </a:cxn>
-              <a:cxn ang="0">
-                <a:pos x="connsiteX9" y="connsiteY9"/>
-              </a:cxn>
-              <a:cxn ang="0">
-                <a:pos x="connsiteX10" y="connsiteY10"/>
-              </a:cxn>
-              <a:cxn ang="0">
-                <a:pos x="connsiteX11" y="connsiteY11"/>
-              </a:cxn>
-              <a:cxn ang="0">
-                <a:pos x="connsiteX12" y="connsiteY12"/>
-              </a:cxn>
-              <a:cxn ang="0">
-                <a:pos x="connsiteX13" y="connsiteY13"/>
-              </a:cxn>
-              <a:cxn ang="0">
-                <a:pos x="connsiteX14" y="connsiteY14"/>
-              </a:cxn>
-              <a:cxn ang="0">
-                <a:pos x="connsiteX15" y="connsiteY15"/>
-              </a:cxn>
-              <a:cxn ang="0">
-                <a:pos x="connsiteX16" y="connsiteY16"/>
-              </a:cxn>
-              <a:cxn ang="0">
-                <a:pos x="connsiteX17" y="connsiteY17"/>
-              </a:cxn>
-              <a:cxn ang="0">
-                <a:pos x="connsiteX18" y="connsiteY18"/>
-              </a:cxn>
-              <a:cxn ang="0">
-                <a:pos x="connsiteX19" y="connsiteY19"/>
-              </a:cxn>
-              <a:cxn ang="0">
-                <a:pos x="connsiteX20" y="connsiteY20"/>
-              </a:cxn>
-              <a:cxn ang="0">
-                <a:pos x="connsiteX21" y="connsiteY21"/>
-              </a:cxn>
-              <a:cxn ang="0">
-                <a:pos x="connsiteX22" y="connsiteY22"/>
-              </a:cxn>
-              <a:cxn ang="0">
-                <a:pos x="connsiteX23" y="connsiteY23"/>
-              </a:cxn>
-              <a:cxn ang="0">
-                <a:pos x="connsiteX24" y="connsiteY24"/>
-              </a:cxn>
-              <a:cxn ang="0">
-                <a:pos x="connsiteX25" y="connsiteY25"/>
-              </a:cxn>
-              <a:cxn ang="0">
-                <a:pos x="connsiteX26" y="connsiteY26"/>
-              </a:cxn>
-              <a:cxn ang="0">
-                <a:pos x="connsiteX27" y="connsiteY27"/>
-              </a:cxn>
-              <a:cxn ang="0">
-                <a:pos x="connsiteX28" y="connsiteY28"/>
-              </a:cxn>
-              <a:cxn ang="0">
-                <a:pos x="connsiteX29" y="connsiteY29"/>
-              </a:cxn>
-              <a:cxn ang="0">
-                <a:pos x="connsiteX30" y="connsiteY30"/>
-              </a:cxn>
-              <a:cxn ang="0">
-                <a:pos x="connsiteX31" y="connsiteY31"/>
-              </a:cxn>
-              <a:cxn ang="0">
-                <a:pos x="connsiteX32" y="connsiteY32"/>
-              </a:cxn>
-              <a:cxn ang="0">
-                <a:pos x="connsiteX33" y="connsiteY33"/>
-              </a:cxn>
-              <a:cxn ang="0">
-                <a:pos x="connsiteX34" y="connsiteY34"/>
-              </a:cxn>
-              <a:cxn ang="0">
-                <a:pos x="connsiteX35" y="connsiteY35"/>
-              </a:cxn>
-            </a:cxnLst>
-            <a:rect l="l" t="t" r="r" b="b"/>
-            <a:pathLst>
-              <a:path w="10853928" h="18288" fill="none" extrusionOk="0">
-                <a:moveTo>
-                  <a:pt x="0" y="0"/>
-                </a:moveTo>
-                <a:cubicBezTo>
-                  <a:pt x="146993" y="-19076"/>
-                  <a:pt x="347684" y="-4790"/>
-                  <a:pt x="461292" y="0"/>
-                </a:cubicBezTo>
-                <a:cubicBezTo>
-                  <a:pt x="574900" y="4790"/>
-                  <a:pt x="808367" y="19821"/>
-                  <a:pt x="1139662" y="0"/>
-                </a:cubicBezTo>
-                <a:cubicBezTo>
-                  <a:pt x="1470957" y="-19821"/>
-                  <a:pt x="1627405" y="5721"/>
-                  <a:pt x="1926572" y="0"/>
-                </a:cubicBezTo>
-                <a:cubicBezTo>
-                  <a:pt x="2225739" y="-5721"/>
-                  <a:pt x="2137730" y="-3235"/>
-                  <a:pt x="2279325" y="0"/>
-                </a:cubicBezTo>
-                <a:cubicBezTo>
-                  <a:pt x="2420920" y="3235"/>
-                  <a:pt x="2456518" y="9685"/>
-                  <a:pt x="2632078" y="0"/>
-                </a:cubicBezTo>
-                <a:cubicBezTo>
-                  <a:pt x="2807638" y="-9685"/>
-                  <a:pt x="3211516" y="-43007"/>
-                  <a:pt x="3527527" y="0"/>
-                </a:cubicBezTo>
-                <a:cubicBezTo>
-                  <a:pt x="3843538" y="43007"/>
-                  <a:pt x="4058833" y="22042"/>
-                  <a:pt x="4205897" y="0"/>
-                </a:cubicBezTo>
-                <a:cubicBezTo>
-                  <a:pt x="4352961" y="-22042"/>
-                  <a:pt x="4474805" y="-11846"/>
-                  <a:pt x="4558650" y="0"/>
-                </a:cubicBezTo>
-                <a:cubicBezTo>
-                  <a:pt x="4642495" y="11846"/>
-                  <a:pt x="5041928" y="-6069"/>
-                  <a:pt x="5237020" y="0"/>
-                </a:cubicBezTo>
-                <a:cubicBezTo>
-                  <a:pt x="5432112" y="6069"/>
-                  <a:pt x="5943266" y="-17479"/>
-                  <a:pt x="6132469" y="0"/>
-                </a:cubicBezTo>
-                <a:cubicBezTo>
-                  <a:pt x="6321672" y="17479"/>
-                  <a:pt x="6483872" y="26234"/>
-                  <a:pt x="6702301" y="0"/>
-                </a:cubicBezTo>
-                <a:cubicBezTo>
-                  <a:pt x="6920730" y="-26234"/>
-                  <a:pt x="6991194" y="-15156"/>
-                  <a:pt x="7272132" y="0"/>
-                </a:cubicBezTo>
-                <a:cubicBezTo>
-                  <a:pt x="7553070" y="15156"/>
-                  <a:pt x="7684444" y="-32961"/>
-                  <a:pt x="7950502" y="0"/>
-                </a:cubicBezTo>
-                <a:cubicBezTo>
-                  <a:pt x="8216560" y="32961"/>
-                  <a:pt x="8493290" y="-10491"/>
-                  <a:pt x="8737412" y="0"/>
-                </a:cubicBezTo>
-                <a:cubicBezTo>
-                  <a:pt x="8981534" y="10491"/>
-                  <a:pt x="9191586" y="-13899"/>
-                  <a:pt x="9524322" y="0"/>
-                </a:cubicBezTo>
-                <a:cubicBezTo>
-                  <a:pt x="9857058" y="13899"/>
-                  <a:pt x="10297509" y="7485"/>
-                  <a:pt x="10853928" y="0"/>
-                </a:cubicBezTo>
-                <a:cubicBezTo>
-                  <a:pt x="10854574" y="4451"/>
-                  <a:pt x="10854418" y="9226"/>
-                  <a:pt x="10853928" y="18288"/>
-                </a:cubicBezTo>
-                <a:cubicBezTo>
-                  <a:pt x="10691638" y="28522"/>
-                  <a:pt x="10574319" y="29578"/>
-                  <a:pt x="10392636" y="18288"/>
-                </a:cubicBezTo>
-                <a:cubicBezTo>
-                  <a:pt x="10210953" y="6998"/>
-                  <a:pt x="9836277" y="-16742"/>
-                  <a:pt x="9497187" y="18288"/>
-                </a:cubicBezTo>
-                <a:cubicBezTo>
-                  <a:pt x="9158097" y="53318"/>
-                  <a:pt x="9119479" y="30714"/>
-                  <a:pt x="8818817" y="18288"/>
-                </a:cubicBezTo>
-                <a:cubicBezTo>
-                  <a:pt x="8518155" y="5863"/>
-                  <a:pt x="8640037" y="6483"/>
-                  <a:pt x="8466064" y="18288"/>
-                </a:cubicBezTo>
-                <a:cubicBezTo>
-                  <a:pt x="8292091" y="30093"/>
-                  <a:pt x="7997656" y="18914"/>
-                  <a:pt x="7787693" y="18288"/>
-                </a:cubicBezTo>
-                <a:cubicBezTo>
-                  <a:pt x="7577730" y="17662"/>
-                  <a:pt x="7412468" y="21416"/>
-                  <a:pt x="7217862" y="18288"/>
-                </a:cubicBezTo>
-                <a:cubicBezTo>
-                  <a:pt x="7023256" y="15160"/>
-                  <a:pt x="6898018" y="14824"/>
-                  <a:pt x="6648031" y="18288"/>
-                </a:cubicBezTo>
-                <a:cubicBezTo>
-                  <a:pt x="6398044" y="21752"/>
-                  <a:pt x="6254402" y="38625"/>
-                  <a:pt x="6078200" y="18288"/>
-                </a:cubicBezTo>
-                <a:cubicBezTo>
-                  <a:pt x="5901998" y="-2049"/>
-                  <a:pt x="5622886" y="3213"/>
-                  <a:pt x="5508368" y="18288"/>
-                </a:cubicBezTo>
-                <a:cubicBezTo>
-                  <a:pt x="5393850" y="33363"/>
-                  <a:pt x="5036260" y="26830"/>
-                  <a:pt x="4721459" y="18288"/>
-                </a:cubicBezTo>
-                <a:cubicBezTo>
-                  <a:pt x="4406658" y="9746"/>
-                  <a:pt x="4239221" y="41551"/>
-                  <a:pt x="4043088" y="18288"/>
-                </a:cubicBezTo>
-                <a:cubicBezTo>
-                  <a:pt x="3846955" y="-4975"/>
-                  <a:pt x="3818802" y="34658"/>
-                  <a:pt x="3690336" y="18288"/>
-                </a:cubicBezTo>
-                <a:cubicBezTo>
-                  <a:pt x="3561870" y="1918"/>
-                  <a:pt x="3265491" y="42194"/>
-                  <a:pt x="3120504" y="18288"/>
-                </a:cubicBezTo>
-                <a:cubicBezTo>
-                  <a:pt x="2975517" y="-5618"/>
-                  <a:pt x="2720254" y="36673"/>
-                  <a:pt x="2333595" y="18288"/>
-                </a:cubicBezTo>
-                <a:cubicBezTo>
-                  <a:pt x="1946936" y="-97"/>
-                  <a:pt x="2097241" y="5776"/>
-                  <a:pt x="1872303" y="18288"/>
-                </a:cubicBezTo>
-                <a:cubicBezTo>
-                  <a:pt x="1647365" y="30800"/>
-                  <a:pt x="1282708" y="45380"/>
-                  <a:pt x="976854" y="18288"/>
-                </a:cubicBezTo>
-                <a:cubicBezTo>
-                  <a:pt x="671000" y="-8804"/>
-                  <a:pt x="408401" y="-12775"/>
-                  <a:pt x="0" y="18288"/>
-                </a:cubicBezTo>
-                <a:cubicBezTo>
-                  <a:pt x="-213" y="9468"/>
-                  <a:pt x="187" y="4459"/>
-                  <a:pt x="0" y="0"/>
-                </a:cubicBezTo>
-                <a:close/>
-              </a:path>
-              <a:path w="10853928" h="18288" stroke="0" extrusionOk="0">
-                <a:moveTo>
-                  <a:pt x="0" y="0"/>
-                </a:moveTo>
-                <a:cubicBezTo>
-                  <a:pt x="267322" y="15284"/>
-                  <a:pt x="415388" y="-21048"/>
-                  <a:pt x="569831" y="0"/>
-                </a:cubicBezTo>
-                <a:cubicBezTo>
-                  <a:pt x="724274" y="21048"/>
-                  <a:pt x="769333" y="-2353"/>
-                  <a:pt x="922584" y="0"/>
-                </a:cubicBezTo>
-                <a:cubicBezTo>
-                  <a:pt x="1075835" y="2353"/>
-                  <a:pt x="1399490" y="-145"/>
-                  <a:pt x="1818033" y="0"/>
-                </a:cubicBezTo>
-                <a:cubicBezTo>
-                  <a:pt x="2236576" y="145"/>
-                  <a:pt x="2145330" y="5482"/>
-                  <a:pt x="2387864" y="0"/>
-                </a:cubicBezTo>
-                <a:cubicBezTo>
-                  <a:pt x="2630398" y="-5482"/>
-                  <a:pt x="2793207" y="18487"/>
-                  <a:pt x="2957695" y="0"/>
-                </a:cubicBezTo>
-                <a:cubicBezTo>
-                  <a:pt x="3122183" y="-18487"/>
-                  <a:pt x="3579141" y="19003"/>
-                  <a:pt x="3853144" y="0"/>
-                </a:cubicBezTo>
-                <a:cubicBezTo>
-                  <a:pt x="4127147" y="-19003"/>
-                  <a:pt x="4209857" y="12211"/>
-                  <a:pt x="4314436" y="0"/>
-                </a:cubicBezTo>
-                <a:cubicBezTo>
-                  <a:pt x="4419015" y="-12211"/>
-                  <a:pt x="4762459" y="-17220"/>
-                  <a:pt x="5209885" y="0"/>
-                </a:cubicBezTo>
-                <a:cubicBezTo>
-                  <a:pt x="5657311" y="17220"/>
-                  <a:pt x="5692663" y="-3290"/>
-                  <a:pt x="6105335" y="0"/>
-                </a:cubicBezTo>
-                <a:cubicBezTo>
-                  <a:pt x="6518007" y="3290"/>
-                  <a:pt x="6455516" y="-5124"/>
-                  <a:pt x="6783705" y="0"/>
-                </a:cubicBezTo>
-                <a:cubicBezTo>
-                  <a:pt x="7111894" y="5124"/>
-                  <a:pt x="7441941" y="-17829"/>
-                  <a:pt x="7679154" y="0"/>
-                </a:cubicBezTo>
-                <a:cubicBezTo>
-                  <a:pt x="7916367" y="17829"/>
-                  <a:pt x="8102967" y="-24363"/>
-                  <a:pt x="8248985" y="0"/>
-                </a:cubicBezTo>
-                <a:cubicBezTo>
-                  <a:pt x="8395003" y="24363"/>
-                  <a:pt x="8552393" y="25505"/>
-                  <a:pt x="8818817" y="0"/>
-                </a:cubicBezTo>
-                <a:cubicBezTo>
-                  <a:pt x="9085241" y="-25505"/>
-                  <a:pt x="9411308" y="38000"/>
-                  <a:pt x="9605726" y="0"/>
-                </a:cubicBezTo>
-                <a:cubicBezTo>
-                  <a:pt x="9800144" y="-38000"/>
-                  <a:pt x="10006468" y="-25741"/>
-                  <a:pt x="10175558" y="0"/>
-                </a:cubicBezTo>
-                <a:cubicBezTo>
-                  <a:pt x="10344648" y="25741"/>
-                  <a:pt x="10696282" y="695"/>
-                  <a:pt x="10853928" y="0"/>
-                </a:cubicBezTo>
-                <a:cubicBezTo>
-                  <a:pt x="10853521" y="8690"/>
-                  <a:pt x="10853774" y="14141"/>
-                  <a:pt x="10853928" y="18288"/>
-                </a:cubicBezTo>
-                <a:cubicBezTo>
-                  <a:pt x="10608124" y="24255"/>
-                  <a:pt x="10343415" y="22307"/>
-                  <a:pt x="10067018" y="18288"/>
-                </a:cubicBezTo>
-                <a:cubicBezTo>
-                  <a:pt x="9790621" y="14270"/>
-                  <a:pt x="9843266" y="3564"/>
-                  <a:pt x="9714266" y="18288"/>
-                </a:cubicBezTo>
-                <a:cubicBezTo>
-                  <a:pt x="9585266" y="33012"/>
-                  <a:pt x="9379484" y="1875"/>
-                  <a:pt x="9252974" y="18288"/>
-                </a:cubicBezTo>
-                <a:cubicBezTo>
-                  <a:pt x="9126464" y="34701"/>
-                  <a:pt x="8580678" y="-4904"/>
-                  <a:pt x="8357525" y="18288"/>
-                </a:cubicBezTo>
-                <a:cubicBezTo>
-                  <a:pt x="8134372" y="41480"/>
-                  <a:pt x="7903199" y="26458"/>
-                  <a:pt x="7679154" y="18288"/>
-                </a:cubicBezTo>
-                <a:cubicBezTo>
-                  <a:pt x="7455109" y="10118"/>
-                  <a:pt x="7435944" y="27109"/>
-                  <a:pt x="7217862" y="18288"/>
-                </a:cubicBezTo>
-                <a:cubicBezTo>
-                  <a:pt x="6999780" y="9467"/>
-                  <a:pt x="6680409" y="18985"/>
-                  <a:pt x="6539492" y="18288"/>
-                </a:cubicBezTo>
-                <a:cubicBezTo>
-                  <a:pt x="6398575" y="17592"/>
-                  <a:pt x="6312077" y="33018"/>
-                  <a:pt x="6186739" y="18288"/>
-                </a:cubicBezTo>
-                <a:cubicBezTo>
-                  <a:pt x="6061401" y="3558"/>
-                  <a:pt x="5947033" y="12075"/>
-                  <a:pt x="5833986" y="18288"/>
-                </a:cubicBezTo>
-                <a:cubicBezTo>
-                  <a:pt x="5720939" y="24501"/>
-                  <a:pt x="5482226" y="8586"/>
-                  <a:pt x="5155616" y="18288"/>
-                </a:cubicBezTo>
-                <a:cubicBezTo>
-                  <a:pt x="4829006" y="27991"/>
-                  <a:pt x="4841274" y="29316"/>
-                  <a:pt x="4694324" y="18288"/>
-                </a:cubicBezTo>
-                <a:cubicBezTo>
-                  <a:pt x="4547374" y="7260"/>
-                  <a:pt x="4077675" y="7013"/>
-                  <a:pt x="3907414" y="18288"/>
-                </a:cubicBezTo>
-                <a:cubicBezTo>
-                  <a:pt x="3737153" y="29564"/>
-                  <a:pt x="3538393" y="21630"/>
-                  <a:pt x="3446122" y="18288"/>
-                </a:cubicBezTo>
-                <a:cubicBezTo>
-                  <a:pt x="3353851" y="14946"/>
-                  <a:pt x="2990320" y="-8091"/>
-                  <a:pt x="2659212" y="18288"/>
-                </a:cubicBezTo>
-                <a:cubicBezTo>
-                  <a:pt x="2328104" y="44667"/>
-                  <a:pt x="2427653" y="9607"/>
-                  <a:pt x="2306460" y="18288"/>
-                </a:cubicBezTo>
-                <a:cubicBezTo>
-                  <a:pt x="2185267" y="26969"/>
-                  <a:pt x="1719763" y="3717"/>
-                  <a:pt x="1519550" y="18288"/>
-                </a:cubicBezTo>
-                <a:cubicBezTo>
-                  <a:pt x="1319337" y="32860"/>
-                  <a:pt x="1167371" y="17040"/>
-                  <a:pt x="1058258" y="18288"/>
-                </a:cubicBezTo>
-                <a:cubicBezTo>
-                  <a:pt x="949145" y="19536"/>
-                  <a:pt x="780234" y="31447"/>
-                  <a:pt x="705505" y="18288"/>
-                </a:cubicBezTo>
-                <a:cubicBezTo>
-                  <a:pt x="630776" y="5129"/>
-                  <a:pt x="215796" y="30056"/>
-                  <a:pt x="0" y="18288"/>
-                </a:cubicBezTo>
-                <a:cubicBezTo>
-                  <a:pt x="-53" y="11301"/>
-                  <a:pt x="-649" y="7756"/>
-                  <a:pt x="0" y="0"/>
-                </a:cubicBezTo>
-                <a:close/>
-              </a:path>
-            </a:pathLst>
-          </a:custGeom>
-          <a:solidFill>
-            <a:schemeClr val="accent2"/>
-          </a:solidFill>
-          <a:ln w="41275" cap="rnd">
-            <a:solidFill>
-              <a:schemeClr val="accent2"/>
-            </a:solidFill>
-            <a:round/>
-            <a:extLst>
-              <a:ext uri="{C807C97D-BFC1-408E-A445-0C87EB9F89A2}">
-                <ask:lineSketchStyleProps xmlns:ask="http://schemas.microsoft.com/office/drawing/2018/sketchyshapes" sd="1219033472">
-                  <a:prstGeom prst="rect">
-                    <a:avLst/>
-                  </a:prstGeom>
-                  <ask:type>
-                    <ask:lineSketchFreehand/>
-                  </ask:type>
-                </ask:lineSketchStyleProps>
-              </a:ext>
-            </a:extLst>
-          </a:ln>
-        </p:spPr>
-        <p:style>
-          <a:lnRef idx="2">
-            <a:schemeClr val="accent1">
-              <a:shade val="50000"/>
-            </a:schemeClr>
-          </a:lnRef>
-          <a:fillRef idx="1">
-            <a:schemeClr val="accent1"/>
-          </a:fillRef>
-          <a:effectRef idx="0">
-            <a:schemeClr val="accent1"/>
-          </a:effectRef>
-          <a:fontRef idx="minor">
-            <a:schemeClr val="lt1"/>
-          </a:fontRef>
-        </p:style>
-        <p:txBody>
-          <a:bodyPr rtlCol="0" anchor="ctr"/>
-          <a:lstStyle/>
-          <a:p>
-            <a:pPr algn="ctr"/>
-            <a:endParaRPr lang="en-US"/>
-          </a:p>
-        </p:txBody>
-      </p:sp>
-      <p:sp>
-        <p:nvSpPr>
-          <p:cNvPr id="3" name="Content Placeholder 2">
-            <a:extLst>
-              <a:ext uri="{FF2B5EF4-FFF2-40B4-BE49-F238E27FC236}">
-                <a16:creationId xmlns:a16="http://schemas.microsoft.com/office/drawing/2014/main" id="{21DACDEB-6882-22BF-55E9-76D9F9E5F7B9}"/>
-              </a:ext>
-            </a:extLst>
-          </p:cNvPr>
-          <p:cNvSpPr>
-            <a:spLocks noGrp="1"/>
-          </p:cNvSpPr>
-          <p:nvPr>
-            <p:ph idx="1"/>
-          </p:nvPr>
-        </p:nvSpPr>
-        <p:spPr>
-          <a:xfrm>
-            <a:off x="838200" y="1929384"/>
-            <a:ext cx="10515600" cy="4251960"/>
-          </a:xfrm>
-        </p:spPr>
-        <p:txBody>
-          <a:bodyPr>
-            <a:normAutofit/>
-          </a:bodyPr>
-          <a:lstStyle/>
-          <a:p>
-            <a:r>
-              <a:rPr lang="en-US" sz="2200" dirty="0"/>
-              <a:t>Design and build a traditional flight computer for Wildcat Rocketry</a:t>
-            </a:r>
-          </a:p>
-          <a:p>
-            <a:r>
-              <a:rPr lang="en-US" sz="2200" dirty="0"/>
-              <a:t>Be able to receive data during flight.</a:t>
-            </a:r>
-          </a:p>
-          <a:p>
-            <a:r>
-              <a:rPr lang="en-US" sz="2200" dirty="0"/>
-              <a:t>Accurately display flight data via </a:t>
-            </a:r>
-            <a:r>
-              <a:rPr lang="en-US" sz="2200" dirty="0" err="1"/>
-              <a:t>WiFi</a:t>
-            </a:r>
-            <a:r>
-              <a:rPr lang="en-US" sz="2200" dirty="0"/>
-              <a:t> or data export USB.</a:t>
-            </a:r>
-          </a:p>
-          <a:p>
-            <a:endParaRPr lang="en-US" sz="2200" dirty="0"/>
-          </a:p>
-          <a:p>
-            <a:r>
-              <a:rPr lang="en-US" sz="2200" dirty="0"/>
-              <a:t>POSSIBLY ADD PICTURE</a:t>
-            </a:r>
-          </a:p>
-        </p:txBody>
-      </p:sp>
-    </p:spTree>
-    <p:extLst>
-      <p:ext uri="{BB962C8B-B14F-4D97-AF65-F5344CB8AC3E}">
-        <p14:creationId xmlns:p14="http://schemas.microsoft.com/office/powerpoint/2010/main" val="1272993298"/>
       </p:ext>
     </p:extLst>
   </p:cSld>
@@ -20282,7 +20692,7 @@
           </a:p>
           <a:p>
             <a:r>
-              <a:rPr lang="en-US" sz="2200"/>
+              <a:rPr lang="en-US" sz="2200" dirty="0"/>
               <a:t>Used in application such as Tablets and VR/AR motion trackers</a:t>
             </a:r>
           </a:p>
@@ -20320,7 +20730,7 @@
         </p:blipFill>
         <p:spPr bwMode="auto">
           <a:xfrm>
-            <a:off x="8155963" y="329183"/>
+            <a:off x="8293608" y="1714015"/>
             <a:ext cx="3429969" cy="3429969"/>
           </a:xfrm>
           <a:prstGeom prst="rect">
@@ -20338,36 +20748,6 @@
           </a:extLst>
         </p:spPr>
       </p:pic>
-      <p:pic>
-        <p:nvPicPr>
-          <p:cNvPr id="5" name="Picture 4" descr="A computer screen shot of a circuit&#10;&#10;Description automatically generated">
-            <a:extLst>
-              <a:ext uri="{FF2B5EF4-FFF2-40B4-BE49-F238E27FC236}">
-                <a16:creationId xmlns:a16="http://schemas.microsoft.com/office/drawing/2014/main" id="{9F63B1EE-859C-7168-CB55-9529C9B78241}"/>
-              </a:ext>
-            </a:extLst>
-          </p:cNvPr>
-          <p:cNvPicPr>
-            <a:picLocks noChangeAspect="1"/>
-          </p:cNvPicPr>
-          <p:nvPr/>
-        </p:nvPicPr>
-        <p:blipFill>
-          <a:blip r:embed="rId4"/>
-          <a:stretch>
-            <a:fillRect/>
-          </a:stretch>
-        </p:blipFill>
-        <p:spPr>
-          <a:xfrm>
-            <a:off x="8092477" y="4079193"/>
-            <a:ext cx="3538653" cy="2176272"/>
-          </a:xfrm>
-          <a:prstGeom prst="rect">
-            <a:avLst/>
-          </a:prstGeom>
-        </p:spPr>
-      </p:pic>
     </p:spTree>
     <p:extLst>
       <p:ext uri="{BB962C8B-B14F-4D97-AF65-F5344CB8AC3E}">
@@ -20382,6 +20762,75 @@
 </file>
 
 <file path=ppt/slides/slide8.xml><?xml version="1.0" encoding="utf-8"?>
+<p:sld xmlns:a="http://schemas.openxmlformats.org/drawingml/2006/main" xmlns:r="http://schemas.openxmlformats.org/officeDocument/2006/relationships" xmlns:p="http://schemas.openxmlformats.org/presentationml/2006/main">
+  <p:cSld>
+    <p:bg>
+      <p:bgPr>
+        <a:solidFill>
+          <a:schemeClr val="bg1"/>
+        </a:solidFill>
+        <a:effectLst/>
+      </p:bgPr>
+    </p:bg>
+    <p:spTree>
+      <p:nvGrpSpPr>
+        <p:cNvPr id="1" name=""/>
+        <p:cNvGrpSpPr/>
+        <p:nvPr/>
+      </p:nvGrpSpPr>
+      <p:grpSpPr>
+        <a:xfrm>
+          <a:off x="0" y="0"/>
+          <a:ext cx="0" cy="0"/>
+          <a:chOff x="0" y="0"/>
+          <a:chExt cx="0" cy="0"/>
+        </a:xfrm>
+      </p:grpSpPr>
+      <p:pic>
+        <p:nvPicPr>
+          <p:cNvPr id="4" name="Content Placeholder 3" descr="A computer screen shot of a circuit&#10;&#10;Description automatically generated">
+            <a:extLst>
+              <a:ext uri="{FF2B5EF4-FFF2-40B4-BE49-F238E27FC236}">
+                <a16:creationId xmlns:a16="http://schemas.microsoft.com/office/drawing/2014/main" id="{F752718D-71AA-0A27-1F24-5862ED09A5E7}"/>
+              </a:ext>
+            </a:extLst>
+          </p:cNvPr>
+          <p:cNvPicPr>
+            <a:picLocks noGrp="1" noChangeAspect="1"/>
+          </p:cNvPicPr>
+          <p:nvPr>
+            <p:ph idx="1"/>
+          </p:nvPr>
+        </p:nvPicPr>
+        <p:blipFill>
+          <a:blip r:embed="rId2"/>
+          <a:srcRect t="5495" r="-2" b="3089"/>
+          <a:stretch/>
+        </p:blipFill>
+        <p:spPr>
+          <a:xfrm>
+            <a:off x="-6588" y="10"/>
+            <a:ext cx="12198588" cy="6857990"/>
+          </a:xfrm>
+          <a:prstGeom prst="rect">
+            <a:avLst/>
+          </a:prstGeom>
+        </p:spPr>
+      </p:pic>
+    </p:spTree>
+    <p:extLst>
+      <p:ext uri="{BB962C8B-B14F-4D97-AF65-F5344CB8AC3E}">
+        <p14:creationId xmlns:p14="http://schemas.microsoft.com/office/powerpoint/2010/main" val="2330902240"/>
+      </p:ext>
+    </p:extLst>
+  </p:cSld>
+  <p:clrMapOvr>
+    <a:masterClrMapping/>
+  </p:clrMapOvr>
+</p:sld>
+</file>
+
+<file path=ppt/slides/slide9.xml><?xml version="1.0" encoding="utf-8"?>
 <p:sld xmlns:a="http://schemas.openxmlformats.org/drawingml/2006/main" xmlns:r="http://schemas.openxmlformats.org/officeDocument/2006/relationships" xmlns:p="http://schemas.openxmlformats.org/presentationml/2006/main">
   <p:cSld>
     <p:bg>
@@ -20501,7 +20950,7 @@
           <a:lstStyle/>
           <a:p>
             <a:r>
-              <a:rPr lang="en-US" sz="5000"/>
+              <a:rPr lang="en-US" sz="5000" dirty="0"/>
               <a:t>Approach – PCB Design</a:t>
             </a:r>
           </a:p>
@@ -20827,232 +21276,72 @@
           </a:p>
         </p:txBody>
       </p:sp>
-      <p:pic>
-        <p:nvPicPr>
-          <p:cNvPr id="5" name="Picture 4" descr="A computer screen shot of a diagram&#10;&#10;Description automatically generated">
+      <p:sp>
+        <p:nvSpPr>
+          <p:cNvPr id="4" name="Title 1">
             <a:extLst>
               <a:ext uri="{FF2B5EF4-FFF2-40B4-BE49-F238E27FC236}">
-                <a16:creationId xmlns:a16="http://schemas.microsoft.com/office/drawing/2014/main" id="{D3012773-2183-4CA5-C708-D0CD447D1D8D}"/>
+                <a16:creationId xmlns:a16="http://schemas.microsoft.com/office/drawing/2014/main" id="{5627FFDC-0B3E-65D7-4216-A6867E2CD6E1}"/>
               </a:ext>
             </a:extLst>
           </p:cNvPr>
-          <p:cNvPicPr>
-            <a:picLocks noChangeAspect="1"/>
-          </p:cNvPicPr>
+          <p:cNvSpPr txBox="1">
+            <a:spLocks/>
+          </p:cNvSpPr>
           <p:nvPr/>
-        </p:nvPicPr>
-        <p:blipFill>
-          <a:blip r:embed="rId2"/>
-          <a:stretch>
-            <a:fillRect/>
-          </a:stretch>
-        </p:blipFill>
+        </p:nvSpPr>
         <p:spPr>
           <a:xfrm>
-            <a:off x="4654296" y="1047217"/>
-            <a:ext cx="6903720" cy="4763566"/>
+            <a:off x="6227694" y="1732508"/>
+            <a:ext cx="3429000" cy="1719072"/>
           </a:xfrm>
           <a:prstGeom prst="rect">
             <a:avLst/>
           </a:prstGeom>
         </p:spPr>
-      </p:pic>
+        <p:txBody>
+          <a:bodyPr vert="horz" lIns="91440" tIns="45720" rIns="91440" bIns="45720" rtlCol="0" anchor="b">
+            <a:normAutofit fontScale="47500" lnSpcReduction="20000"/>
+          </a:bodyPr>
+          <a:lstStyle>
+            <a:lvl1pPr algn="l" defTabSz="914400" rtl="0" eaLnBrk="1" latinLnBrk="0" hangingPunct="1">
+              <a:lnSpc>
+                <a:spcPct val="90000"/>
+              </a:lnSpc>
+              <a:spcBef>
+                <a:spcPct val="0"/>
+              </a:spcBef>
+              <a:buNone/>
+              <a:defRPr sz="4400" kern="1200">
+                <a:solidFill>
+                  <a:schemeClr val="tx1"/>
+                </a:solidFill>
+                <a:latin typeface="+mj-lt"/>
+                <a:ea typeface="+mj-ea"/>
+                <a:cs typeface="+mj-cs"/>
+              </a:defRPr>
+            </a:lvl1pPr>
+          </a:lstStyle>
+          <a:p>
+            <a:r>
+              <a:rPr lang="en-US" sz="5000" dirty="0"/>
+              <a:t>Picture or just make text across screen. Moved the schematic to its own slide to make it readable-</a:t>
+            </a:r>
+            <a:r>
+              <a:rPr lang="en-US" sz="5000" dirty="0" err="1"/>
+              <a:t>ish</a:t>
+            </a:r>
+            <a:r>
+              <a:rPr lang="en-US" sz="5000" dirty="0"/>
+              <a:t> during presentation.</a:t>
+            </a:r>
+          </a:p>
+        </p:txBody>
+      </p:sp>
     </p:spTree>
     <p:extLst>
       <p:ext uri="{BB962C8B-B14F-4D97-AF65-F5344CB8AC3E}">
         <p14:creationId xmlns:p14="http://schemas.microsoft.com/office/powerpoint/2010/main" val="885690854"/>
-      </p:ext>
-    </p:extLst>
-  </p:cSld>
-  <p:clrMapOvr>
-    <a:masterClrMapping/>
-  </p:clrMapOvr>
-</p:sld>
-</file>
-
-<file path=ppt/slides/slide9.xml><?xml version="1.0" encoding="utf-8"?>
-<p:sld xmlns:a="http://schemas.openxmlformats.org/drawingml/2006/main" xmlns:r="http://schemas.openxmlformats.org/officeDocument/2006/relationships" xmlns:p="http://schemas.openxmlformats.org/presentationml/2006/main">
-  <p:cSld>
-    <p:bg>
-      <p:bgPr>
-        <a:solidFill>
-          <a:schemeClr val="bg1"/>
-        </a:solidFill>
-        <a:effectLst/>
-      </p:bgPr>
-    </p:bg>
-    <p:spTree>
-      <p:nvGrpSpPr>
-        <p:cNvPr id="1" name="">
-          <a:extLst>
-            <a:ext uri="{FF2B5EF4-FFF2-40B4-BE49-F238E27FC236}">
-              <a16:creationId xmlns:a16="http://schemas.microsoft.com/office/drawing/2014/main" id="{91272F61-320A-7B2D-0418-6BE491B5CEA2}"/>
-            </a:ext>
-          </a:extLst>
-        </p:cNvPr>
-        <p:cNvGrpSpPr/>
-        <p:nvPr/>
-      </p:nvGrpSpPr>
-      <p:grpSpPr>
-        <a:xfrm>
-          <a:off x="0" y="0"/>
-          <a:ext cx="0" cy="0"/>
-          <a:chOff x="0" y="0"/>
-          <a:chExt cx="0" cy="0"/>
-        </a:xfrm>
-      </p:grpSpPr>
-      <p:sp>
-        <p:nvSpPr>
-          <p:cNvPr id="15" name="Down Arrow 7">
-            <a:extLst>
-              <a:ext uri="{FF2B5EF4-FFF2-40B4-BE49-F238E27FC236}">
-                <a16:creationId xmlns:a16="http://schemas.microsoft.com/office/drawing/2014/main" id="{D4771268-CB57-404A-9271-370EB28F6090}"/>
-              </a:ext>
-              <a:ext uri="{C183D7F6-B498-43B3-948B-1728B52AA6E4}">
-                <adec:decorative xmlns:adec="http://schemas.microsoft.com/office/drawing/2017/decorative" val="1"/>
-              </a:ext>
-            </a:extLst>
-          </p:cNvPr>
-          <p:cNvSpPr>
-            <a:spLocks noGrp="1" noRot="1" noChangeAspect="1" noMove="1" noResize="1" noEditPoints="1" noAdjustHandles="1" noChangeArrowheads="1" noChangeShapeType="1" noTextEdit="1"/>
-          </p:cNvSpPr>
-          <p:nvPr>
-            <p:extLst>
-              <p:ext uri="{386F3935-93C4-4BCD-93E2-E3B085C9AB24}">
-                <p16:designElem xmlns:p16="http://schemas.microsoft.com/office/powerpoint/2015/main" val="1"/>
-              </p:ext>
-            </p:extLst>
-          </p:nvPr>
-        </p:nvSpPr>
-        <p:spPr>
-          <a:xfrm rot="16200000">
-            <a:off x="800100" y="1491343"/>
-            <a:ext cx="3333749" cy="3499103"/>
-          </a:xfrm>
-          <a:prstGeom prst="downArrow">
-            <a:avLst>
-              <a:gd name="adj1" fmla="val 100000"/>
-              <a:gd name="adj2" fmla="val 15788"/>
-            </a:avLst>
-          </a:prstGeom>
-          <a:solidFill>
-            <a:srgbClr val="404040"/>
-          </a:solidFill>
-          <a:ln w="53975">
-            <a:noFill/>
-          </a:ln>
-        </p:spPr>
-        <p:style>
-          <a:lnRef idx="2">
-            <a:schemeClr val="accent1">
-              <a:shade val="50000"/>
-            </a:schemeClr>
-          </a:lnRef>
-          <a:fillRef idx="1">
-            <a:schemeClr val="accent1"/>
-          </a:fillRef>
-          <a:effectRef idx="0">
-            <a:schemeClr val="accent1"/>
-          </a:effectRef>
-          <a:fontRef idx="minor">
-            <a:schemeClr val="lt1"/>
-          </a:fontRef>
-        </p:style>
-        <p:txBody>
-          <a:bodyPr rtlCol="0" anchor="ctr"/>
-          <a:lstStyle/>
-          <a:p>
-            <a:pPr algn="ctr"/>
-            <a:endParaRPr lang="en-US"/>
-          </a:p>
-        </p:txBody>
-      </p:sp>
-      <p:sp>
-        <p:nvSpPr>
-          <p:cNvPr id="2" name="Title 1">
-            <a:extLst>
-              <a:ext uri="{FF2B5EF4-FFF2-40B4-BE49-F238E27FC236}">
-                <a16:creationId xmlns:a16="http://schemas.microsoft.com/office/drawing/2014/main" id="{B503C663-34EE-AD0C-3644-4A946BB57285}"/>
-              </a:ext>
-            </a:extLst>
-          </p:cNvPr>
-          <p:cNvSpPr>
-            <a:spLocks noGrp="1"/>
-          </p:cNvSpPr>
-          <p:nvPr>
-            <p:ph type="title"/>
-          </p:nvPr>
-        </p:nvSpPr>
-        <p:spPr>
-          <a:xfrm>
-            <a:off x="1028700" y="1967266"/>
-            <a:ext cx="2628900" cy="2547257"/>
-          </a:xfrm>
-          <a:noFill/>
-        </p:spPr>
-        <p:txBody>
-          <a:bodyPr vert="horz" lIns="91440" tIns="45720" rIns="91440" bIns="45720" rtlCol="0" anchor="ctr">
-            <a:normAutofit/>
-          </a:bodyPr>
-          <a:lstStyle/>
-          <a:p>
-            <a:pPr algn="ctr"/>
-            <a:r>
-              <a:rPr lang="en-US" sz="3600" kern="1200" dirty="0">
-                <a:solidFill>
-                  <a:srgbClr val="FFFFFF"/>
-                </a:solidFill>
-                <a:latin typeface="+mj-lt"/>
-                <a:ea typeface="+mj-ea"/>
-                <a:cs typeface="+mj-cs"/>
-              </a:rPr>
-              <a:t>Approach – Code Block Diagram </a:t>
-            </a:r>
-          </a:p>
-        </p:txBody>
-      </p:sp>
-      <p:pic>
-        <p:nvPicPr>
-          <p:cNvPr id="5" name="Content Placeholder 4">
-            <a:extLst>
-              <a:ext uri="{FF2B5EF4-FFF2-40B4-BE49-F238E27FC236}">
-                <a16:creationId xmlns:a16="http://schemas.microsoft.com/office/drawing/2014/main" id="{9BE5538A-12FB-7DE9-2D7F-81657C72626A}"/>
-              </a:ext>
-            </a:extLst>
-          </p:cNvPr>
-          <p:cNvPicPr>
-            <a:picLocks noGrp="1" noChangeAspect="1"/>
-          </p:cNvPicPr>
-          <p:nvPr>
-            <p:ph idx="1"/>
-          </p:nvPr>
-        </p:nvPicPr>
-        <p:blipFill>
-          <a:blip r:embed="rId2">
-            <a:extLst>
-              <a:ext uri="{28A0092B-C50C-407E-A947-70E740481C1C}">
-                <a14:useLocalDpi xmlns:a14="http://schemas.microsoft.com/office/drawing/2010/main" val="0"/>
-              </a:ext>
-            </a:extLst>
-          </a:blip>
-          <a:stretch>
-            <a:fillRect/>
-          </a:stretch>
-        </p:blipFill>
-        <p:spPr>
-          <a:xfrm>
-            <a:off x="4815192" y="372965"/>
-            <a:ext cx="6925856" cy="6112069"/>
-          </a:xfrm>
-          <a:prstGeom prst="rect">
-            <a:avLst/>
-          </a:prstGeom>
-        </p:spPr>
-      </p:pic>
-    </p:spTree>
-    <p:extLst>
-      <p:ext uri="{BB962C8B-B14F-4D97-AF65-F5344CB8AC3E}">
-        <p14:creationId xmlns:p14="http://schemas.microsoft.com/office/powerpoint/2010/main" val="236307831"/>
       </p:ext>
     </p:extLst>
   </p:cSld>

</xml_diff>

<commit_message>
updated MCU,PCB design, and budget slides
</commit_message>
<xml_diff>
--- a/Documents/FInal Presentation/Final_Presentation.pptx
+++ b/Documents/FInal Presentation/Final_Presentation.pptx
@@ -136,6 +136,3032 @@
 </p:presentation>
 </file>
 
+<file path=ppt/diagrams/colors1.xml><?xml version="1.0" encoding="utf-8"?>
+<dgm:colorsDef xmlns:dgm="http://schemas.openxmlformats.org/drawingml/2006/diagram" xmlns:a="http://schemas.openxmlformats.org/drawingml/2006/main" uniqueId="urn:microsoft.com/office/officeart/2018/5/colors/Iconchunking_neutralbg_colorful1">
+  <dgm:title val=""/>
+  <dgm:desc val=""/>
+  <dgm:catLst>
+    <dgm:cat type="colorful" pri="10100"/>
+  </dgm:catLst>
+  <dgm:styleLbl name="node0">
+    <dgm:fillClrLst meth="repeat">
+      <a:schemeClr val="accent1"/>
+    </dgm:fillClrLst>
+    <dgm:linClrLst meth="repeat">
+      <a:schemeClr val="lt1"/>
+    </dgm:linClrLst>
+    <dgm:effectClrLst/>
+    <dgm:txLinClrLst/>
+    <dgm:txFillClrLst/>
+    <dgm:txEffectClrLst/>
+  </dgm:styleLbl>
+  <dgm:styleLbl name="node1">
+    <dgm:fillClrLst meth="repeat">
+      <a:schemeClr val="accent2"/>
+      <a:schemeClr val="accent3"/>
+      <a:schemeClr val="accent4"/>
+      <a:schemeClr val="accent5"/>
+      <a:schemeClr val="accent6"/>
+    </dgm:fillClrLst>
+    <dgm:linClrLst meth="repeat">
+      <a:schemeClr val="lt1">
+        <a:alpha val="0"/>
+      </a:schemeClr>
+    </dgm:linClrLst>
+    <dgm:effectClrLst/>
+    <dgm:txLinClrLst/>
+    <dgm:txFillClrLst/>
+    <dgm:txEffectClrLst/>
+  </dgm:styleLbl>
+  <dgm:styleLbl name="alignNode1">
+    <dgm:fillClrLst meth="repeat">
+      <a:schemeClr val="accent2"/>
+      <a:schemeClr val="accent3"/>
+      <a:schemeClr val="accent4"/>
+      <a:schemeClr val="accent5"/>
+      <a:schemeClr val="accent6"/>
+    </dgm:fillClrLst>
+    <dgm:linClrLst meth="repeat">
+      <a:schemeClr val="accent2"/>
+      <a:schemeClr val="accent3"/>
+      <a:schemeClr val="accent4"/>
+      <a:schemeClr val="accent5"/>
+      <a:schemeClr val="accent6"/>
+    </dgm:linClrLst>
+    <dgm:effectClrLst/>
+    <dgm:txLinClrLst/>
+    <dgm:txFillClrLst/>
+    <dgm:txEffectClrLst/>
+  </dgm:styleLbl>
+  <dgm:styleLbl name="lnNode1">
+    <dgm:fillClrLst meth="repeat">
+      <a:schemeClr val="accent2"/>
+      <a:schemeClr val="accent3"/>
+      <a:schemeClr val="accent4"/>
+      <a:schemeClr val="accent5"/>
+      <a:schemeClr val="accent6"/>
+    </dgm:fillClrLst>
+    <dgm:linClrLst meth="repeat">
+      <a:schemeClr val="lt1"/>
+    </dgm:linClrLst>
+    <dgm:effectClrLst/>
+    <dgm:txLinClrLst/>
+    <dgm:txFillClrLst/>
+    <dgm:txEffectClrLst/>
+  </dgm:styleLbl>
+  <dgm:styleLbl name="vennNode1">
+    <dgm:fillClrLst meth="repeat">
+      <a:schemeClr val="accent2">
+        <a:alpha val="50000"/>
+      </a:schemeClr>
+      <a:schemeClr val="accent3">
+        <a:alpha val="50000"/>
+      </a:schemeClr>
+      <a:schemeClr val="accent4">
+        <a:alpha val="50000"/>
+      </a:schemeClr>
+      <a:schemeClr val="accent5">
+        <a:alpha val="50000"/>
+      </a:schemeClr>
+      <a:schemeClr val="accent6">
+        <a:alpha val="50000"/>
+      </a:schemeClr>
+    </dgm:fillClrLst>
+    <dgm:linClrLst meth="repeat">
+      <a:schemeClr val="lt1"/>
+    </dgm:linClrLst>
+    <dgm:effectClrLst/>
+    <dgm:txLinClrLst/>
+    <dgm:txFillClrLst/>
+    <dgm:txEffectClrLst/>
+  </dgm:styleLbl>
+  <dgm:styleLbl name="node2">
+    <dgm:fillClrLst>
+      <a:schemeClr val="accent2"/>
+    </dgm:fillClrLst>
+    <dgm:linClrLst meth="repeat">
+      <a:schemeClr val="lt1"/>
+    </dgm:linClrLst>
+    <dgm:effectClrLst/>
+    <dgm:txLinClrLst/>
+    <dgm:txFillClrLst/>
+    <dgm:txEffectClrLst/>
+  </dgm:styleLbl>
+  <dgm:styleLbl name="node3">
+    <dgm:fillClrLst>
+      <a:schemeClr val="accent3"/>
+    </dgm:fillClrLst>
+    <dgm:linClrLst meth="repeat">
+      <a:schemeClr val="lt1"/>
+    </dgm:linClrLst>
+    <dgm:effectClrLst/>
+    <dgm:txLinClrLst/>
+    <dgm:txFillClrLst/>
+    <dgm:txEffectClrLst/>
+  </dgm:styleLbl>
+  <dgm:styleLbl name="node4">
+    <dgm:fillClrLst>
+      <a:schemeClr val="accent4"/>
+    </dgm:fillClrLst>
+    <dgm:linClrLst meth="repeat">
+      <a:schemeClr val="lt1"/>
+    </dgm:linClrLst>
+    <dgm:effectClrLst/>
+    <dgm:txLinClrLst/>
+    <dgm:txFillClrLst/>
+    <dgm:txEffectClrLst/>
+  </dgm:styleLbl>
+  <dgm:styleLbl name="fgImgPlace1">
+    <dgm:fillClrLst meth="repeat">
+      <a:schemeClr val="accent2">
+        <a:tint val="50000"/>
+      </a:schemeClr>
+      <a:schemeClr val="accent3">
+        <a:tint val="50000"/>
+      </a:schemeClr>
+      <a:schemeClr val="accent4">
+        <a:tint val="50000"/>
+      </a:schemeClr>
+      <a:schemeClr val="accent5">
+        <a:tint val="50000"/>
+      </a:schemeClr>
+      <a:schemeClr val="accent6">
+        <a:tint val="50000"/>
+      </a:schemeClr>
+    </dgm:fillClrLst>
+    <dgm:linClrLst meth="repeat">
+      <a:schemeClr val="lt1"/>
+    </dgm:linClrLst>
+    <dgm:effectClrLst/>
+    <dgm:txLinClrLst/>
+    <dgm:txFillClrLst meth="repeat">
+      <a:schemeClr val="lt1"/>
+    </dgm:txFillClrLst>
+    <dgm:txEffectClrLst/>
+  </dgm:styleLbl>
+  <dgm:styleLbl name="alignImgPlace1">
+    <dgm:fillClrLst>
+      <a:schemeClr val="accent1">
+        <a:tint val="50000"/>
+      </a:schemeClr>
+      <a:schemeClr val="accent2">
+        <a:tint val="20000"/>
+      </a:schemeClr>
+    </dgm:fillClrLst>
+    <dgm:linClrLst meth="repeat">
+      <a:schemeClr val="lt1"/>
+    </dgm:linClrLst>
+    <dgm:effectClrLst/>
+    <dgm:txLinClrLst/>
+    <dgm:txFillClrLst meth="repeat">
+      <a:schemeClr val="lt1"/>
+    </dgm:txFillClrLst>
+    <dgm:txEffectClrLst/>
+  </dgm:styleLbl>
+  <dgm:styleLbl name="bgImgPlace1">
+    <dgm:fillClrLst>
+      <a:schemeClr val="accent1">
+        <a:tint val="50000"/>
+      </a:schemeClr>
+      <a:schemeClr val="accent2">
+        <a:tint val="20000"/>
+      </a:schemeClr>
+    </dgm:fillClrLst>
+    <dgm:linClrLst meth="repeat">
+      <a:schemeClr val="lt1"/>
+    </dgm:linClrLst>
+    <dgm:effectClrLst/>
+    <dgm:txLinClrLst/>
+    <dgm:txFillClrLst meth="repeat">
+      <a:schemeClr val="lt1"/>
+    </dgm:txFillClrLst>
+    <dgm:txEffectClrLst/>
+  </dgm:styleLbl>
+  <dgm:styleLbl name="sibTrans2D1">
+    <dgm:fillClrLst meth="repeat">
+      <a:schemeClr val="accent2"/>
+      <a:schemeClr val="accent3"/>
+      <a:schemeClr val="accent4"/>
+      <a:schemeClr val="accent5"/>
+      <a:schemeClr val="accent6"/>
+    </dgm:fillClrLst>
+    <dgm:linClrLst meth="cycle">
+      <a:schemeClr val="lt1"/>
+    </dgm:linClrLst>
+    <dgm:effectClrLst/>
+    <dgm:txLinClrLst/>
+    <dgm:txFillClrLst/>
+    <dgm:txEffectClrLst/>
+  </dgm:styleLbl>
+  <dgm:styleLbl name="fgSibTrans2D1">
+    <dgm:fillClrLst meth="repeat">
+      <a:schemeClr val="accent2"/>
+      <a:schemeClr val="accent3"/>
+      <a:schemeClr val="accent4"/>
+      <a:schemeClr val="accent5"/>
+      <a:schemeClr val="accent6"/>
+    </dgm:fillClrLst>
+    <dgm:linClrLst meth="cycle">
+      <a:schemeClr val="lt1"/>
+    </dgm:linClrLst>
+    <dgm:effectClrLst/>
+    <dgm:txLinClrLst/>
+    <dgm:txFillClrLst meth="repeat">
+      <a:schemeClr val="lt1"/>
+    </dgm:txFillClrLst>
+    <dgm:txEffectClrLst/>
+  </dgm:styleLbl>
+  <dgm:styleLbl name="bgSibTrans2D1">
+    <dgm:fillClrLst meth="repeat">
+      <a:schemeClr val="accent2"/>
+      <a:schemeClr val="accent3"/>
+      <a:schemeClr val="accent4"/>
+      <a:schemeClr val="accent5"/>
+      <a:schemeClr val="accent6"/>
+    </dgm:fillClrLst>
+    <dgm:linClrLst meth="cycle">
+      <a:schemeClr val="lt1"/>
+    </dgm:linClrLst>
+    <dgm:effectClrLst/>
+    <dgm:txLinClrLst/>
+    <dgm:txFillClrLst meth="repeat">
+      <a:schemeClr val="lt1"/>
+    </dgm:txFillClrLst>
+    <dgm:txEffectClrLst/>
+  </dgm:styleLbl>
+  <dgm:styleLbl name="sibTrans1D1">
+    <dgm:fillClrLst meth="repeat">
+      <a:schemeClr val="accent2"/>
+      <a:schemeClr val="accent3"/>
+      <a:schemeClr val="accent4"/>
+      <a:schemeClr val="accent5"/>
+      <a:schemeClr val="accent6"/>
+    </dgm:fillClrLst>
+    <dgm:linClrLst meth="repeat">
+      <a:schemeClr val="accent2"/>
+      <a:schemeClr val="accent3"/>
+      <a:schemeClr val="accent4"/>
+      <a:schemeClr val="accent5"/>
+      <a:schemeClr val="accent6"/>
+    </dgm:linClrLst>
+    <dgm:effectClrLst/>
+    <dgm:txLinClrLst/>
+    <dgm:txFillClrLst meth="repeat">
+      <a:schemeClr val="tx1"/>
+    </dgm:txFillClrLst>
+    <dgm:txEffectClrLst/>
+  </dgm:styleLbl>
+  <dgm:styleLbl name="callout">
+    <dgm:fillClrLst meth="repeat">
+      <a:schemeClr val="accent2"/>
+    </dgm:fillClrLst>
+    <dgm:linClrLst meth="repeat">
+      <a:schemeClr val="accent2">
+        <a:tint val="50000"/>
+      </a:schemeClr>
+    </dgm:linClrLst>
+    <dgm:effectClrLst/>
+    <dgm:txLinClrLst/>
+    <dgm:txFillClrLst meth="repeat">
+      <a:schemeClr val="tx1"/>
+    </dgm:txFillClrLst>
+    <dgm:txEffectClrLst/>
+  </dgm:styleLbl>
+  <dgm:styleLbl name="asst0">
+    <dgm:fillClrLst meth="repeat">
+      <a:schemeClr val="accent1"/>
+    </dgm:fillClrLst>
+    <dgm:linClrLst meth="repeat">
+      <a:schemeClr val="lt1"/>
+    </dgm:linClrLst>
+    <dgm:effectClrLst/>
+    <dgm:txLinClrLst/>
+    <dgm:txFillClrLst/>
+    <dgm:txEffectClrLst/>
+  </dgm:styleLbl>
+  <dgm:styleLbl name="asst1">
+    <dgm:fillClrLst meth="repeat">
+      <a:schemeClr val="accent2"/>
+    </dgm:fillClrLst>
+    <dgm:linClrLst meth="repeat">
+      <a:schemeClr val="lt1"/>
+    </dgm:linClrLst>
+    <dgm:effectClrLst/>
+    <dgm:txLinClrLst/>
+    <dgm:txFillClrLst/>
+    <dgm:txEffectClrLst/>
+  </dgm:styleLbl>
+  <dgm:styleLbl name="asst2">
+    <dgm:fillClrLst>
+      <a:schemeClr val="accent3"/>
+    </dgm:fillClrLst>
+    <dgm:linClrLst meth="repeat">
+      <a:schemeClr val="lt1"/>
+    </dgm:linClrLst>
+    <dgm:effectClrLst/>
+    <dgm:txLinClrLst/>
+    <dgm:txFillClrLst/>
+    <dgm:txEffectClrLst/>
+  </dgm:styleLbl>
+  <dgm:styleLbl name="asst3">
+    <dgm:fillClrLst>
+      <a:schemeClr val="accent4"/>
+    </dgm:fillClrLst>
+    <dgm:linClrLst meth="repeat">
+      <a:schemeClr val="lt1"/>
+    </dgm:linClrLst>
+    <dgm:effectClrLst/>
+    <dgm:txLinClrLst/>
+    <dgm:txFillClrLst/>
+    <dgm:txEffectClrLst/>
+  </dgm:styleLbl>
+  <dgm:styleLbl name="asst4">
+    <dgm:fillClrLst>
+      <a:schemeClr val="accent5"/>
+    </dgm:fillClrLst>
+    <dgm:linClrLst meth="repeat">
+      <a:schemeClr val="lt1"/>
+    </dgm:linClrLst>
+    <dgm:effectClrLst/>
+    <dgm:txLinClrLst/>
+    <dgm:txFillClrLst/>
+    <dgm:txEffectClrLst/>
+  </dgm:styleLbl>
+  <dgm:styleLbl name="parChTrans2D1">
+    <dgm:fillClrLst meth="repeat">
+      <a:schemeClr val="accent2"/>
+    </dgm:fillClrLst>
+    <dgm:linClrLst meth="repeat">
+      <a:schemeClr val="lt1"/>
+    </dgm:linClrLst>
+    <dgm:effectClrLst/>
+    <dgm:txLinClrLst/>
+    <dgm:txFillClrLst meth="repeat">
+      <a:schemeClr val="lt1"/>
+    </dgm:txFillClrLst>
+    <dgm:txEffectClrLst/>
+  </dgm:styleLbl>
+  <dgm:styleLbl name="parChTrans2D2">
+    <dgm:fillClrLst meth="repeat">
+      <a:schemeClr val="accent3"/>
+    </dgm:fillClrLst>
+    <dgm:linClrLst meth="repeat">
+      <a:schemeClr val="lt1"/>
+    </dgm:linClrLst>
+    <dgm:effectClrLst/>
+    <dgm:txLinClrLst/>
+    <dgm:txFillClrLst/>
+    <dgm:txEffectClrLst/>
+  </dgm:styleLbl>
+  <dgm:styleLbl name="parChTrans2D3">
+    <dgm:fillClrLst meth="repeat">
+      <a:schemeClr val="accent4"/>
+    </dgm:fillClrLst>
+    <dgm:linClrLst meth="repeat">
+      <a:schemeClr val="lt1"/>
+    </dgm:linClrLst>
+    <dgm:effectClrLst/>
+    <dgm:txLinClrLst/>
+    <dgm:txFillClrLst/>
+    <dgm:txEffectClrLst/>
+  </dgm:styleLbl>
+  <dgm:styleLbl name="parChTrans2D4">
+    <dgm:fillClrLst meth="repeat">
+      <a:schemeClr val="accent5"/>
+    </dgm:fillClrLst>
+    <dgm:linClrLst meth="repeat">
+      <a:schemeClr val="lt1"/>
+    </dgm:linClrLst>
+    <dgm:effectClrLst/>
+    <dgm:txLinClrLst/>
+    <dgm:txFillClrLst meth="repeat">
+      <a:schemeClr val="lt1"/>
+    </dgm:txFillClrLst>
+    <dgm:txEffectClrLst/>
+  </dgm:styleLbl>
+  <dgm:styleLbl name="parChTrans1D1">
+    <dgm:fillClrLst meth="repeat">
+      <a:schemeClr val="accent2"/>
+    </dgm:fillClrLst>
+    <dgm:linClrLst meth="repeat">
+      <a:schemeClr val="accent1"/>
+    </dgm:linClrLst>
+    <dgm:effectClrLst/>
+    <dgm:txLinClrLst/>
+    <dgm:txFillClrLst meth="repeat">
+      <a:schemeClr val="tx1"/>
+    </dgm:txFillClrLst>
+    <dgm:txEffectClrLst/>
+  </dgm:styleLbl>
+  <dgm:styleLbl name="parChTrans1D2">
+    <dgm:fillClrLst meth="repeat">
+      <a:schemeClr val="accent3">
+        <a:tint val="90000"/>
+      </a:schemeClr>
+    </dgm:fillClrLst>
+    <dgm:linClrLst meth="repeat">
+      <a:schemeClr val="accent2"/>
+    </dgm:linClrLst>
+    <dgm:effectClrLst/>
+    <dgm:txLinClrLst/>
+    <dgm:txFillClrLst meth="repeat">
+      <a:schemeClr val="tx1"/>
+    </dgm:txFillClrLst>
+    <dgm:txEffectClrLst/>
+  </dgm:styleLbl>
+  <dgm:styleLbl name="parChTrans1D3">
+    <dgm:fillClrLst meth="repeat">
+      <a:schemeClr val="accent4">
+        <a:tint val="70000"/>
+      </a:schemeClr>
+    </dgm:fillClrLst>
+    <dgm:linClrLst meth="repeat">
+      <a:schemeClr val="accent3"/>
+    </dgm:linClrLst>
+    <dgm:effectClrLst/>
+    <dgm:txLinClrLst/>
+    <dgm:txFillClrLst meth="repeat">
+      <a:schemeClr val="tx1"/>
+    </dgm:txFillClrLst>
+    <dgm:txEffectClrLst/>
+  </dgm:styleLbl>
+  <dgm:styleLbl name="parChTrans1D4">
+    <dgm:fillClrLst meth="repeat">
+      <a:schemeClr val="accent5">
+        <a:tint val="50000"/>
+      </a:schemeClr>
+    </dgm:fillClrLst>
+    <dgm:linClrLst meth="repeat">
+      <a:schemeClr val="accent4"/>
+    </dgm:linClrLst>
+    <dgm:effectClrLst/>
+    <dgm:txLinClrLst/>
+    <dgm:txFillClrLst meth="repeat">
+      <a:schemeClr val="tx1"/>
+    </dgm:txFillClrLst>
+    <dgm:txEffectClrLst/>
+  </dgm:styleLbl>
+  <dgm:styleLbl name="fgAcc1">
+    <dgm:fillClrLst meth="repeat">
+      <a:schemeClr val="lt1">
+        <a:alpha val="90000"/>
+      </a:schemeClr>
+    </dgm:fillClrLst>
+    <dgm:linClrLst meth="repeat">
+      <a:schemeClr val="accent2"/>
+      <a:schemeClr val="accent3"/>
+      <a:schemeClr val="accent4"/>
+      <a:schemeClr val="accent5"/>
+      <a:schemeClr val="accent6"/>
+    </dgm:linClrLst>
+    <dgm:effectClrLst/>
+    <dgm:txLinClrLst/>
+    <dgm:txFillClrLst meth="repeat">
+      <a:schemeClr val="dk1"/>
+    </dgm:txFillClrLst>
+    <dgm:txEffectClrLst/>
+  </dgm:styleLbl>
+  <dgm:styleLbl name="conFgAcc1">
+    <dgm:fillClrLst meth="repeat">
+      <a:schemeClr val="lt1">
+        <a:alpha val="90000"/>
+      </a:schemeClr>
+    </dgm:fillClrLst>
+    <dgm:linClrLst meth="repeat">
+      <a:schemeClr val="accent2"/>
+      <a:schemeClr val="accent3"/>
+      <a:schemeClr val="accent4"/>
+      <a:schemeClr val="accent5"/>
+      <a:schemeClr val="accent6"/>
+    </dgm:linClrLst>
+    <dgm:effectClrLst/>
+    <dgm:txLinClrLst/>
+    <dgm:txFillClrLst meth="repeat">
+      <a:schemeClr val="dk1"/>
+    </dgm:txFillClrLst>
+    <dgm:txEffectClrLst/>
+  </dgm:styleLbl>
+  <dgm:styleLbl name="alignAcc1">
+    <dgm:fillClrLst meth="repeat">
+      <a:schemeClr val="lt1">
+        <a:alpha val="90000"/>
+      </a:schemeClr>
+    </dgm:fillClrLst>
+    <dgm:linClrLst meth="repeat">
+      <a:schemeClr val="accent2"/>
+      <a:schemeClr val="accent3"/>
+      <a:schemeClr val="accent4"/>
+      <a:schemeClr val="accent5"/>
+      <a:schemeClr val="accent6"/>
+    </dgm:linClrLst>
+    <dgm:effectClrLst/>
+    <dgm:txLinClrLst/>
+    <dgm:txFillClrLst meth="repeat">
+      <a:schemeClr val="dk1"/>
+    </dgm:txFillClrLst>
+    <dgm:txEffectClrLst/>
+  </dgm:styleLbl>
+  <dgm:styleLbl name="trAlignAcc1">
+    <dgm:fillClrLst meth="repeat">
+      <a:schemeClr val="lt1">
+        <a:alpha val="40000"/>
+      </a:schemeClr>
+    </dgm:fillClrLst>
+    <dgm:linClrLst meth="repeat">
+      <a:schemeClr val="accent1"/>
+    </dgm:linClrLst>
+    <dgm:effectClrLst/>
+    <dgm:txLinClrLst/>
+    <dgm:txFillClrLst meth="repeat">
+      <a:schemeClr val="dk1"/>
+    </dgm:txFillClrLst>
+    <dgm:txEffectClrLst/>
+  </dgm:styleLbl>
+  <dgm:styleLbl name="bgAcc1">
+    <dgm:fillClrLst meth="repeat">
+      <a:schemeClr val="lt1">
+        <a:alpha val="90000"/>
+      </a:schemeClr>
+    </dgm:fillClrLst>
+    <dgm:linClrLst meth="repeat">
+      <a:schemeClr val="accent2"/>
+      <a:schemeClr val="accent3"/>
+      <a:schemeClr val="accent4"/>
+      <a:schemeClr val="accent5"/>
+      <a:schemeClr val="accent6"/>
+    </dgm:linClrLst>
+    <dgm:effectClrLst/>
+    <dgm:txLinClrLst/>
+    <dgm:txFillClrLst meth="repeat">
+      <a:schemeClr val="dk1"/>
+    </dgm:txFillClrLst>
+    <dgm:txEffectClrLst/>
+  </dgm:styleLbl>
+  <dgm:styleLbl name="solidFgAcc1">
+    <dgm:fillClrLst meth="repeat">
+      <a:schemeClr val="lt1"/>
+    </dgm:fillClrLst>
+    <dgm:linClrLst meth="repeat">
+      <a:schemeClr val="accent2"/>
+      <a:schemeClr val="accent3"/>
+      <a:schemeClr val="accent4"/>
+      <a:schemeClr val="accent5"/>
+      <a:schemeClr val="accent6"/>
+    </dgm:linClrLst>
+    <dgm:effectClrLst/>
+    <dgm:txLinClrLst/>
+    <dgm:txFillClrLst meth="repeat">
+      <a:schemeClr val="dk1"/>
+    </dgm:txFillClrLst>
+    <dgm:txEffectClrLst/>
+  </dgm:styleLbl>
+  <dgm:styleLbl name="solidAlignAcc1">
+    <dgm:fillClrLst meth="repeat">
+      <a:schemeClr val="lt1"/>
+    </dgm:fillClrLst>
+    <dgm:linClrLst meth="repeat">
+      <a:schemeClr val="accent2"/>
+      <a:schemeClr val="accent3"/>
+      <a:schemeClr val="accent4"/>
+      <a:schemeClr val="accent5"/>
+      <a:schemeClr val="accent6"/>
+    </dgm:linClrLst>
+    <dgm:effectClrLst/>
+    <dgm:txLinClrLst/>
+    <dgm:txFillClrLst meth="repeat">
+      <a:schemeClr val="dk1"/>
+    </dgm:txFillClrLst>
+    <dgm:txEffectClrLst/>
+  </dgm:styleLbl>
+  <dgm:styleLbl name="solidBgAcc1">
+    <dgm:fillClrLst meth="repeat">
+      <a:schemeClr val="lt1"/>
+    </dgm:fillClrLst>
+    <dgm:linClrLst meth="repeat">
+      <a:schemeClr val="accent2"/>
+      <a:schemeClr val="accent3"/>
+      <a:schemeClr val="accent4"/>
+      <a:schemeClr val="accent5"/>
+      <a:schemeClr val="accent6"/>
+    </dgm:linClrLst>
+    <dgm:effectClrLst/>
+    <dgm:txLinClrLst/>
+    <dgm:txFillClrLst meth="repeat">
+      <a:schemeClr val="dk1"/>
+    </dgm:txFillClrLst>
+    <dgm:txEffectClrLst/>
+  </dgm:styleLbl>
+  <dgm:styleLbl name="fgAccFollowNode1">
+    <dgm:fillClrLst meth="repeat">
+      <a:schemeClr val="accent2">
+        <a:tint val="40000"/>
+        <a:alpha val="90000"/>
+      </a:schemeClr>
+      <a:schemeClr val="accent3">
+        <a:tint val="40000"/>
+        <a:alpha val="90000"/>
+      </a:schemeClr>
+      <a:schemeClr val="accent4">
+        <a:tint val="40000"/>
+        <a:alpha val="90000"/>
+      </a:schemeClr>
+      <a:schemeClr val="accent5">
+        <a:tint val="40000"/>
+        <a:alpha val="90000"/>
+      </a:schemeClr>
+      <a:schemeClr val="accent6">
+        <a:tint val="40000"/>
+        <a:alpha val="90000"/>
+      </a:schemeClr>
+    </dgm:fillClrLst>
+    <dgm:linClrLst meth="repeat">
+      <a:schemeClr val="accent2">
+        <a:tint val="40000"/>
+        <a:alpha val="90000"/>
+      </a:schemeClr>
+      <a:schemeClr val="accent3">
+        <a:tint val="40000"/>
+        <a:alpha val="90000"/>
+      </a:schemeClr>
+      <a:schemeClr val="accent4">
+        <a:tint val="40000"/>
+        <a:alpha val="90000"/>
+      </a:schemeClr>
+      <a:schemeClr val="accent5">
+        <a:tint val="40000"/>
+        <a:alpha val="90000"/>
+      </a:schemeClr>
+      <a:schemeClr val="accent6">
+        <a:tint val="40000"/>
+        <a:alpha val="90000"/>
+      </a:schemeClr>
+    </dgm:linClrLst>
+    <dgm:effectClrLst/>
+    <dgm:txLinClrLst/>
+    <dgm:txFillClrLst meth="repeat">
+      <a:schemeClr val="dk1"/>
+    </dgm:txFillClrLst>
+    <dgm:txEffectClrLst/>
+  </dgm:styleLbl>
+  <dgm:styleLbl name="alignAccFollowNode1">
+    <dgm:fillClrLst meth="repeat">
+      <a:schemeClr val="accent2">
+        <a:tint val="40000"/>
+        <a:alpha val="90000"/>
+      </a:schemeClr>
+      <a:schemeClr val="accent3">
+        <a:tint val="40000"/>
+        <a:alpha val="90000"/>
+      </a:schemeClr>
+      <a:schemeClr val="accent4">
+        <a:tint val="40000"/>
+        <a:alpha val="90000"/>
+      </a:schemeClr>
+      <a:schemeClr val="accent5">
+        <a:tint val="40000"/>
+        <a:alpha val="90000"/>
+      </a:schemeClr>
+      <a:schemeClr val="accent6">
+        <a:tint val="40000"/>
+        <a:alpha val="90000"/>
+      </a:schemeClr>
+    </dgm:fillClrLst>
+    <dgm:linClrLst meth="repeat">
+      <a:schemeClr val="accent2">
+        <a:tint val="40000"/>
+        <a:alpha val="90000"/>
+      </a:schemeClr>
+      <a:schemeClr val="accent3">
+        <a:tint val="40000"/>
+        <a:alpha val="90000"/>
+      </a:schemeClr>
+      <a:schemeClr val="accent4">
+        <a:tint val="40000"/>
+        <a:alpha val="90000"/>
+      </a:schemeClr>
+      <a:schemeClr val="accent5">
+        <a:tint val="40000"/>
+        <a:alpha val="90000"/>
+      </a:schemeClr>
+      <a:schemeClr val="accent6">
+        <a:tint val="40000"/>
+        <a:alpha val="90000"/>
+      </a:schemeClr>
+    </dgm:linClrLst>
+    <dgm:effectClrLst/>
+    <dgm:txLinClrLst/>
+    <dgm:txFillClrLst meth="repeat">
+      <a:schemeClr val="dk1"/>
+    </dgm:txFillClrLst>
+    <dgm:txEffectClrLst/>
+  </dgm:styleLbl>
+  <dgm:styleLbl name="bgAccFollowNode1">
+    <dgm:fillClrLst meth="repeat">
+      <a:schemeClr val="accent2">
+        <a:tint val="40000"/>
+        <a:alpha val="90000"/>
+      </a:schemeClr>
+      <a:schemeClr val="accent3">
+        <a:tint val="40000"/>
+        <a:alpha val="90000"/>
+      </a:schemeClr>
+      <a:schemeClr val="accent4">
+        <a:tint val="40000"/>
+        <a:alpha val="90000"/>
+      </a:schemeClr>
+      <a:schemeClr val="accent5">
+        <a:tint val="40000"/>
+        <a:alpha val="90000"/>
+      </a:schemeClr>
+      <a:schemeClr val="accent6">
+        <a:tint val="40000"/>
+        <a:alpha val="90000"/>
+      </a:schemeClr>
+    </dgm:fillClrLst>
+    <dgm:linClrLst meth="repeat">
+      <a:schemeClr val="accent2">
+        <a:tint val="40000"/>
+        <a:alpha val="90000"/>
+      </a:schemeClr>
+      <a:schemeClr val="accent3">
+        <a:tint val="40000"/>
+        <a:alpha val="90000"/>
+      </a:schemeClr>
+      <a:schemeClr val="accent4">
+        <a:tint val="40000"/>
+        <a:alpha val="90000"/>
+      </a:schemeClr>
+      <a:schemeClr val="accent5">
+        <a:tint val="40000"/>
+        <a:alpha val="90000"/>
+      </a:schemeClr>
+      <a:schemeClr val="accent6">
+        <a:tint val="40000"/>
+        <a:alpha val="90000"/>
+      </a:schemeClr>
+    </dgm:linClrLst>
+    <dgm:effectClrLst/>
+    <dgm:txLinClrLst/>
+    <dgm:txFillClrLst meth="repeat">
+      <a:schemeClr val="dk1"/>
+    </dgm:txFillClrLst>
+    <dgm:txEffectClrLst/>
+  </dgm:styleLbl>
+  <dgm:styleLbl name="fgAcc0">
+    <dgm:fillClrLst meth="repeat">
+      <a:schemeClr val="lt1">
+        <a:alpha val="90000"/>
+      </a:schemeClr>
+    </dgm:fillClrLst>
+    <dgm:linClrLst>
+      <a:schemeClr val="accent1"/>
+    </dgm:linClrLst>
+    <dgm:effectClrLst/>
+    <dgm:txLinClrLst/>
+    <dgm:txFillClrLst meth="repeat">
+      <a:schemeClr val="dk1"/>
+    </dgm:txFillClrLst>
+    <dgm:txEffectClrLst/>
+  </dgm:styleLbl>
+  <dgm:styleLbl name="fgAcc2">
+    <dgm:fillClrLst meth="repeat">
+      <a:schemeClr val="lt1">
+        <a:alpha val="90000"/>
+      </a:schemeClr>
+    </dgm:fillClrLst>
+    <dgm:linClrLst>
+      <a:schemeClr val="accent2"/>
+    </dgm:linClrLst>
+    <dgm:effectClrLst/>
+    <dgm:txLinClrLst/>
+    <dgm:txFillClrLst meth="repeat">
+      <a:schemeClr val="dk1"/>
+    </dgm:txFillClrLst>
+    <dgm:txEffectClrLst/>
+  </dgm:styleLbl>
+  <dgm:styleLbl name="fgAcc3">
+    <dgm:fillClrLst meth="repeat">
+      <a:schemeClr val="lt1">
+        <a:alpha val="90000"/>
+      </a:schemeClr>
+    </dgm:fillClrLst>
+    <dgm:linClrLst>
+      <a:schemeClr val="accent3"/>
+    </dgm:linClrLst>
+    <dgm:effectClrLst/>
+    <dgm:txLinClrLst/>
+    <dgm:txFillClrLst meth="repeat">
+      <a:schemeClr val="dk1"/>
+    </dgm:txFillClrLst>
+    <dgm:txEffectClrLst/>
+  </dgm:styleLbl>
+  <dgm:styleLbl name="fgAcc4">
+    <dgm:fillClrLst meth="repeat">
+      <a:schemeClr val="lt1">
+        <a:alpha val="90000"/>
+      </a:schemeClr>
+    </dgm:fillClrLst>
+    <dgm:linClrLst>
+      <a:schemeClr val="accent4"/>
+    </dgm:linClrLst>
+    <dgm:effectClrLst/>
+    <dgm:txLinClrLst/>
+    <dgm:txFillClrLst meth="repeat">
+      <a:schemeClr val="dk1"/>
+    </dgm:txFillClrLst>
+    <dgm:txEffectClrLst/>
+  </dgm:styleLbl>
+  <dgm:styleLbl name="bgShp">
+    <dgm:fillClrLst meth="repeat">
+      <a:schemeClr val="bg1">
+        <a:lumMod val="95000"/>
+      </a:schemeClr>
+    </dgm:fillClrLst>
+    <dgm:linClrLst meth="repeat">
+      <a:schemeClr val="dk1"/>
+    </dgm:linClrLst>
+    <dgm:effectClrLst/>
+    <dgm:txLinClrLst/>
+    <dgm:txFillClrLst meth="repeat">
+      <a:schemeClr val="dk1"/>
+    </dgm:txFillClrLst>
+    <dgm:txEffectClrLst/>
+  </dgm:styleLbl>
+  <dgm:styleLbl name="dkBgShp">
+    <dgm:fillClrLst meth="repeat">
+      <a:schemeClr val="accent2">
+        <a:shade val="90000"/>
+      </a:schemeClr>
+    </dgm:fillClrLst>
+    <dgm:linClrLst meth="repeat">
+      <a:schemeClr val="dk1"/>
+    </dgm:linClrLst>
+    <dgm:effectClrLst/>
+    <dgm:txLinClrLst/>
+    <dgm:txFillClrLst meth="repeat">
+      <a:schemeClr val="lt1"/>
+    </dgm:txFillClrLst>
+    <dgm:txEffectClrLst/>
+  </dgm:styleLbl>
+  <dgm:styleLbl name="trBgShp">
+    <dgm:fillClrLst meth="repeat">
+      <a:schemeClr val="accent1">
+        <a:tint val="50000"/>
+        <a:alpha val="40000"/>
+      </a:schemeClr>
+    </dgm:fillClrLst>
+    <dgm:linClrLst meth="repeat">
+      <a:schemeClr val="accent2"/>
+    </dgm:linClrLst>
+    <dgm:effectClrLst/>
+    <dgm:txLinClrLst/>
+    <dgm:txFillClrLst meth="repeat">
+      <a:schemeClr val="lt1"/>
+    </dgm:txFillClrLst>
+    <dgm:txEffectClrLst/>
+  </dgm:styleLbl>
+  <dgm:styleLbl name="fgShp">
+    <dgm:fillClrLst meth="repeat">
+      <a:schemeClr val="accent2">
+        <a:tint val="40000"/>
+      </a:schemeClr>
+    </dgm:fillClrLst>
+    <dgm:linClrLst meth="repeat">
+      <a:schemeClr val="lt1"/>
+    </dgm:linClrLst>
+    <dgm:effectClrLst/>
+    <dgm:txLinClrLst/>
+    <dgm:txFillClrLst meth="repeat">
+      <a:schemeClr val="dk1"/>
+    </dgm:txFillClrLst>
+    <dgm:txEffectClrLst/>
+  </dgm:styleLbl>
+  <dgm:styleLbl name="revTx">
+    <dgm:fillClrLst meth="repeat">
+      <a:schemeClr val="lt1">
+        <a:alpha val="0"/>
+      </a:schemeClr>
+    </dgm:fillClrLst>
+    <dgm:linClrLst meth="repeat">
+      <a:schemeClr val="dk1">
+        <a:alpha val="0"/>
+      </a:schemeClr>
+    </dgm:linClrLst>
+    <dgm:effectClrLst/>
+    <dgm:txLinClrLst/>
+    <dgm:txFillClrLst meth="repeat">
+      <a:schemeClr val="tx1"/>
+    </dgm:txFillClrLst>
+    <dgm:txEffectClrLst/>
+  </dgm:styleLbl>
+</dgm:colorsDef>
+</file>
+
+<file path=ppt/diagrams/data1.xml><?xml version="1.0" encoding="utf-8"?>
+<dgm:dataModel xmlns:dgm="http://schemas.openxmlformats.org/drawingml/2006/diagram" xmlns:a="http://schemas.openxmlformats.org/drawingml/2006/main">
+  <dgm:ptLst>
+    <dgm:pt modelId="{182DC8CE-6FBB-4A86-8E71-072136EBD5E5}" type="doc">
+      <dgm:prSet loTypeId="urn:microsoft.com/office/officeart/2018/2/layout/IconVerticalSolidList" loCatId="icon" qsTypeId="urn:microsoft.com/office/officeart/2005/8/quickstyle/simple1" qsCatId="simple" csTypeId="urn:microsoft.com/office/officeart/2018/5/colors/Iconchunking_neutralbg_colorful1" csCatId="colorful" phldr="1"/>
+      <dgm:spPr/>
+      <dgm:t>
+        <a:bodyPr/>
+        <a:lstStyle/>
+        <a:p>
+          <a:endParaRPr lang="en-US"/>
+        </a:p>
+      </dgm:t>
+    </dgm:pt>
+    <dgm:pt modelId="{BC5F6781-C372-4935-8EE1-82FF91D003DD}">
+      <dgm:prSet/>
+      <dgm:spPr/>
+      <dgm:t>
+        <a:bodyPr/>
+        <a:lstStyle/>
+        <a:p>
+          <a:r>
+            <a:rPr lang="en-US" dirty="0"/>
+            <a:t>Designed in KiCAD, board manufactured and populated by JLCPCB</a:t>
+          </a:r>
+        </a:p>
+      </dgm:t>
+    </dgm:pt>
+    <dgm:pt modelId="{A12177CD-3130-4544-8253-965C66D4DD25}" type="parTrans" cxnId="{399CAA4E-6020-4921-B5F4-98AB908830EB}">
+      <dgm:prSet/>
+      <dgm:spPr/>
+      <dgm:t>
+        <a:bodyPr/>
+        <a:lstStyle/>
+        <a:p>
+          <a:endParaRPr lang="en-US"/>
+        </a:p>
+      </dgm:t>
+    </dgm:pt>
+    <dgm:pt modelId="{2EE26E8E-3AF2-48D4-B0F9-34E738C5ECC3}" type="sibTrans" cxnId="{399CAA4E-6020-4921-B5F4-98AB908830EB}">
+      <dgm:prSet/>
+      <dgm:spPr/>
+      <dgm:t>
+        <a:bodyPr/>
+        <a:lstStyle/>
+        <a:p>
+          <a:endParaRPr lang="en-US"/>
+        </a:p>
+      </dgm:t>
+    </dgm:pt>
+    <dgm:pt modelId="{98B5E527-EBA8-4716-B5FE-85CFA8220D8C}">
+      <dgm:prSet/>
+      <dgm:spPr/>
+      <dgm:t>
+        <a:bodyPr/>
+        <a:lstStyle/>
+        <a:p>
+          <a:r>
+            <a:rPr lang="en-US"/>
+            <a:t>Hierarchical design, each member designed at least one schematic</a:t>
+          </a:r>
+        </a:p>
+      </dgm:t>
+    </dgm:pt>
+    <dgm:pt modelId="{D0D8C192-9729-4682-9FFC-858C47C2EFFA}" type="parTrans" cxnId="{928C7E01-CC18-4B99-8B10-137908BC5731}">
+      <dgm:prSet/>
+      <dgm:spPr/>
+      <dgm:t>
+        <a:bodyPr/>
+        <a:lstStyle/>
+        <a:p>
+          <a:endParaRPr lang="en-US"/>
+        </a:p>
+      </dgm:t>
+    </dgm:pt>
+    <dgm:pt modelId="{CDE79273-DC8D-44F0-BEA2-06BBCD4E977E}" type="sibTrans" cxnId="{928C7E01-CC18-4B99-8B10-137908BC5731}">
+      <dgm:prSet/>
+      <dgm:spPr/>
+      <dgm:t>
+        <a:bodyPr/>
+        <a:lstStyle/>
+        <a:p>
+          <a:endParaRPr lang="en-US"/>
+        </a:p>
+      </dgm:t>
+    </dgm:pt>
+    <dgm:pt modelId="{9DEA93E7-3F09-4E48-BB13-3D423ACD483C}">
+      <dgm:prSet/>
+      <dgm:spPr/>
+      <dgm:t>
+        <a:bodyPr/>
+        <a:lstStyle/>
+        <a:p>
+          <a:r>
+            <a:rPr lang="en-US" dirty="0"/>
+            <a:t>Switched from initial IMU pick to another to avoid level shifting data line</a:t>
+          </a:r>
+        </a:p>
+      </dgm:t>
+    </dgm:pt>
+    <dgm:pt modelId="{3F272765-12A1-4DD1-8C13-C16D5FE1E49C}" type="parTrans" cxnId="{61A2113C-B4DB-4504-90E3-E7BE52EF0F19}">
+      <dgm:prSet/>
+      <dgm:spPr/>
+      <dgm:t>
+        <a:bodyPr/>
+        <a:lstStyle/>
+        <a:p>
+          <a:endParaRPr lang="en-US"/>
+        </a:p>
+      </dgm:t>
+    </dgm:pt>
+    <dgm:pt modelId="{37E036D7-0DB2-4777-8479-2E8766520C09}" type="sibTrans" cxnId="{61A2113C-B4DB-4504-90E3-E7BE52EF0F19}">
+      <dgm:prSet/>
+      <dgm:spPr/>
+      <dgm:t>
+        <a:bodyPr/>
+        <a:lstStyle/>
+        <a:p>
+          <a:endParaRPr lang="en-US"/>
+        </a:p>
+      </dgm:t>
+    </dgm:pt>
+    <dgm:pt modelId="{C40648DD-1E8A-47FE-85A5-39596ED57A6A}" type="pres">
+      <dgm:prSet presAssocID="{182DC8CE-6FBB-4A86-8E71-072136EBD5E5}" presName="root" presStyleCnt="0">
+        <dgm:presLayoutVars>
+          <dgm:dir/>
+          <dgm:resizeHandles val="exact"/>
+        </dgm:presLayoutVars>
+      </dgm:prSet>
+      <dgm:spPr/>
+    </dgm:pt>
+    <dgm:pt modelId="{B13A203B-D377-42C6-B33B-96D1892EC98F}" type="pres">
+      <dgm:prSet presAssocID="{BC5F6781-C372-4935-8EE1-82FF91D003DD}" presName="compNode" presStyleCnt="0"/>
+      <dgm:spPr/>
+    </dgm:pt>
+    <dgm:pt modelId="{16DA4453-803C-4C3F-AF26-9485F056D932}" type="pres">
+      <dgm:prSet presAssocID="{BC5F6781-C372-4935-8EE1-82FF91D003DD}" presName="bgRect" presStyleLbl="bgShp" presStyleIdx="0" presStyleCnt="3" custLinFactNeighborX="472" custLinFactNeighborY="-43"/>
+      <dgm:spPr/>
+    </dgm:pt>
+    <dgm:pt modelId="{1071C88A-E4C7-4C93-B509-0834E0B23409}" type="pres">
+      <dgm:prSet presAssocID="{BC5F6781-C372-4935-8EE1-82FF91D003DD}" presName="iconRect" presStyleLbl="node1" presStyleIdx="0" presStyleCnt="3"/>
+      <dgm:spPr>
+        <a:blipFill>
+          <a:blip xmlns:r="http://schemas.openxmlformats.org/officeDocument/2006/relationships" r:embed="rId1">
+            <a:extLst>
+              <a:ext uri="{28A0092B-C50C-407E-A947-70E740481C1C}">
+                <a14:useLocalDpi xmlns:a14="http://schemas.microsoft.com/office/drawing/2010/main" val="0"/>
+              </a:ext>
+            </a:extLst>
+          </a:blip>
+          <a:srcRect/>
+          <a:stretch>
+            <a:fillRect/>
+          </a:stretch>
+        </a:blipFill>
+        <a:ln>
+          <a:noFill/>
+        </a:ln>
+      </dgm:spPr>
+    </dgm:pt>
+    <dgm:pt modelId="{1CEE86F4-CE94-4565-A23B-158A58BEF6ED}" type="pres">
+      <dgm:prSet presAssocID="{BC5F6781-C372-4935-8EE1-82FF91D003DD}" presName="spaceRect" presStyleCnt="0"/>
+      <dgm:spPr/>
+    </dgm:pt>
+    <dgm:pt modelId="{4CF5EDE7-CF1D-4A04-AF14-EA4F9092E42B}" type="pres">
+      <dgm:prSet presAssocID="{BC5F6781-C372-4935-8EE1-82FF91D003DD}" presName="parTx" presStyleLbl="revTx" presStyleIdx="0" presStyleCnt="3">
+        <dgm:presLayoutVars>
+          <dgm:chMax val="0"/>
+          <dgm:chPref val="0"/>
+        </dgm:presLayoutVars>
+      </dgm:prSet>
+      <dgm:spPr/>
+    </dgm:pt>
+    <dgm:pt modelId="{5C152134-1A7D-4EFD-89CF-F3077AA89782}" type="pres">
+      <dgm:prSet presAssocID="{2EE26E8E-3AF2-48D4-B0F9-34E738C5ECC3}" presName="sibTrans" presStyleCnt="0"/>
+      <dgm:spPr/>
+    </dgm:pt>
+    <dgm:pt modelId="{F2D8E517-E8D6-4D99-AD71-D29F04E37184}" type="pres">
+      <dgm:prSet presAssocID="{98B5E527-EBA8-4716-B5FE-85CFA8220D8C}" presName="compNode" presStyleCnt="0"/>
+      <dgm:spPr/>
+    </dgm:pt>
+    <dgm:pt modelId="{DB91EEAC-D320-4F5D-B1D1-C1ABBC606990}" type="pres">
+      <dgm:prSet presAssocID="{98B5E527-EBA8-4716-B5FE-85CFA8220D8C}" presName="bgRect" presStyleLbl="bgShp" presStyleIdx="1" presStyleCnt="3"/>
+      <dgm:spPr/>
+    </dgm:pt>
+    <dgm:pt modelId="{DB07D0AC-532C-4A76-B711-C8B567C9E1CD}" type="pres">
+      <dgm:prSet presAssocID="{98B5E527-EBA8-4716-B5FE-85CFA8220D8C}" presName="iconRect" presStyleLbl="node1" presStyleIdx="1" presStyleCnt="3"/>
+      <dgm:spPr>
+        <a:blipFill>
+          <a:blip xmlns:r="http://schemas.openxmlformats.org/officeDocument/2006/relationships" r:embed="rId2">
+            <a:extLst>
+              <a:ext uri="{28A0092B-C50C-407E-A947-70E740481C1C}">
+                <a14:useLocalDpi xmlns:a14="http://schemas.microsoft.com/office/drawing/2010/main" val="0"/>
+              </a:ext>
+              <a:ext uri="{96DAC541-7B7A-43D3-8B79-37D633B846F1}">
+                <asvg:svgBlip xmlns:asvg="http://schemas.microsoft.com/office/drawing/2016/SVG/main" r:embed="rId3"/>
+              </a:ext>
+            </a:extLst>
+          </a:blip>
+          <a:stretch>
+            <a:fillRect/>
+          </a:stretch>
+        </a:blipFill>
+        <a:ln>
+          <a:noFill/>
+        </a:ln>
+      </dgm:spPr>
+      <dgm:extLst>
+        <a:ext uri="{E40237B7-FDA0-4F09-8148-C483321AD2D9}">
+          <dgm14:cNvPr xmlns:dgm14="http://schemas.microsoft.com/office/drawing/2010/diagram" id="0" name="" descr="Hierarchy"/>
+        </a:ext>
+      </dgm:extLst>
+    </dgm:pt>
+    <dgm:pt modelId="{4E350978-942A-4F94-B937-8DAC5BCC713E}" type="pres">
+      <dgm:prSet presAssocID="{98B5E527-EBA8-4716-B5FE-85CFA8220D8C}" presName="spaceRect" presStyleCnt="0"/>
+      <dgm:spPr/>
+    </dgm:pt>
+    <dgm:pt modelId="{A3248316-44BC-4234-9F59-63B7310192F8}" type="pres">
+      <dgm:prSet presAssocID="{98B5E527-EBA8-4716-B5FE-85CFA8220D8C}" presName="parTx" presStyleLbl="revTx" presStyleIdx="1" presStyleCnt="3">
+        <dgm:presLayoutVars>
+          <dgm:chMax val="0"/>
+          <dgm:chPref val="0"/>
+        </dgm:presLayoutVars>
+      </dgm:prSet>
+      <dgm:spPr/>
+    </dgm:pt>
+    <dgm:pt modelId="{AFD09BA0-512C-42E6-8EA5-205F9D634FE1}" type="pres">
+      <dgm:prSet presAssocID="{CDE79273-DC8D-44F0-BEA2-06BBCD4E977E}" presName="sibTrans" presStyleCnt="0"/>
+      <dgm:spPr/>
+    </dgm:pt>
+    <dgm:pt modelId="{3A8EACCB-CE61-40DA-B56A-0E053EB05496}" type="pres">
+      <dgm:prSet presAssocID="{9DEA93E7-3F09-4E48-BB13-3D423ACD483C}" presName="compNode" presStyleCnt="0"/>
+      <dgm:spPr/>
+    </dgm:pt>
+    <dgm:pt modelId="{63C4640B-CF96-4906-B3F3-14FE3438C81E}" type="pres">
+      <dgm:prSet presAssocID="{9DEA93E7-3F09-4E48-BB13-3D423ACD483C}" presName="bgRect" presStyleLbl="bgShp" presStyleIdx="2" presStyleCnt="3"/>
+      <dgm:spPr/>
+    </dgm:pt>
+    <dgm:pt modelId="{C3EE8474-BCF8-44E6-A31A-37127FBF1E32}" type="pres">
+      <dgm:prSet presAssocID="{9DEA93E7-3F09-4E48-BB13-3D423ACD483C}" presName="iconRect" presStyleLbl="node1" presStyleIdx="2" presStyleCnt="3"/>
+      <dgm:spPr>
+        <a:blipFill>
+          <a:blip xmlns:r="http://schemas.openxmlformats.org/officeDocument/2006/relationships" r:embed="rId4">
+            <a:duotone>
+              <a:schemeClr val="accent2">
+                <a:shade val="45000"/>
+                <a:satMod val="135000"/>
+              </a:schemeClr>
+              <a:prstClr val="white"/>
+            </a:duotone>
+          </a:blip>
+          <a:srcRect/>
+          <a:stretch>
+            <a:fillRect/>
+          </a:stretch>
+        </a:blipFill>
+        <a:ln>
+          <a:noFill/>
+        </a:ln>
+      </dgm:spPr>
+    </dgm:pt>
+    <dgm:pt modelId="{3C9584B5-7794-417D-9A33-6CC02FCCEE97}" type="pres">
+      <dgm:prSet presAssocID="{9DEA93E7-3F09-4E48-BB13-3D423ACD483C}" presName="spaceRect" presStyleCnt="0"/>
+      <dgm:spPr/>
+    </dgm:pt>
+    <dgm:pt modelId="{F59DEA38-CACF-498D-B419-F31149405DE3}" type="pres">
+      <dgm:prSet presAssocID="{9DEA93E7-3F09-4E48-BB13-3D423ACD483C}" presName="parTx" presStyleLbl="revTx" presStyleIdx="2" presStyleCnt="3">
+        <dgm:presLayoutVars>
+          <dgm:chMax val="0"/>
+          <dgm:chPref val="0"/>
+        </dgm:presLayoutVars>
+      </dgm:prSet>
+      <dgm:spPr/>
+    </dgm:pt>
+  </dgm:ptLst>
+  <dgm:cxnLst>
+    <dgm:cxn modelId="{928C7E01-CC18-4B99-8B10-137908BC5731}" srcId="{182DC8CE-6FBB-4A86-8E71-072136EBD5E5}" destId="{98B5E527-EBA8-4716-B5FE-85CFA8220D8C}" srcOrd="1" destOrd="0" parTransId="{D0D8C192-9729-4682-9FFC-858C47C2EFFA}" sibTransId="{CDE79273-DC8D-44F0-BEA2-06BBCD4E977E}"/>
+    <dgm:cxn modelId="{4EF3D431-D2C8-4DFD-929E-3D6BAC56706F}" type="presOf" srcId="{182DC8CE-6FBB-4A86-8E71-072136EBD5E5}" destId="{C40648DD-1E8A-47FE-85A5-39596ED57A6A}" srcOrd="0" destOrd="0" presId="urn:microsoft.com/office/officeart/2018/2/layout/IconVerticalSolidList"/>
+    <dgm:cxn modelId="{61A2113C-B4DB-4504-90E3-E7BE52EF0F19}" srcId="{182DC8CE-6FBB-4A86-8E71-072136EBD5E5}" destId="{9DEA93E7-3F09-4E48-BB13-3D423ACD483C}" srcOrd="2" destOrd="0" parTransId="{3F272765-12A1-4DD1-8C13-C16D5FE1E49C}" sibTransId="{37E036D7-0DB2-4777-8479-2E8766520C09}"/>
+    <dgm:cxn modelId="{399CAA4E-6020-4921-B5F4-98AB908830EB}" srcId="{182DC8CE-6FBB-4A86-8E71-072136EBD5E5}" destId="{BC5F6781-C372-4935-8EE1-82FF91D003DD}" srcOrd="0" destOrd="0" parTransId="{A12177CD-3130-4544-8253-965C66D4DD25}" sibTransId="{2EE26E8E-3AF2-48D4-B0F9-34E738C5ECC3}"/>
+    <dgm:cxn modelId="{EDACE787-B56F-44D4-A6CF-CECEEA3D95ED}" type="presOf" srcId="{98B5E527-EBA8-4716-B5FE-85CFA8220D8C}" destId="{A3248316-44BC-4234-9F59-63B7310192F8}" srcOrd="0" destOrd="0" presId="urn:microsoft.com/office/officeart/2018/2/layout/IconVerticalSolidList"/>
+    <dgm:cxn modelId="{B784AC8E-C542-4C83-9E39-5043AC514AB8}" type="presOf" srcId="{BC5F6781-C372-4935-8EE1-82FF91D003DD}" destId="{4CF5EDE7-CF1D-4A04-AF14-EA4F9092E42B}" srcOrd="0" destOrd="0" presId="urn:microsoft.com/office/officeart/2018/2/layout/IconVerticalSolidList"/>
+    <dgm:cxn modelId="{0C035CD0-B8B8-4FBB-A588-2F4D4AABD835}" type="presOf" srcId="{9DEA93E7-3F09-4E48-BB13-3D423ACD483C}" destId="{F59DEA38-CACF-498D-B419-F31149405DE3}" srcOrd="0" destOrd="0" presId="urn:microsoft.com/office/officeart/2018/2/layout/IconVerticalSolidList"/>
+    <dgm:cxn modelId="{8967DE95-8023-421E-A171-945025B191FA}" type="presParOf" srcId="{C40648DD-1E8A-47FE-85A5-39596ED57A6A}" destId="{B13A203B-D377-42C6-B33B-96D1892EC98F}" srcOrd="0" destOrd="0" presId="urn:microsoft.com/office/officeart/2018/2/layout/IconVerticalSolidList"/>
+    <dgm:cxn modelId="{E4FE982A-27B0-4542-8128-C6164FEB331B}" type="presParOf" srcId="{B13A203B-D377-42C6-B33B-96D1892EC98F}" destId="{16DA4453-803C-4C3F-AF26-9485F056D932}" srcOrd="0" destOrd="0" presId="urn:microsoft.com/office/officeart/2018/2/layout/IconVerticalSolidList"/>
+    <dgm:cxn modelId="{21A4B138-FCBB-47A8-B01A-FCB7226B82FC}" type="presParOf" srcId="{B13A203B-D377-42C6-B33B-96D1892EC98F}" destId="{1071C88A-E4C7-4C93-B509-0834E0B23409}" srcOrd="1" destOrd="0" presId="urn:microsoft.com/office/officeart/2018/2/layout/IconVerticalSolidList"/>
+    <dgm:cxn modelId="{EAA485FA-2C94-431F-931A-996066D15C13}" type="presParOf" srcId="{B13A203B-D377-42C6-B33B-96D1892EC98F}" destId="{1CEE86F4-CE94-4565-A23B-158A58BEF6ED}" srcOrd="2" destOrd="0" presId="urn:microsoft.com/office/officeart/2018/2/layout/IconVerticalSolidList"/>
+    <dgm:cxn modelId="{3A272503-4420-43F6-A475-3C48EB847A5E}" type="presParOf" srcId="{B13A203B-D377-42C6-B33B-96D1892EC98F}" destId="{4CF5EDE7-CF1D-4A04-AF14-EA4F9092E42B}" srcOrd="3" destOrd="0" presId="urn:microsoft.com/office/officeart/2018/2/layout/IconVerticalSolidList"/>
+    <dgm:cxn modelId="{2A725423-49CE-49C2-ABCD-A8E22D2DA3F3}" type="presParOf" srcId="{C40648DD-1E8A-47FE-85A5-39596ED57A6A}" destId="{5C152134-1A7D-4EFD-89CF-F3077AA89782}" srcOrd="1" destOrd="0" presId="urn:microsoft.com/office/officeart/2018/2/layout/IconVerticalSolidList"/>
+    <dgm:cxn modelId="{DEB33825-AD11-49FC-A820-C7C512CF1E66}" type="presParOf" srcId="{C40648DD-1E8A-47FE-85A5-39596ED57A6A}" destId="{F2D8E517-E8D6-4D99-AD71-D29F04E37184}" srcOrd="2" destOrd="0" presId="urn:microsoft.com/office/officeart/2018/2/layout/IconVerticalSolidList"/>
+    <dgm:cxn modelId="{19AE23C8-FF3B-4DC6-9196-9C6A31C0D6A3}" type="presParOf" srcId="{F2D8E517-E8D6-4D99-AD71-D29F04E37184}" destId="{DB91EEAC-D320-4F5D-B1D1-C1ABBC606990}" srcOrd="0" destOrd="0" presId="urn:microsoft.com/office/officeart/2018/2/layout/IconVerticalSolidList"/>
+    <dgm:cxn modelId="{15419289-BB42-41D0-9A29-58C8446F0F7C}" type="presParOf" srcId="{F2D8E517-E8D6-4D99-AD71-D29F04E37184}" destId="{DB07D0AC-532C-4A76-B711-C8B567C9E1CD}" srcOrd="1" destOrd="0" presId="urn:microsoft.com/office/officeart/2018/2/layout/IconVerticalSolidList"/>
+    <dgm:cxn modelId="{ABAE6385-1B4A-4E34-B925-1066AACD9A87}" type="presParOf" srcId="{F2D8E517-E8D6-4D99-AD71-D29F04E37184}" destId="{4E350978-942A-4F94-B937-8DAC5BCC713E}" srcOrd="2" destOrd="0" presId="urn:microsoft.com/office/officeart/2018/2/layout/IconVerticalSolidList"/>
+    <dgm:cxn modelId="{58A4409C-02E9-4308-9B06-EAA8F14D1652}" type="presParOf" srcId="{F2D8E517-E8D6-4D99-AD71-D29F04E37184}" destId="{A3248316-44BC-4234-9F59-63B7310192F8}" srcOrd="3" destOrd="0" presId="urn:microsoft.com/office/officeart/2018/2/layout/IconVerticalSolidList"/>
+    <dgm:cxn modelId="{779D3877-92FD-40B8-BE58-C4DFE5BCDD1B}" type="presParOf" srcId="{C40648DD-1E8A-47FE-85A5-39596ED57A6A}" destId="{AFD09BA0-512C-42E6-8EA5-205F9D634FE1}" srcOrd="3" destOrd="0" presId="urn:microsoft.com/office/officeart/2018/2/layout/IconVerticalSolidList"/>
+    <dgm:cxn modelId="{41A1D198-C5F4-44CE-B512-2B9258376874}" type="presParOf" srcId="{C40648DD-1E8A-47FE-85A5-39596ED57A6A}" destId="{3A8EACCB-CE61-40DA-B56A-0E053EB05496}" srcOrd="4" destOrd="0" presId="urn:microsoft.com/office/officeart/2018/2/layout/IconVerticalSolidList"/>
+    <dgm:cxn modelId="{EC29FF78-9062-405F-B73D-EEB3DBF9926C}" type="presParOf" srcId="{3A8EACCB-CE61-40DA-B56A-0E053EB05496}" destId="{63C4640B-CF96-4906-B3F3-14FE3438C81E}" srcOrd="0" destOrd="0" presId="urn:microsoft.com/office/officeart/2018/2/layout/IconVerticalSolidList"/>
+    <dgm:cxn modelId="{5BF52FBE-60A2-413F-9F23-9BAA5BFC97EC}" type="presParOf" srcId="{3A8EACCB-CE61-40DA-B56A-0E053EB05496}" destId="{C3EE8474-BCF8-44E6-A31A-37127FBF1E32}" srcOrd="1" destOrd="0" presId="urn:microsoft.com/office/officeart/2018/2/layout/IconVerticalSolidList"/>
+    <dgm:cxn modelId="{A4913A6C-B2D7-4718-B379-8867BBFB0E4E}" type="presParOf" srcId="{3A8EACCB-CE61-40DA-B56A-0E053EB05496}" destId="{3C9584B5-7794-417D-9A33-6CC02FCCEE97}" srcOrd="2" destOrd="0" presId="urn:microsoft.com/office/officeart/2018/2/layout/IconVerticalSolidList"/>
+    <dgm:cxn modelId="{0827CD90-A036-4E74-A6FD-083C6DD63C8F}" type="presParOf" srcId="{3A8EACCB-CE61-40DA-B56A-0E053EB05496}" destId="{F59DEA38-CACF-498D-B419-F31149405DE3}" srcOrd="3" destOrd="0" presId="urn:microsoft.com/office/officeart/2018/2/layout/IconVerticalSolidList"/>
+  </dgm:cxnLst>
+  <dgm:bg/>
+  <dgm:whole/>
+  <dgm:extLst>
+    <a:ext uri="http://schemas.microsoft.com/office/drawing/2008/diagram">
+      <dsp:dataModelExt xmlns:dsp="http://schemas.microsoft.com/office/drawing/2008/diagram" relId="rId6" minVer="http://schemas.openxmlformats.org/drawingml/2006/diagram"/>
+    </a:ext>
+  </dgm:extLst>
+</dgm:dataModel>
+</file>
+
+<file path=ppt/diagrams/drawing1.xml><?xml version="1.0" encoding="utf-8"?>
+<dsp:drawing xmlns:dgm="http://schemas.openxmlformats.org/drawingml/2006/diagram" xmlns:dsp="http://schemas.microsoft.com/office/drawing/2008/diagram" xmlns:a="http://schemas.openxmlformats.org/drawingml/2006/main">
+  <dsp:spTree>
+    <dsp:nvGrpSpPr>
+      <dsp:cNvPr id="0" name=""/>
+      <dsp:cNvGrpSpPr/>
+    </dsp:nvGrpSpPr>
+    <dsp:grpSpPr/>
+    <dsp:sp modelId="{16DA4453-803C-4C3F-AF26-9485F056D932}">
+      <dsp:nvSpPr>
+        <dsp:cNvPr id="0" name=""/>
+        <dsp:cNvSpPr/>
+      </dsp:nvSpPr>
+      <dsp:spPr>
+        <a:xfrm>
+          <a:off x="0" y="0"/>
+          <a:ext cx="6245265" cy="1596566"/>
+        </a:xfrm>
+        <a:prstGeom prst="roundRect">
+          <a:avLst>
+            <a:gd name="adj" fmla="val 10000"/>
+          </a:avLst>
+        </a:prstGeom>
+        <a:solidFill>
+          <a:schemeClr val="bg1">
+            <a:lumMod val="95000"/>
+            <a:hueOff val="0"/>
+            <a:satOff val="0"/>
+            <a:lumOff val="0"/>
+            <a:alphaOff val="0"/>
+          </a:schemeClr>
+        </a:solidFill>
+        <a:ln>
+          <a:noFill/>
+        </a:ln>
+        <a:effectLst/>
+      </dsp:spPr>
+      <dsp:style>
+        <a:lnRef idx="0">
+          <a:scrgbClr r="0" g="0" b="0"/>
+        </a:lnRef>
+        <a:fillRef idx="1">
+          <a:scrgbClr r="0" g="0" b="0"/>
+        </a:fillRef>
+        <a:effectRef idx="0">
+          <a:scrgbClr r="0" g="0" b="0"/>
+        </a:effectRef>
+        <a:fontRef idx="minor"/>
+      </dsp:style>
+    </dsp:sp>
+    <dsp:sp modelId="{1071C88A-E4C7-4C93-B509-0834E0B23409}">
+      <dsp:nvSpPr>
+        <dsp:cNvPr id="0" name=""/>
+        <dsp:cNvSpPr/>
+      </dsp:nvSpPr>
+      <dsp:spPr>
+        <a:xfrm>
+          <a:off x="482961" y="359909"/>
+          <a:ext cx="878111" cy="878111"/>
+        </a:xfrm>
+        <a:prstGeom prst="rect">
+          <a:avLst/>
+        </a:prstGeom>
+        <a:blipFill>
+          <a:blip xmlns:r="http://schemas.openxmlformats.org/officeDocument/2006/relationships" r:embed="rId1">
+            <a:extLst>
+              <a:ext uri="{28A0092B-C50C-407E-A947-70E740481C1C}">
+                <a14:useLocalDpi xmlns:a14="http://schemas.microsoft.com/office/drawing/2010/main" val="0"/>
+              </a:ext>
+            </a:extLst>
+          </a:blip>
+          <a:srcRect/>
+          <a:stretch>
+            <a:fillRect/>
+          </a:stretch>
+        </a:blipFill>
+        <a:ln w="19050" cap="flat" cmpd="sng" algn="ctr">
+          <a:noFill/>
+          <a:prstDash val="solid"/>
+          <a:miter lim="800000"/>
+        </a:ln>
+        <a:effectLst/>
+      </dsp:spPr>
+      <dsp:style>
+        <a:lnRef idx="2">
+          <a:scrgbClr r="0" g="0" b="0"/>
+        </a:lnRef>
+        <a:fillRef idx="1">
+          <a:scrgbClr r="0" g="0" b="0"/>
+        </a:fillRef>
+        <a:effectRef idx="0">
+          <a:scrgbClr r="0" g="0" b="0"/>
+        </a:effectRef>
+        <a:fontRef idx="minor">
+          <a:schemeClr val="lt1"/>
+        </a:fontRef>
+      </dsp:style>
+    </dsp:sp>
+    <dsp:sp modelId="{4CF5EDE7-CF1D-4A04-AF14-EA4F9092E42B}">
+      <dsp:nvSpPr>
+        <dsp:cNvPr id="0" name=""/>
+        <dsp:cNvSpPr/>
+      </dsp:nvSpPr>
+      <dsp:spPr>
+        <a:xfrm>
+          <a:off x="1844034" y="682"/>
+          <a:ext cx="4401230" cy="1596566"/>
+        </a:xfrm>
+        <a:prstGeom prst="rect">
+          <a:avLst/>
+        </a:prstGeom>
+        <a:noFill/>
+        <a:ln>
+          <a:noFill/>
+        </a:ln>
+        <a:effectLst/>
+      </dsp:spPr>
+      <dsp:style>
+        <a:lnRef idx="0">
+          <a:scrgbClr r="0" g="0" b="0"/>
+        </a:lnRef>
+        <a:fillRef idx="0">
+          <a:scrgbClr r="0" g="0" b="0"/>
+        </a:fillRef>
+        <a:effectRef idx="0">
+          <a:scrgbClr r="0" g="0" b="0"/>
+        </a:effectRef>
+        <a:fontRef idx="minor"/>
+      </dsp:style>
+      <dsp:txBody>
+        <a:bodyPr spcFirstLastPara="0" vert="horz" wrap="square" lIns="168970" tIns="168970" rIns="168970" bIns="168970" numCol="1" spcCol="1270" anchor="ctr" anchorCtr="0">
+          <a:noAutofit/>
+        </a:bodyPr>
+        <a:lstStyle/>
+        <a:p>
+          <a:pPr marL="0" lvl="0" indent="0" algn="l" defTabSz="1111250">
+            <a:lnSpc>
+              <a:spcPct val="90000"/>
+            </a:lnSpc>
+            <a:spcBef>
+              <a:spcPct val="0"/>
+            </a:spcBef>
+            <a:spcAft>
+              <a:spcPct val="35000"/>
+            </a:spcAft>
+            <a:buNone/>
+          </a:pPr>
+          <a:r>
+            <a:rPr lang="en-US" sz="2500" kern="1200" dirty="0"/>
+            <a:t>Designed in KiCAD, board manufactured and populated by JLCPCB</a:t>
+          </a:r>
+        </a:p>
+      </dsp:txBody>
+      <dsp:txXfrm>
+        <a:off x="1844034" y="682"/>
+        <a:ext cx="4401230" cy="1596566"/>
+      </dsp:txXfrm>
+    </dsp:sp>
+    <dsp:sp modelId="{DB91EEAC-D320-4F5D-B1D1-C1ABBC606990}">
+      <dsp:nvSpPr>
+        <dsp:cNvPr id="0" name=""/>
+        <dsp:cNvSpPr/>
+      </dsp:nvSpPr>
+      <dsp:spPr>
+        <a:xfrm>
+          <a:off x="0" y="1996390"/>
+          <a:ext cx="6245265" cy="1596566"/>
+        </a:xfrm>
+        <a:prstGeom prst="roundRect">
+          <a:avLst>
+            <a:gd name="adj" fmla="val 10000"/>
+          </a:avLst>
+        </a:prstGeom>
+        <a:solidFill>
+          <a:schemeClr val="bg1">
+            <a:lumMod val="95000"/>
+            <a:hueOff val="0"/>
+            <a:satOff val="0"/>
+            <a:lumOff val="0"/>
+            <a:alphaOff val="0"/>
+          </a:schemeClr>
+        </a:solidFill>
+        <a:ln>
+          <a:noFill/>
+        </a:ln>
+        <a:effectLst/>
+      </dsp:spPr>
+      <dsp:style>
+        <a:lnRef idx="0">
+          <a:scrgbClr r="0" g="0" b="0"/>
+        </a:lnRef>
+        <a:fillRef idx="1">
+          <a:scrgbClr r="0" g="0" b="0"/>
+        </a:fillRef>
+        <a:effectRef idx="0">
+          <a:scrgbClr r="0" g="0" b="0"/>
+        </a:effectRef>
+        <a:fontRef idx="minor"/>
+      </dsp:style>
+    </dsp:sp>
+    <dsp:sp modelId="{DB07D0AC-532C-4A76-B711-C8B567C9E1CD}">
+      <dsp:nvSpPr>
+        <dsp:cNvPr id="0" name=""/>
+        <dsp:cNvSpPr/>
+      </dsp:nvSpPr>
+      <dsp:spPr>
+        <a:xfrm>
+          <a:off x="482961" y="2355617"/>
+          <a:ext cx="878111" cy="878111"/>
+        </a:xfrm>
+        <a:prstGeom prst="rect">
+          <a:avLst/>
+        </a:prstGeom>
+        <a:blipFill>
+          <a:blip xmlns:r="http://schemas.openxmlformats.org/officeDocument/2006/relationships" r:embed="rId2">
+            <a:extLst>
+              <a:ext uri="{28A0092B-C50C-407E-A947-70E740481C1C}">
+                <a14:useLocalDpi xmlns:a14="http://schemas.microsoft.com/office/drawing/2010/main" val="0"/>
+              </a:ext>
+              <a:ext uri="{96DAC541-7B7A-43D3-8B79-37D633B846F1}">
+                <asvg:svgBlip xmlns:asvg="http://schemas.microsoft.com/office/drawing/2016/SVG/main" r:embed="rId3"/>
+              </a:ext>
+            </a:extLst>
+          </a:blip>
+          <a:stretch>
+            <a:fillRect/>
+          </a:stretch>
+        </a:blipFill>
+        <a:ln w="19050" cap="flat" cmpd="sng" algn="ctr">
+          <a:noFill/>
+          <a:prstDash val="solid"/>
+          <a:miter lim="800000"/>
+        </a:ln>
+        <a:effectLst/>
+      </dsp:spPr>
+      <dsp:style>
+        <a:lnRef idx="2">
+          <a:scrgbClr r="0" g="0" b="0"/>
+        </a:lnRef>
+        <a:fillRef idx="1">
+          <a:scrgbClr r="0" g="0" b="0"/>
+        </a:fillRef>
+        <a:effectRef idx="0">
+          <a:scrgbClr r="0" g="0" b="0"/>
+        </a:effectRef>
+        <a:fontRef idx="minor">
+          <a:schemeClr val="lt1"/>
+        </a:fontRef>
+      </dsp:style>
+    </dsp:sp>
+    <dsp:sp modelId="{A3248316-44BC-4234-9F59-63B7310192F8}">
+      <dsp:nvSpPr>
+        <dsp:cNvPr id="0" name=""/>
+        <dsp:cNvSpPr/>
+      </dsp:nvSpPr>
+      <dsp:spPr>
+        <a:xfrm>
+          <a:off x="1844034" y="1996390"/>
+          <a:ext cx="4401230" cy="1596566"/>
+        </a:xfrm>
+        <a:prstGeom prst="rect">
+          <a:avLst/>
+        </a:prstGeom>
+        <a:noFill/>
+        <a:ln>
+          <a:noFill/>
+        </a:ln>
+        <a:effectLst/>
+      </dsp:spPr>
+      <dsp:style>
+        <a:lnRef idx="0">
+          <a:scrgbClr r="0" g="0" b="0"/>
+        </a:lnRef>
+        <a:fillRef idx="0">
+          <a:scrgbClr r="0" g="0" b="0"/>
+        </a:fillRef>
+        <a:effectRef idx="0">
+          <a:scrgbClr r="0" g="0" b="0"/>
+        </a:effectRef>
+        <a:fontRef idx="minor"/>
+      </dsp:style>
+      <dsp:txBody>
+        <a:bodyPr spcFirstLastPara="0" vert="horz" wrap="square" lIns="168970" tIns="168970" rIns="168970" bIns="168970" numCol="1" spcCol="1270" anchor="ctr" anchorCtr="0">
+          <a:noAutofit/>
+        </a:bodyPr>
+        <a:lstStyle/>
+        <a:p>
+          <a:pPr marL="0" lvl="0" indent="0" algn="l" defTabSz="1111250">
+            <a:lnSpc>
+              <a:spcPct val="90000"/>
+            </a:lnSpc>
+            <a:spcBef>
+              <a:spcPct val="0"/>
+            </a:spcBef>
+            <a:spcAft>
+              <a:spcPct val="35000"/>
+            </a:spcAft>
+            <a:buNone/>
+          </a:pPr>
+          <a:r>
+            <a:rPr lang="en-US" sz="2500" kern="1200"/>
+            <a:t>Hierarchical design, each member designed at least one schematic</a:t>
+          </a:r>
+        </a:p>
+      </dsp:txBody>
+      <dsp:txXfrm>
+        <a:off x="1844034" y="1996390"/>
+        <a:ext cx="4401230" cy="1596566"/>
+      </dsp:txXfrm>
+    </dsp:sp>
+    <dsp:sp modelId="{63C4640B-CF96-4906-B3F3-14FE3438C81E}">
+      <dsp:nvSpPr>
+        <dsp:cNvPr id="0" name=""/>
+        <dsp:cNvSpPr/>
+      </dsp:nvSpPr>
+      <dsp:spPr>
+        <a:xfrm>
+          <a:off x="0" y="3992098"/>
+          <a:ext cx="6245265" cy="1596566"/>
+        </a:xfrm>
+        <a:prstGeom prst="roundRect">
+          <a:avLst>
+            <a:gd name="adj" fmla="val 10000"/>
+          </a:avLst>
+        </a:prstGeom>
+        <a:solidFill>
+          <a:schemeClr val="bg1">
+            <a:lumMod val="95000"/>
+            <a:hueOff val="0"/>
+            <a:satOff val="0"/>
+            <a:lumOff val="0"/>
+            <a:alphaOff val="0"/>
+          </a:schemeClr>
+        </a:solidFill>
+        <a:ln>
+          <a:noFill/>
+        </a:ln>
+        <a:effectLst/>
+      </dsp:spPr>
+      <dsp:style>
+        <a:lnRef idx="0">
+          <a:scrgbClr r="0" g="0" b="0"/>
+        </a:lnRef>
+        <a:fillRef idx="1">
+          <a:scrgbClr r="0" g="0" b="0"/>
+        </a:fillRef>
+        <a:effectRef idx="0">
+          <a:scrgbClr r="0" g="0" b="0"/>
+        </a:effectRef>
+        <a:fontRef idx="minor"/>
+      </dsp:style>
+    </dsp:sp>
+    <dsp:sp modelId="{C3EE8474-BCF8-44E6-A31A-37127FBF1E32}">
+      <dsp:nvSpPr>
+        <dsp:cNvPr id="0" name=""/>
+        <dsp:cNvSpPr/>
+      </dsp:nvSpPr>
+      <dsp:spPr>
+        <a:xfrm>
+          <a:off x="482961" y="4351325"/>
+          <a:ext cx="878111" cy="878111"/>
+        </a:xfrm>
+        <a:prstGeom prst="rect">
+          <a:avLst/>
+        </a:prstGeom>
+        <a:blipFill>
+          <a:blip xmlns:r="http://schemas.openxmlformats.org/officeDocument/2006/relationships" r:embed="rId4">
+            <a:duotone>
+              <a:schemeClr val="accent2">
+                <a:shade val="45000"/>
+                <a:satMod val="135000"/>
+              </a:schemeClr>
+              <a:prstClr val="white"/>
+            </a:duotone>
+          </a:blip>
+          <a:srcRect/>
+          <a:stretch>
+            <a:fillRect/>
+          </a:stretch>
+        </a:blipFill>
+        <a:ln w="19050" cap="flat" cmpd="sng" algn="ctr">
+          <a:noFill/>
+          <a:prstDash val="solid"/>
+          <a:miter lim="800000"/>
+        </a:ln>
+        <a:effectLst/>
+      </dsp:spPr>
+      <dsp:style>
+        <a:lnRef idx="2">
+          <a:scrgbClr r="0" g="0" b="0"/>
+        </a:lnRef>
+        <a:fillRef idx="1">
+          <a:scrgbClr r="0" g="0" b="0"/>
+        </a:fillRef>
+        <a:effectRef idx="0">
+          <a:scrgbClr r="0" g="0" b="0"/>
+        </a:effectRef>
+        <a:fontRef idx="minor">
+          <a:schemeClr val="lt1"/>
+        </a:fontRef>
+      </dsp:style>
+    </dsp:sp>
+    <dsp:sp modelId="{F59DEA38-CACF-498D-B419-F31149405DE3}">
+      <dsp:nvSpPr>
+        <dsp:cNvPr id="0" name=""/>
+        <dsp:cNvSpPr/>
+      </dsp:nvSpPr>
+      <dsp:spPr>
+        <a:xfrm>
+          <a:off x="1844034" y="3992098"/>
+          <a:ext cx="4401230" cy="1596566"/>
+        </a:xfrm>
+        <a:prstGeom prst="rect">
+          <a:avLst/>
+        </a:prstGeom>
+        <a:noFill/>
+        <a:ln>
+          <a:noFill/>
+        </a:ln>
+        <a:effectLst/>
+      </dsp:spPr>
+      <dsp:style>
+        <a:lnRef idx="0">
+          <a:scrgbClr r="0" g="0" b="0"/>
+        </a:lnRef>
+        <a:fillRef idx="0">
+          <a:scrgbClr r="0" g="0" b="0"/>
+        </a:fillRef>
+        <a:effectRef idx="0">
+          <a:scrgbClr r="0" g="0" b="0"/>
+        </a:effectRef>
+        <a:fontRef idx="minor"/>
+      </dsp:style>
+      <dsp:txBody>
+        <a:bodyPr spcFirstLastPara="0" vert="horz" wrap="square" lIns="168970" tIns="168970" rIns="168970" bIns="168970" numCol="1" spcCol="1270" anchor="ctr" anchorCtr="0">
+          <a:noAutofit/>
+        </a:bodyPr>
+        <a:lstStyle/>
+        <a:p>
+          <a:pPr marL="0" lvl="0" indent="0" algn="l" defTabSz="1111250">
+            <a:lnSpc>
+              <a:spcPct val="90000"/>
+            </a:lnSpc>
+            <a:spcBef>
+              <a:spcPct val="0"/>
+            </a:spcBef>
+            <a:spcAft>
+              <a:spcPct val="35000"/>
+            </a:spcAft>
+            <a:buNone/>
+          </a:pPr>
+          <a:r>
+            <a:rPr lang="en-US" sz="2500" kern="1200" dirty="0"/>
+            <a:t>Switched from initial IMU pick to another to avoid level shifting data line</a:t>
+          </a:r>
+        </a:p>
+      </dsp:txBody>
+      <dsp:txXfrm>
+        <a:off x="1844034" y="3992098"/>
+        <a:ext cx="4401230" cy="1596566"/>
+      </dsp:txXfrm>
+    </dsp:sp>
+  </dsp:spTree>
+</dsp:drawing>
+</file>
+
+<file path=ppt/diagrams/layout1.xml><?xml version="1.0" encoding="utf-8"?>
+<dgm:layoutDef xmlns:dgm="http://schemas.openxmlformats.org/drawingml/2006/diagram" xmlns:a="http://schemas.openxmlformats.org/drawingml/2006/main" uniqueId="urn:microsoft.com/office/officeart/2018/2/layout/IconVerticalSolidList">
+  <dgm:title val="Icon Vertical Solid List"/>
+  <dgm:desc val="Use to show a series of visuals from top to bottom with Level 1 or Level 1 and Level 2 text grouped in a shape. Works best with icons or small pictures with lengthier descriptions."/>
+  <dgm:catLst>
+    <dgm:cat type="icon" pri="500"/>
+  </dgm:catLst>
+  <dgm:sampData useDef="1">
+    <dgm:dataModel>
+      <dgm:ptLst/>
+      <dgm:bg/>
+      <dgm:whole/>
+    </dgm:dataModel>
+  </dgm:sampData>
+  <dgm:styleData useDef="1">
+    <dgm:dataModel>
+      <dgm:ptLst/>
+      <dgm:bg/>
+      <dgm:whole/>
+    </dgm:dataModel>
+  </dgm:styleData>
+  <dgm:clrData useDef="1">
+    <dgm:dataModel>
+      <dgm:ptLst/>
+      <dgm:bg/>
+      <dgm:whole/>
+    </dgm:dataModel>
+  </dgm:clrData>
+  <dgm:layoutNode name="root">
+    <dgm:varLst>
+      <dgm:dir/>
+      <dgm:resizeHandles val="exact"/>
+    </dgm:varLst>
+    <dgm:choose name="Name0">
+      <dgm:if name="Name1" axis="self" func="var" arg="dir" op="equ" val="norm">
+        <dgm:alg type="lin">
+          <dgm:param type="linDir" val="fromT"/>
+          <dgm:param type="nodeHorzAlign" val="l"/>
+        </dgm:alg>
+      </dgm:if>
+      <dgm:else name="Name2">
+        <dgm:alg type="lin">
+          <dgm:param type="linDir" val="fromT"/>
+          <dgm:param type="nodeHorzAlign" val="r"/>
+        </dgm:alg>
+      </dgm:else>
+    </dgm:choose>
+    <dgm:shape xmlns:r="http://schemas.openxmlformats.org/officeDocument/2006/relationships" r:blip="">
+      <dgm:adjLst/>
+    </dgm:shape>
+    <dgm:presOf/>
+    <dgm:choose name="Name3">
+      <dgm:if name="Name4" axis="ch" ptType="node" func="cnt" op="lte" val="3">
+        <dgm:constrLst>
+          <dgm:constr type="h" for="ch" forName="compNode" refType="h" fact="0.3"/>
+          <dgm:constr type="w" for="ch" forName="compNode" refType="w"/>
+          <dgm:constr type="h" for="ch" forName="sibTrans" refType="h" refFor="ch" refForName="compNode" fact="0.25"/>
+          <dgm:constr type="primFontSz" for="des" forName="parTx" val="25"/>
+          <dgm:constr type="primFontSz" for="des" forName="desTx" refType="primFontSz" refFor="des" refForName="parTx" op="lte" fact="0.75"/>
+          <dgm:constr type="h" for="des" forName="compNode" op="equ"/>
+          <dgm:constr type="h" for="des" forName="bgRect" op="equ"/>
+          <dgm:constr type="h" for="des" forName="iconRect" op="equ"/>
+          <dgm:constr type="w" for="des" forName="iconRect" op="equ"/>
+          <dgm:constr type="h" for="des" forName="spaceRect" op="equ"/>
+          <dgm:constr type="h" for="des" forName="parTx" op="equ"/>
+          <dgm:constr type="h" for="des" forName="desTx" op="equ"/>
+        </dgm:constrLst>
+      </dgm:if>
+      <dgm:if name="Name5" axis="ch" ptType="node" func="cnt" op="lte" val="4">
+        <dgm:constrLst>
+          <dgm:constr type="h" for="ch" forName="compNode" refType="h" fact="0.3"/>
+          <dgm:constr type="w" for="ch" forName="compNode" refType="w"/>
+          <dgm:constr type="h" for="ch" forName="sibTrans" refType="h" refFor="ch" refForName="compNode" fact="0.25"/>
+          <dgm:constr type="primFontSz" for="des" forName="parTx" val="22"/>
+          <dgm:constr type="primFontSz" for="des" forName="desTx" refType="primFontSz" refFor="des" refForName="parTx" op="lte" fact="0.75"/>
+          <dgm:constr type="h" for="des" forName="compNode" op="equ"/>
+          <dgm:constr type="h" for="des" forName="bgRect" op="equ"/>
+          <dgm:constr type="h" for="des" forName="iconRect" op="equ"/>
+          <dgm:constr type="w" for="des" forName="iconRect" op="equ"/>
+          <dgm:constr type="h" for="des" forName="spaceRect" op="equ"/>
+          <dgm:constr type="h" for="des" forName="parTx" op="equ"/>
+          <dgm:constr type="h" for="des" forName="desTx" op="equ"/>
+        </dgm:constrLst>
+      </dgm:if>
+      <dgm:if name="Name6" axis="ch" ptType="node" func="cnt" op="lte" val="6">
+        <dgm:constrLst>
+          <dgm:constr type="h" for="ch" forName="compNode" refType="h" fact="0.3"/>
+          <dgm:constr type="w" for="ch" forName="compNode" refType="w"/>
+          <dgm:constr type="h" for="ch" forName="sibTrans" refType="h" refFor="ch" refForName="compNode" fact="0.25"/>
+          <dgm:constr type="primFontSz" for="des" forName="parTx" val="19"/>
+          <dgm:constr type="primFontSz" for="des" forName="desTx" refType="primFontSz" refFor="des" refForName="parTx" op="lte" fact="0.75"/>
+          <dgm:constr type="h" for="des" forName="compNode" op="equ"/>
+          <dgm:constr type="h" for="des" forName="bgRect" op="equ"/>
+          <dgm:constr type="h" for="des" forName="iconRect" op="equ"/>
+          <dgm:constr type="w" for="des" forName="iconRect" op="equ"/>
+          <dgm:constr type="h" for="des" forName="spaceRect" op="equ"/>
+          <dgm:constr type="h" for="des" forName="parTx" op="equ"/>
+          <dgm:constr type="h" for="des" forName="desTx" op="equ"/>
+        </dgm:constrLst>
+      </dgm:if>
+      <dgm:else name="Name7">
+        <dgm:constrLst>
+          <dgm:constr type="h" for="ch" forName="compNode" refType="h" fact="0.3"/>
+          <dgm:constr type="w" for="ch" forName="compNode" refType="w"/>
+          <dgm:constr type="h" for="ch" forName="sibTrans" refType="h" refFor="ch" refForName="compNode" fact="0.25"/>
+          <dgm:constr type="primFontSz" for="des" forName="parTx" val="16"/>
+          <dgm:constr type="primFontSz" for="des" forName="desTx" refType="primFontSz" refFor="des" refForName="parTx" op="lte" fact="0.75"/>
+          <dgm:constr type="h" for="des" forName="compNode" op="equ"/>
+          <dgm:constr type="h" for="des" forName="bgRect" op="equ"/>
+          <dgm:constr type="h" for="des" forName="iconRect" op="equ"/>
+          <dgm:constr type="w" for="des" forName="iconRect" op="equ"/>
+          <dgm:constr type="h" for="des" forName="spaceRect" op="equ"/>
+          <dgm:constr type="h" for="des" forName="parTx" op="equ"/>
+          <dgm:constr type="h" for="des" forName="desTx" op="equ"/>
+        </dgm:constrLst>
+      </dgm:else>
+    </dgm:choose>
+    <dgm:ruleLst>
+      <dgm:rule type="h" for="ch" forName="compNode" val="0" fact="NaN" max="NaN"/>
+    </dgm:ruleLst>
+    <dgm:forEach name="Name8" axis="ch" ptType="node">
+      <dgm:layoutNode name="compNode">
+        <dgm:alg type="composite"/>
+        <dgm:shape xmlns:r="http://schemas.openxmlformats.org/officeDocument/2006/relationships" r:blip="">
+          <dgm:adjLst/>
+        </dgm:shape>
+        <dgm:presOf axis="self"/>
+        <dgm:choose name="Name9">
+          <dgm:if name="Name10" axis="ch" ptType="node" func="cnt" op="gte" val="1">
+            <dgm:constrLst>
+              <dgm:constr type="w" for="ch" forName="bgRect" refType="w"/>
+              <dgm:constr type="h" for="ch" forName="bgRect" refType="h"/>
+              <dgm:constr type="l" for="ch" forName="bgRect"/>
+              <dgm:constr type="t" for="ch" forName="bgRect"/>
+              <dgm:constr type="h" for="ch" forName="iconRect" refType="h" fact="0.55"/>
+              <dgm:constr type="w" for="ch" forName="iconRect" refType="h" refFor="ch" refForName="iconRect"/>
+              <dgm:constr type="l" for="ch" forName="iconRect" refType="h" refFor="ch" refForName="iconRect" fact="0.55"/>
+              <dgm:constr type="ctrY" for="ch" forName="iconRect" refType="ctrY" refFor="ch" refForName="bgRect"/>
+              <dgm:constr type="w" for="ch" forName="spaceRect" refType="l" refFor="ch" refForName="iconRect"/>
+              <dgm:constr type="h" for="ch" forName="spaceRect" refType="h"/>
+              <dgm:constr type="l" for="ch" forName="spaceRect" refType="r" refFor="ch" refForName="iconRect"/>
+              <dgm:constr type="t" for="ch" forName="spaceRect"/>
+              <dgm:constr type="w" for="ch" forName="parTx" refType="w" fact="0.45"/>
+              <dgm:constr type="h" for="ch" forName="parTx" refType="h"/>
+              <dgm:constr type="l" for="ch" forName="parTx" refType="r" refFor="ch" refForName="spaceRect"/>
+              <dgm:constr type="t" for="ch" forName="parTx"/>
+              <dgm:constr type="h" for="ch" forName="desTx" refType="h"/>
+              <dgm:constr type="l" for="ch" forName="desTx" refType="r" refFor="ch" refForName="parTx"/>
+              <dgm:constr type="t" for="ch" forName="desTx"/>
+            </dgm:constrLst>
+          </dgm:if>
+          <dgm:else name="Name11">
+            <dgm:constrLst>
+              <dgm:constr type="w" for="ch" forName="bgRect" refType="w"/>
+              <dgm:constr type="h" for="ch" forName="bgRect" refType="h"/>
+              <dgm:constr type="l" for="ch" forName="bgRect"/>
+              <dgm:constr type="t" for="ch" forName="bgRect"/>
+              <dgm:constr type="h" for="ch" forName="iconRect" refType="h" fact="0.55"/>
+              <dgm:constr type="w" for="ch" forName="iconRect" refType="h" refFor="ch" refForName="iconRect"/>
+              <dgm:constr type="l" for="ch" forName="iconRect" refType="h" refFor="ch" refForName="iconRect" fact="0.55"/>
+              <dgm:constr type="ctrY" for="ch" forName="iconRect" refType="ctrY" refFor="ch" refForName="bgRect"/>
+              <dgm:constr type="w" for="ch" forName="spaceRect" refType="l" refFor="ch" refForName="iconRect"/>
+              <dgm:constr type="h" for="ch" forName="spaceRect" refType="h"/>
+              <dgm:constr type="l" for="ch" forName="spaceRect" refType="r" refFor="ch" refForName="iconRect"/>
+              <dgm:constr type="t" for="ch" forName="spaceRect"/>
+              <dgm:constr type="h" for="ch" forName="parTx" refType="h"/>
+              <dgm:constr type="l" for="ch" forName="parTx" refType="r" refFor="ch" refForName="spaceRect"/>
+              <dgm:constr type="t" for="ch" forName="parTx"/>
+            </dgm:constrLst>
+          </dgm:else>
+        </dgm:choose>
+        <dgm:ruleLst>
+          <dgm:rule type="h" val="INF" fact="NaN" max="NaN"/>
+        </dgm:ruleLst>
+        <dgm:layoutNode name="bgRect" styleLbl="bgShp">
+          <dgm:alg type="sp"/>
+          <dgm:shape xmlns:r="http://schemas.openxmlformats.org/officeDocument/2006/relationships" type="roundRect" r:blip="">
+            <dgm:adjLst>
+              <dgm:adj idx="1" val="0.1"/>
+            </dgm:adjLst>
+          </dgm:shape>
+          <dgm:presOf/>
+          <dgm:constrLst/>
+          <dgm:ruleLst/>
+        </dgm:layoutNode>
+        <dgm:layoutNode name="iconRect" styleLbl="node1">
+          <dgm:alg type="sp"/>
+          <dgm:shape xmlns:r="http://schemas.openxmlformats.org/officeDocument/2006/relationships" type="rect" r:blip="" blipPhldr="1">
+            <dgm:adjLst/>
+          </dgm:shape>
+          <dgm:presOf/>
+          <dgm:constrLst/>
+          <dgm:ruleLst/>
+        </dgm:layoutNode>
+        <dgm:layoutNode name="spaceRect">
+          <dgm:alg type="sp"/>
+          <dgm:shape xmlns:r="http://schemas.openxmlformats.org/officeDocument/2006/relationships" r:blip="">
+            <dgm:adjLst/>
+          </dgm:shape>
+          <dgm:presOf/>
+          <dgm:constrLst/>
+          <dgm:ruleLst/>
+        </dgm:layoutNode>
+        <dgm:layoutNode name="parTx" styleLbl="revTx">
+          <dgm:varLst>
+            <dgm:chMax val="0"/>
+            <dgm:chPref val="0"/>
+          </dgm:varLst>
+          <dgm:alg type="tx">
+            <dgm:param type="txAnchorVert" val="mid"/>
+            <dgm:param type="parTxLTRAlign" val="l"/>
+            <dgm:param type="shpTxLTRAlignCh" val="l"/>
+            <dgm:param type="parTxRTLAlign" val="r"/>
+            <dgm:param type="shpTxRTLAlignCh" val="r"/>
+          </dgm:alg>
+          <dgm:shape xmlns:r="http://schemas.openxmlformats.org/officeDocument/2006/relationships" type="rect" r:blip="">
+            <dgm:adjLst/>
+          </dgm:shape>
+          <dgm:presOf axis="self" ptType="node"/>
+          <dgm:constrLst>
+            <dgm:constr type="lMarg" refType="h" fact="0.3"/>
+            <dgm:constr type="rMarg" refType="h" fact="0.3"/>
+            <dgm:constr type="tMarg" refType="h" fact="0.3"/>
+            <dgm:constr type="bMarg" refType="h" fact="0.3"/>
+          </dgm:constrLst>
+          <dgm:ruleLst>
+            <dgm:rule type="primFontSz" val="14" fact="NaN" max="NaN"/>
+            <dgm:rule type="h" val="INF" fact="NaN" max="NaN"/>
+          </dgm:ruleLst>
+        </dgm:layoutNode>
+        <dgm:choose name="Name12">
+          <dgm:if name="Name13" axis="ch" ptType="node" func="cnt" op="gte" val="1">
+            <dgm:layoutNode name="desTx" styleLbl="revTx">
+              <dgm:varLst/>
+              <dgm:alg type="tx">
+                <dgm:param type="txAnchorVertCh" val="mid"/>
+                <dgm:param type="parTxLTRAlign" val="l"/>
+                <dgm:param type="shpTxLTRAlignCh" val="l"/>
+                <dgm:param type="parTxRTLAlign" val="r"/>
+                <dgm:param type="shpTxRTLAlignCh" val="r"/>
+                <dgm:param type="stBulletLvl" val="0"/>
+              </dgm:alg>
+              <dgm:shape xmlns:r="http://schemas.openxmlformats.org/officeDocument/2006/relationships" type="rect" r:blip="">
+                <dgm:adjLst/>
+              </dgm:shape>
+              <dgm:presOf axis="des" ptType="node"/>
+              <dgm:constrLst>
+                <dgm:constr type="primFontSz" val="18"/>
+                <dgm:constr type="secFontSz" refType="primFontSz"/>
+                <dgm:constr type="lMarg" refType="h" fact="0.3"/>
+                <dgm:constr type="rMarg" refType="h" fact="0.3"/>
+                <dgm:constr type="tMarg" refType="h" fact="0.3"/>
+                <dgm:constr type="bMarg" refType="h" fact="0.3"/>
+              </dgm:constrLst>
+              <dgm:ruleLst>
+                <dgm:rule type="primFontSz" val="11" fact="NaN" max="NaN"/>
+              </dgm:ruleLst>
+            </dgm:layoutNode>
+          </dgm:if>
+          <dgm:else name="Name14"/>
+        </dgm:choose>
+      </dgm:layoutNode>
+      <dgm:forEach name="Name15" axis="followSib" ptType="sibTrans" cnt="1">
+        <dgm:layoutNode name="sibTrans">
+          <dgm:alg type="sp"/>
+          <dgm:shape xmlns:r="http://schemas.openxmlformats.org/officeDocument/2006/relationships" r:blip="">
+            <dgm:adjLst/>
+          </dgm:shape>
+          <dgm:presOf axis="self"/>
+          <dgm:constrLst/>
+          <dgm:ruleLst/>
+        </dgm:layoutNode>
+      </dgm:forEach>
+    </dgm:forEach>
+  </dgm:layoutNode>
+  <dgm:extLst>
+    <a:ext uri="{68A01E43-0DF5-4B5B-8FA6-DAF915123BFB}">
+      <dgm1612:lstStyle xmlns:dgm1612="http://schemas.microsoft.com/office/drawing/2016/12/diagram">
+        <a:lvl1pPr>
+          <a:lnSpc>
+            <a:spcPct val="100000"/>
+          </a:lnSpc>
+        </a:lvl1pPr>
+        <a:lvl2pPr>
+          <a:lnSpc>
+            <a:spcPct val="100000"/>
+          </a:lnSpc>
+        </a:lvl2pPr>
+      </dgm1612:lstStyle>
+    </a:ext>
+  </dgm:extLst>
+</dgm:layoutDef>
+</file>
+
+<file path=ppt/diagrams/quickStyle1.xml><?xml version="1.0" encoding="utf-8"?>
+<dgm:styleDef xmlns:dgm="http://schemas.openxmlformats.org/drawingml/2006/diagram" xmlns:a="http://schemas.openxmlformats.org/drawingml/2006/main" uniqueId="urn:microsoft.com/office/officeart/2005/8/quickstyle/simple1">
+  <dgm:title val=""/>
+  <dgm:desc val=""/>
+  <dgm:catLst>
+    <dgm:cat type="simple" pri="10100"/>
+  </dgm:catLst>
+  <dgm:scene3d>
+    <a:camera prst="orthographicFront"/>
+    <a:lightRig rig="threePt" dir="t"/>
+  </dgm:scene3d>
+  <dgm:styleLbl name="node0">
+    <dgm:scene3d>
+      <a:camera prst="orthographicFront"/>
+      <a:lightRig rig="threePt" dir="t"/>
+    </dgm:scene3d>
+    <dgm:sp3d/>
+    <dgm:txPr/>
+    <dgm:style>
+      <a:lnRef idx="2">
+        <a:scrgbClr r="0" g="0" b="0"/>
+      </a:lnRef>
+      <a:fillRef idx="1">
+        <a:scrgbClr r="0" g="0" b="0"/>
+      </a:fillRef>
+      <a:effectRef idx="0">
+        <a:scrgbClr r="0" g="0" b="0"/>
+      </a:effectRef>
+      <a:fontRef idx="minor">
+        <a:schemeClr val="lt1"/>
+      </a:fontRef>
+    </dgm:style>
+  </dgm:styleLbl>
+  <dgm:styleLbl name="lnNode1">
+    <dgm:scene3d>
+      <a:camera prst="orthographicFront"/>
+      <a:lightRig rig="threePt" dir="t"/>
+    </dgm:scene3d>
+    <dgm:sp3d/>
+    <dgm:txPr/>
+    <dgm:style>
+      <a:lnRef idx="2">
+        <a:scrgbClr r="0" g="0" b="0"/>
+      </a:lnRef>
+      <a:fillRef idx="1">
+        <a:scrgbClr r="0" g="0" b="0"/>
+      </a:fillRef>
+      <a:effectRef idx="0">
+        <a:scrgbClr r="0" g="0" b="0"/>
+      </a:effectRef>
+      <a:fontRef idx="minor">
+        <a:schemeClr val="lt1"/>
+      </a:fontRef>
+    </dgm:style>
+  </dgm:styleLbl>
+  <dgm:styleLbl name="vennNode1">
+    <dgm:scene3d>
+      <a:camera prst="orthographicFront"/>
+      <a:lightRig rig="threePt" dir="t"/>
+    </dgm:scene3d>
+    <dgm:sp3d/>
+    <dgm:txPr/>
+    <dgm:style>
+      <a:lnRef idx="2">
+        <a:scrgbClr r="0" g="0" b="0"/>
+      </a:lnRef>
+      <a:fillRef idx="1">
+        <a:scrgbClr r="0" g="0" b="0"/>
+      </a:fillRef>
+      <a:effectRef idx="0">
+        <a:scrgbClr r="0" g="0" b="0"/>
+      </a:effectRef>
+      <a:fontRef idx="minor">
+        <a:schemeClr val="tx1"/>
+      </a:fontRef>
+    </dgm:style>
+  </dgm:styleLbl>
+  <dgm:styleLbl name="alignNode1">
+    <dgm:scene3d>
+      <a:camera prst="orthographicFront"/>
+      <a:lightRig rig="threePt" dir="t"/>
+    </dgm:scene3d>
+    <dgm:sp3d/>
+    <dgm:txPr/>
+    <dgm:style>
+      <a:lnRef idx="2">
+        <a:scrgbClr r="0" g="0" b="0"/>
+      </a:lnRef>
+      <a:fillRef idx="1">
+        <a:scrgbClr r="0" g="0" b="0"/>
+      </a:fillRef>
+      <a:effectRef idx="0">
+        <a:scrgbClr r="0" g="0" b="0"/>
+      </a:effectRef>
+      <a:fontRef idx="minor">
+        <a:schemeClr val="lt1"/>
+      </a:fontRef>
+    </dgm:style>
+  </dgm:styleLbl>
+  <dgm:styleLbl name="node1">
+    <dgm:scene3d>
+      <a:camera prst="orthographicFront"/>
+      <a:lightRig rig="threePt" dir="t"/>
+    </dgm:scene3d>
+    <dgm:sp3d/>
+    <dgm:txPr/>
+    <dgm:style>
+      <a:lnRef idx="2">
+        <a:scrgbClr r="0" g="0" b="0"/>
+      </a:lnRef>
+      <a:fillRef idx="1">
+        <a:scrgbClr r="0" g="0" b="0"/>
+      </a:fillRef>
+      <a:effectRef idx="0">
+        <a:scrgbClr r="0" g="0" b="0"/>
+      </a:effectRef>
+      <a:fontRef idx="minor">
+        <a:schemeClr val="lt1"/>
+      </a:fontRef>
+    </dgm:style>
+  </dgm:styleLbl>
+  <dgm:styleLbl name="node2">
+    <dgm:scene3d>
+      <a:camera prst="orthographicFront"/>
+      <a:lightRig rig="threePt" dir="t"/>
+    </dgm:scene3d>
+    <dgm:sp3d/>
+    <dgm:txPr/>
+    <dgm:style>
+      <a:lnRef idx="2">
+        <a:scrgbClr r="0" g="0" b="0"/>
+      </a:lnRef>
+      <a:fillRef idx="1">
+        <a:scrgbClr r="0" g="0" b="0"/>
+      </a:fillRef>
+      <a:effectRef idx="0">
+        <a:scrgbClr r="0" g="0" b="0"/>
+      </a:effectRef>
+      <a:fontRef idx="minor">
+        <a:schemeClr val="lt1"/>
+      </a:fontRef>
+    </dgm:style>
+  </dgm:styleLbl>
+  <dgm:styleLbl name="node3">
+    <dgm:scene3d>
+      <a:camera prst="orthographicFront"/>
+      <a:lightRig rig="threePt" dir="t"/>
+    </dgm:scene3d>
+    <dgm:sp3d/>
+    <dgm:txPr/>
+    <dgm:style>
+      <a:lnRef idx="2">
+        <a:scrgbClr r="0" g="0" b="0"/>
+      </a:lnRef>
+      <a:fillRef idx="1">
+        <a:scrgbClr r="0" g="0" b="0"/>
+      </a:fillRef>
+      <a:effectRef idx="0">
+        <a:scrgbClr r="0" g="0" b="0"/>
+      </a:effectRef>
+      <a:fontRef idx="minor">
+        <a:schemeClr val="lt1"/>
+      </a:fontRef>
+    </dgm:style>
+  </dgm:styleLbl>
+  <dgm:styleLbl name="node4">
+    <dgm:scene3d>
+      <a:camera prst="orthographicFront"/>
+      <a:lightRig rig="threePt" dir="t"/>
+    </dgm:scene3d>
+    <dgm:sp3d/>
+    <dgm:txPr/>
+    <dgm:style>
+      <a:lnRef idx="2">
+        <a:scrgbClr r="0" g="0" b="0"/>
+      </a:lnRef>
+      <a:fillRef idx="1">
+        <a:scrgbClr r="0" g="0" b="0"/>
+      </a:fillRef>
+      <a:effectRef idx="0">
+        <a:scrgbClr r="0" g="0" b="0"/>
+      </a:effectRef>
+      <a:fontRef idx="minor">
+        <a:schemeClr val="lt1"/>
+      </a:fontRef>
+    </dgm:style>
+  </dgm:styleLbl>
+  <dgm:styleLbl name="fgImgPlace1">
+    <dgm:scene3d>
+      <a:camera prst="orthographicFront"/>
+      <a:lightRig rig="threePt" dir="t"/>
+    </dgm:scene3d>
+    <dgm:sp3d/>
+    <dgm:txPr/>
+    <dgm:style>
+      <a:lnRef idx="2">
+        <a:scrgbClr r="0" g="0" b="0"/>
+      </a:lnRef>
+      <a:fillRef idx="1">
+        <a:scrgbClr r="0" g="0" b="0"/>
+      </a:fillRef>
+      <a:effectRef idx="0">
+        <a:scrgbClr r="0" g="0" b="0"/>
+      </a:effectRef>
+      <a:fontRef idx="minor"/>
+    </dgm:style>
+  </dgm:styleLbl>
+  <dgm:styleLbl name="alignImgPlace1">
+    <dgm:scene3d>
+      <a:camera prst="orthographicFront"/>
+      <a:lightRig rig="threePt" dir="t"/>
+    </dgm:scene3d>
+    <dgm:sp3d/>
+    <dgm:txPr/>
+    <dgm:style>
+      <a:lnRef idx="2">
+        <a:scrgbClr r="0" g="0" b="0"/>
+      </a:lnRef>
+      <a:fillRef idx="1">
+        <a:scrgbClr r="0" g="0" b="0"/>
+      </a:fillRef>
+      <a:effectRef idx="0">
+        <a:scrgbClr r="0" g="0" b="0"/>
+      </a:effectRef>
+      <a:fontRef idx="minor"/>
+    </dgm:style>
+  </dgm:styleLbl>
+  <dgm:styleLbl name="bgImgPlace1">
+    <dgm:scene3d>
+      <a:camera prst="orthographicFront"/>
+      <a:lightRig rig="threePt" dir="t"/>
+    </dgm:scene3d>
+    <dgm:sp3d/>
+    <dgm:txPr/>
+    <dgm:style>
+      <a:lnRef idx="2">
+        <a:scrgbClr r="0" g="0" b="0"/>
+      </a:lnRef>
+      <a:fillRef idx="1">
+        <a:scrgbClr r="0" g="0" b="0"/>
+      </a:fillRef>
+      <a:effectRef idx="0">
+        <a:scrgbClr r="0" g="0" b="0"/>
+      </a:effectRef>
+      <a:fontRef idx="minor"/>
+    </dgm:style>
+  </dgm:styleLbl>
+  <dgm:styleLbl name="sibTrans2D1">
+    <dgm:scene3d>
+      <a:camera prst="orthographicFront"/>
+      <a:lightRig rig="threePt" dir="t"/>
+    </dgm:scene3d>
+    <dgm:sp3d/>
+    <dgm:txPr/>
+    <dgm:style>
+      <a:lnRef idx="0">
+        <a:scrgbClr r="0" g="0" b="0"/>
+      </a:lnRef>
+      <a:fillRef idx="1">
+        <a:scrgbClr r="0" g="0" b="0"/>
+      </a:fillRef>
+      <a:effectRef idx="0">
+        <a:scrgbClr r="0" g="0" b="0"/>
+      </a:effectRef>
+      <a:fontRef idx="minor">
+        <a:schemeClr val="lt1"/>
+      </a:fontRef>
+    </dgm:style>
+  </dgm:styleLbl>
+  <dgm:styleLbl name="fgSibTrans2D1">
+    <dgm:scene3d>
+      <a:camera prst="orthographicFront"/>
+      <a:lightRig rig="threePt" dir="t"/>
+    </dgm:scene3d>
+    <dgm:sp3d/>
+    <dgm:txPr/>
+    <dgm:style>
+      <a:lnRef idx="0">
+        <a:scrgbClr r="0" g="0" b="0"/>
+      </a:lnRef>
+      <a:fillRef idx="1">
+        <a:scrgbClr r="0" g="0" b="0"/>
+      </a:fillRef>
+      <a:effectRef idx="0">
+        <a:scrgbClr r="0" g="0" b="0"/>
+      </a:effectRef>
+      <a:fontRef idx="minor">
+        <a:schemeClr val="lt1"/>
+      </a:fontRef>
+    </dgm:style>
+  </dgm:styleLbl>
+  <dgm:styleLbl name="bgSibTrans2D1">
+    <dgm:scene3d>
+      <a:camera prst="orthographicFront"/>
+      <a:lightRig rig="threePt" dir="t"/>
+    </dgm:scene3d>
+    <dgm:sp3d/>
+    <dgm:txPr/>
+    <dgm:style>
+      <a:lnRef idx="0">
+        <a:scrgbClr r="0" g="0" b="0"/>
+      </a:lnRef>
+      <a:fillRef idx="1">
+        <a:scrgbClr r="0" g="0" b="0"/>
+      </a:fillRef>
+      <a:effectRef idx="0">
+        <a:scrgbClr r="0" g="0" b="0"/>
+      </a:effectRef>
+      <a:fontRef idx="minor">
+        <a:schemeClr val="lt1"/>
+      </a:fontRef>
+    </dgm:style>
+  </dgm:styleLbl>
+  <dgm:styleLbl name="sibTrans1D1">
+    <dgm:scene3d>
+      <a:camera prst="orthographicFront"/>
+      <a:lightRig rig="threePt" dir="t"/>
+    </dgm:scene3d>
+    <dgm:sp3d/>
+    <dgm:txPr/>
+    <dgm:style>
+      <a:lnRef idx="1">
+        <a:scrgbClr r="0" g="0" b="0"/>
+      </a:lnRef>
+      <a:fillRef idx="0">
+        <a:scrgbClr r="0" g="0" b="0"/>
+      </a:fillRef>
+      <a:effectRef idx="0">
+        <a:scrgbClr r="0" g="0" b="0"/>
+      </a:effectRef>
+      <a:fontRef idx="minor"/>
+    </dgm:style>
+  </dgm:styleLbl>
+  <dgm:styleLbl name="callout">
+    <dgm:scene3d>
+      <a:camera prst="orthographicFront"/>
+      <a:lightRig rig="threePt" dir="t"/>
+    </dgm:scene3d>
+    <dgm:sp3d/>
+    <dgm:txPr/>
+    <dgm:style>
+      <a:lnRef idx="2">
+        <a:scrgbClr r="0" g="0" b="0"/>
+      </a:lnRef>
+      <a:fillRef idx="1">
+        <a:scrgbClr r="0" g="0" b="0"/>
+      </a:fillRef>
+      <a:effectRef idx="0">
+        <a:scrgbClr r="0" g="0" b="0"/>
+      </a:effectRef>
+      <a:fontRef idx="minor"/>
+    </dgm:style>
+  </dgm:styleLbl>
+  <dgm:styleLbl name="asst0">
+    <dgm:scene3d>
+      <a:camera prst="orthographicFront"/>
+      <a:lightRig rig="threePt" dir="t"/>
+    </dgm:scene3d>
+    <dgm:sp3d/>
+    <dgm:txPr/>
+    <dgm:style>
+      <a:lnRef idx="2">
+        <a:scrgbClr r="0" g="0" b="0"/>
+      </a:lnRef>
+      <a:fillRef idx="1">
+        <a:scrgbClr r="0" g="0" b="0"/>
+      </a:fillRef>
+      <a:effectRef idx="0">
+        <a:scrgbClr r="0" g="0" b="0"/>
+      </a:effectRef>
+      <a:fontRef idx="minor">
+        <a:schemeClr val="lt1"/>
+      </a:fontRef>
+    </dgm:style>
+  </dgm:styleLbl>
+  <dgm:styleLbl name="asst1">
+    <dgm:scene3d>
+      <a:camera prst="orthographicFront"/>
+      <a:lightRig rig="threePt" dir="t"/>
+    </dgm:scene3d>
+    <dgm:sp3d/>
+    <dgm:txPr/>
+    <dgm:style>
+      <a:lnRef idx="2">
+        <a:scrgbClr r="0" g="0" b="0"/>
+      </a:lnRef>
+      <a:fillRef idx="1">
+        <a:scrgbClr r="0" g="0" b="0"/>
+      </a:fillRef>
+      <a:effectRef idx="0">
+        <a:scrgbClr r="0" g="0" b="0"/>
+      </a:effectRef>
+      <a:fontRef idx="minor">
+        <a:schemeClr val="lt1"/>
+      </a:fontRef>
+    </dgm:style>
+  </dgm:styleLbl>
+  <dgm:styleLbl name="asst2">
+    <dgm:scene3d>
+      <a:camera prst="orthographicFront"/>
+      <a:lightRig rig="threePt" dir="t"/>
+    </dgm:scene3d>
+    <dgm:sp3d/>
+    <dgm:txPr/>
+    <dgm:style>
+      <a:lnRef idx="2">
+        <a:scrgbClr r="0" g="0" b="0"/>
+      </a:lnRef>
+      <a:fillRef idx="1">
+        <a:scrgbClr r="0" g="0" b="0"/>
+      </a:fillRef>
+      <a:effectRef idx="0">
+        <a:scrgbClr r="0" g="0" b="0"/>
+      </a:effectRef>
+      <a:fontRef idx="minor">
+        <a:schemeClr val="lt1"/>
+      </a:fontRef>
+    </dgm:style>
+  </dgm:styleLbl>
+  <dgm:styleLbl name="asst3">
+    <dgm:scene3d>
+      <a:camera prst="orthographicFront"/>
+      <a:lightRig rig="threePt" dir="t"/>
+    </dgm:scene3d>
+    <dgm:sp3d/>
+    <dgm:txPr/>
+    <dgm:style>
+      <a:lnRef idx="2">
+        <a:scrgbClr r="0" g="0" b="0"/>
+      </a:lnRef>
+      <a:fillRef idx="1">
+        <a:scrgbClr r="0" g="0" b="0"/>
+      </a:fillRef>
+      <a:effectRef idx="0">
+        <a:scrgbClr r="0" g="0" b="0"/>
+      </a:effectRef>
+      <a:fontRef idx="minor">
+        <a:schemeClr val="lt1"/>
+      </a:fontRef>
+    </dgm:style>
+  </dgm:styleLbl>
+  <dgm:styleLbl name="asst4">
+    <dgm:scene3d>
+      <a:camera prst="orthographicFront"/>
+      <a:lightRig rig="threePt" dir="t"/>
+    </dgm:scene3d>
+    <dgm:sp3d/>
+    <dgm:txPr/>
+    <dgm:style>
+      <a:lnRef idx="2">
+        <a:scrgbClr r="0" g="0" b="0"/>
+      </a:lnRef>
+      <a:fillRef idx="1">
+        <a:scrgbClr r="0" g="0" b="0"/>
+      </a:fillRef>
+      <a:effectRef idx="0">
+        <a:scrgbClr r="0" g="0" b="0"/>
+      </a:effectRef>
+      <a:fontRef idx="minor">
+        <a:schemeClr val="lt1"/>
+      </a:fontRef>
+    </dgm:style>
+  </dgm:styleLbl>
+  <dgm:styleLbl name="parChTrans2D1">
+    <dgm:scene3d>
+      <a:camera prst="orthographicFront"/>
+      <a:lightRig rig="threePt" dir="t"/>
+    </dgm:scene3d>
+    <dgm:sp3d/>
+    <dgm:txPr/>
+    <dgm:style>
+      <a:lnRef idx="2">
+        <a:scrgbClr r="0" g="0" b="0"/>
+      </a:lnRef>
+      <a:fillRef idx="1">
+        <a:scrgbClr r="0" g="0" b="0"/>
+      </a:fillRef>
+      <a:effectRef idx="0">
+        <a:scrgbClr r="0" g="0" b="0"/>
+      </a:effectRef>
+      <a:fontRef idx="minor">
+        <a:schemeClr val="lt1"/>
+      </a:fontRef>
+    </dgm:style>
+  </dgm:styleLbl>
+  <dgm:styleLbl name="parChTrans2D2">
+    <dgm:scene3d>
+      <a:camera prst="orthographicFront"/>
+      <a:lightRig rig="threePt" dir="t"/>
+    </dgm:scene3d>
+    <dgm:sp3d/>
+    <dgm:txPr/>
+    <dgm:style>
+      <a:lnRef idx="2">
+        <a:scrgbClr r="0" g="0" b="0"/>
+      </a:lnRef>
+      <a:fillRef idx="1">
+        <a:scrgbClr r="0" g="0" b="0"/>
+      </a:fillRef>
+      <a:effectRef idx="0">
+        <a:scrgbClr r="0" g="0" b="0"/>
+      </a:effectRef>
+      <a:fontRef idx="minor">
+        <a:schemeClr val="lt1"/>
+      </a:fontRef>
+    </dgm:style>
+  </dgm:styleLbl>
+  <dgm:styleLbl name="parChTrans2D3">
+    <dgm:scene3d>
+      <a:camera prst="orthographicFront"/>
+      <a:lightRig rig="threePt" dir="t"/>
+    </dgm:scene3d>
+    <dgm:sp3d/>
+    <dgm:txPr/>
+    <dgm:style>
+      <a:lnRef idx="2">
+        <a:scrgbClr r="0" g="0" b="0"/>
+      </a:lnRef>
+      <a:fillRef idx="1">
+        <a:scrgbClr r="0" g="0" b="0"/>
+      </a:fillRef>
+      <a:effectRef idx="0">
+        <a:scrgbClr r="0" g="0" b="0"/>
+      </a:effectRef>
+      <a:fontRef idx="minor">
+        <a:schemeClr val="lt1"/>
+      </a:fontRef>
+    </dgm:style>
+  </dgm:styleLbl>
+  <dgm:styleLbl name="parChTrans2D4">
+    <dgm:scene3d>
+      <a:camera prst="orthographicFront"/>
+      <a:lightRig rig="threePt" dir="t"/>
+    </dgm:scene3d>
+    <dgm:sp3d/>
+    <dgm:txPr/>
+    <dgm:style>
+      <a:lnRef idx="2">
+        <a:scrgbClr r="0" g="0" b="0"/>
+      </a:lnRef>
+      <a:fillRef idx="1">
+        <a:scrgbClr r="0" g="0" b="0"/>
+      </a:fillRef>
+      <a:effectRef idx="0">
+        <a:scrgbClr r="0" g="0" b="0"/>
+      </a:effectRef>
+      <a:fontRef idx="minor">
+        <a:schemeClr val="lt1"/>
+      </a:fontRef>
+    </dgm:style>
+  </dgm:styleLbl>
+  <dgm:styleLbl name="parChTrans1D1">
+    <dgm:scene3d>
+      <a:camera prst="orthographicFront"/>
+      <a:lightRig rig="threePt" dir="t"/>
+    </dgm:scene3d>
+    <dgm:sp3d/>
+    <dgm:txPr/>
+    <dgm:style>
+      <a:lnRef idx="2">
+        <a:scrgbClr r="0" g="0" b="0"/>
+      </a:lnRef>
+      <a:fillRef idx="0">
+        <a:scrgbClr r="0" g="0" b="0"/>
+      </a:fillRef>
+      <a:effectRef idx="0">
+        <a:scrgbClr r="0" g="0" b="0"/>
+      </a:effectRef>
+      <a:fontRef idx="minor"/>
+    </dgm:style>
+  </dgm:styleLbl>
+  <dgm:styleLbl name="parChTrans1D2">
+    <dgm:scene3d>
+      <a:camera prst="orthographicFront"/>
+      <a:lightRig rig="threePt" dir="t"/>
+    </dgm:scene3d>
+    <dgm:sp3d/>
+    <dgm:txPr/>
+    <dgm:style>
+      <a:lnRef idx="2">
+        <a:scrgbClr r="0" g="0" b="0"/>
+      </a:lnRef>
+      <a:fillRef idx="0">
+        <a:scrgbClr r="0" g="0" b="0"/>
+      </a:fillRef>
+      <a:effectRef idx="0">
+        <a:scrgbClr r="0" g="0" b="0"/>
+      </a:effectRef>
+      <a:fontRef idx="minor"/>
+    </dgm:style>
+  </dgm:styleLbl>
+  <dgm:styleLbl name="parChTrans1D3">
+    <dgm:scene3d>
+      <a:camera prst="orthographicFront"/>
+      <a:lightRig rig="threePt" dir="t"/>
+    </dgm:scene3d>
+    <dgm:sp3d/>
+    <dgm:txPr/>
+    <dgm:style>
+      <a:lnRef idx="2">
+        <a:scrgbClr r="0" g="0" b="0"/>
+      </a:lnRef>
+      <a:fillRef idx="0">
+        <a:scrgbClr r="0" g="0" b="0"/>
+      </a:fillRef>
+      <a:effectRef idx="0">
+        <a:scrgbClr r="0" g="0" b="0"/>
+      </a:effectRef>
+      <a:fontRef idx="minor"/>
+    </dgm:style>
+  </dgm:styleLbl>
+  <dgm:styleLbl name="parChTrans1D4">
+    <dgm:scene3d>
+      <a:camera prst="orthographicFront"/>
+      <a:lightRig rig="threePt" dir="t"/>
+    </dgm:scene3d>
+    <dgm:sp3d/>
+    <dgm:txPr/>
+    <dgm:style>
+      <a:lnRef idx="2">
+        <a:scrgbClr r="0" g="0" b="0"/>
+      </a:lnRef>
+      <a:fillRef idx="0">
+        <a:scrgbClr r="0" g="0" b="0"/>
+      </a:fillRef>
+      <a:effectRef idx="0">
+        <a:scrgbClr r="0" g="0" b="0"/>
+      </a:effectRef>
+      <a:fontRef idx="minor"/>
+    </dgm:style>
+  </dgm:styleLbl>
+  <dgm:styleLbl name="fgAcc1">
+    <dgm:scene3d>
+      <a:camera prst="orthographicFront"/>
+      <a:lightRig rig="threePt" dir="t"/>
+    </dgm:scene3d>
+    <dgm:sp3d/>
+    <dgm:txPr/>
+    <dgm:style>
+      <a:lnRef idx="2">
+        <a:scrgbClr r="0" g="0" b="0"/>
+      </a:lnRef>
+      <a:fillRef idx="1">
+        <a:scrgbClr r="0" g="0" b="0"/>
+      </a:fillRef>
+      <a:effectRef idx="0">
+        <a:scrgbClr r="0" g="0" b="0"/>
+      </a:effectRef>
+      <a:fontRef idx="minor"/>
+    </dgm:style>
+  </dgm:styleLbl>
+  <dgm:styleLbl name="conFgAcc1">
+    <dgm:scene3d>
+      <a:camera prst="orthographicFront"/>
+      <a:lightRig rig="threePt" dir="t"/>
+    </dgm:scene3d>
+    <dgm:sp3d/>
+    <dgm:txPr/>
+    <dgm:style>
+      <a:lnRef idx="2">
+        <a:scrgbClr r="0" g="0" b="0"/>
+      </a:lnRef>
+      <a:fillRef idx="1">
+        <a:scrgbClr r="0" g="0" b="0"/>
+      </a:fillRef>
+      <a:effectRef idx="0">
+        <a:scrgbClr r="0" g="0" b="0"/>
+      </a:effectRef>
+      <a:fontRef idx="minor"/>
+    </dgm:style>
+  </dgm:styleLbl>
+  <dgm:styleLbl name="alignAcc1">
+    <dgm:scene3d>
+      <a:camera prst="orthographicFront"/>
+      <a:lightRig rig="threePt" dir="t"/>
+    </dgm:scene3d>
+    <dgm:sp3d/>
+    <dgm:txPr/>
+    <dgm:style>
+      <a:lnRef idx="2">
+        <a:scrgbClr r="0" g="0" b="0"/>
+      </a:lnRef>
+      <a:fillRef idx="1">
+        <a:scrgbClr r="0" g="0" b="0"/>
+      </a:fillRef>
+      <a:effectRef idx="0">
+        <a:scrgbClr r="0" g="0" b="0"/>
+      </a:effectRef>
+      <a:fontRef idx="minor"/>
+    </dgm:style>
+  </dgm:styleLbl>
+  <dgm:styleLbl name="trAlignAcc1">
+    <dgm:scene3d>
+      <a:camera prst="orthographicFront"/>
+      <a:lightRig rig="threePt" dir="t"/>
+    </dgm:scene3d>
+    <dgm:sp3d/>
+    <dgm:txPr/>
+    <dgm:style>
+      <a:lnRef idx="1">
+        <a:scrgbClr r="0" g="0" b="0"/>
+      </a:lnRef>
+      <a:fillRef idx="1">
+        <a:scrgbClr r="0" g="0" b="0"/>
+      </a:fillRef>
+      <a:effectRef idx="0">
+        <a:scrgbClr r="0" g="0" b="0"/>
+      </a:effectRef>
+      <a:fontRef idx="minor"/>
+    </dgm:style>
+  </dgm:styleLbl>
+  <dgm:styleLbl name="bgAcc1">
+    <dgm:scene3d>
+      <a:camera prst="orthographicFront"/>
+      <a:lightRig rig="threePt" dir="t"/>
+    </dgm:scene3d>
+    <dgm:sp3d/>
+    <dgm:txPr/>
+    <dgm:style>
+      <a:lnRef idx="2">
+        <a:scrgbClr r="0" g="0" b="0"/>
+      </a:lnRef>
+      <a:fillRef idx="1">
+        <a:scrgbClr r="0" g="0" b="0"/>
+      </a:fillRef>
+      <a:effectRef idx="0">
+        <a:scrgbClr r="0" g="0" b="0"/>
+      </a:effectRef>
+      <a:fontRef idx="minor"/>
+    </dgm:style>
+  </dgm:styleLbl>
+  <dgm:styleLbl name="solidFgAcc1">
+    <dgm:scene3d>
+      <a:camera prst="orthographicFront"/>
+      <a:lightRig rig="threePt" dir="t"/>
+    </dgm:scene3d>
+    <dgm:sp3d/>
+    <dgm:txPr/>
+    <dgm:style>
+      <a:lnRef idx="2">
+        <a:scrgbClr r="0" g="0" b="0"/>
+      </a:lnRef>
+      <a:fillRef idx="1">
+        <a:scrgbClr r="0" g="0" b="0"/>
+      </a:fillRef>
+      <a:effectRef idx="0">
+        <a:scrgbClr r="0" g="0" b="0"/>
+      </a:effectRef>
+      <a:fontRef idx="minor"/>
+    </dgm:style>
+  </dgm:styleLbl>
+  <dgm:styleLbl name="solidAlignAcc1">
+    <dgm:scene3d>
+      <a:camera prst="orthographicFront"/>
+      <a:lightRig rig="threePt" dir="t"/>
+    </dgm:scene3d>
+    <dgm:sp3d/>
+    <dgm:txPr/>
+    <dgm:style>
+      <a:lnRef idx="2">
+        <a:scrgbClr r="0" g="0" b="0"/>
+      </a:lnRef>
+      <a:fillRef idx="1">
+        <a:scrgbClr r="0" g="0" b="0"/>
+      </a:fillRef>
+      <a:effectRef idx="0">
+        <a:scrgbClr r="0" g="0" b="0"/>
+      </a:effectRef>
+      <a:fontRef idx="minor"/>
+    </dgm:style>
+  </dgm:styleLbl>
+  <dgm:styleLbl name="solidBgAcc1">
+    <dgm:scene3d>
+      <a:camera prst="orthographicFront"/>
+      <a:lightRig rig="threePt" dir="t"/>
+    </dgm:scene3d>
+    <dgm:sp3d/>
+    <dgm:txPr/>
+    <dgm:style>
+      <a:lnRef idx="2">
+        <a:scrgbClr r="0" g="0" b="0"/>
+      </a:lnRef>
+      <a:fillRef idx="1">
+        <a:scrgbClr r="0" g="0" b="0"/>
+      </a:fillRef>
+      <a:effectRef idx="0">
+        <a:scrgbClr r="0" g="0" b="0"/>
+      </a:effectRef>
+      <a:fontRef idx="minor"/>
+    </dgm:style>
+  </dgm:styleLbl>
+  <dgm:styleLbl name="fgAccFollowNode1">
+    <dgm:scene3d>
+      <a:camera prst="orthographicFront"/>
+      <a:lightRig rig="threePt" dir="t"/>
+    </dgm:scene3d>
+    <dgm:sp3d/>
+    <dgm:txPr/>
+    <dgm:style>
+      <a:lnRef idx="2">
+        <a:scrgbClr r="0" g="0" b="0"/>
+      </a:lnRef>
+      <a:fillRef idx="1">
+        <a:scrgbClr r="0" g="0" b="0"/>
+      </a:fillRef>
+      <a:effectRef idx="0">
+        <a:scrgbClr r="0" g="0" b="0"/>
+      </a:effectRef>
+      <a:fontRef idx="minor"/>
+    </dgm:style>
+  </dgm:styleLbl>
+  <dgm:styleLbl name="alignAccFollowNode1">
+    <dgm:scene3d>
+      <a:camera prst="orthographicFront"/>
+      <a:lightRig rig="threePt" dir="t"/>
+    </dgm:scene3d>
+    <dgm:sp3d/>
+    <dgm:txPr/>
+    <dgm:style>
+      <a:lnRef idx="2">
+        <a:scrgbClr r="0" g="0" b="0"/>
+      </a:lnRef>
+      <a:fillRef idx="1">
+        <a:scrgbClr r="0" g="0" b="0"/>
+      </a:fillRef>
+      <a:effectRef idx="0">
+        <a:scrgbClr r="0" g="0" b="0"/>
+      </a:effectRef>
+      <a:fontRef idx="minor"/>
+    </dgm:style>
+  </dgm:styleLbl>
+  <dgm:styleLbl name="bgAccFollowNode1">
+    <dgm:scene3d>
+      <a:camera prst="orthographicFront"/>
+      <a:lightRig rig="threePt" dir="t"/>
+    </dgm:scene3d>
+    <dgm:sp3d/>
+    <dgm:txPr/>
+    <dgm:style>
+      <a:lnRef idx="2">
+        <a:scrgbClr r="0" g="0" b="0"/>
+      </a:lnRef>
+      <a:fillRef idx="1">
+        <a:scrgbClr r="0" g="0" b="0"/>
+      </a:fillRef>
+      <a:effectRef idx="0">
+        <a:scrgbClr r="0" g="0" b="0"/>
+      </a:effectRef>
+      <a:fontRef idx="minor"/>
+    </dgm:style>
+  </dgm:styleLbl>
+  <dgm:styleLbl name="fgAcc0">
+    <dgm:scene3d>
+      <a:camera prst="orthographicFront"/>
+      <a:lightRig rig="threePt" dir="t"/>
+    </dgm:scene3d>
+    <dgm:sp3d/>
+    <dgm:txPr/>
+    <dgm:style>
+      <a:lnRef idx="2">
+        <a:scrgbClr r="0" g="0" b="0"/>
+      </a:lnRef>
+      <a:fillRef idx="1">
+        <a:scrgbClr r="0" g="0" b="0"/>
+      </a:fillRef>
+      <a:effectRef idx="0">
+        <a:scrgbClr r="0" g="0" b="0"/>
+      </a:effectRef>
+      <a:fontRef idx="minor"/>
+    </dgm:style>
+  </dgm:styleLbl>
+  <dgm:styleLbl name="fgAcc2">
+    <dgm:scene3d>
+      <a:camera prst="orthographicFront"/>
+      <a:lightRig rig="threePt" dir="t"/>
+    </dgm:scene3d>
+    <dgm:sp3d/>
+    <dgm:txPr/>
+    <dgm:style>
+      <a:lnRef idx="2">
+        <a:scrgbClr r="0" g="0" b="0"/>
+      </a:lnRef>
+      <a:fillRef idx="1">
+        <a:scrgbClr r="0" g="0" b="0"/>
+      </a:fillRef>
+      <a:effectRef idx="0">
+        <a:scrgbClr r="0" g="0" b="0"/>
+      </a:effectRef>
+      <a:fontRef idx="minor"/>
+    </dgm:style>
+  </dgm:styleLbl>
+  <dgm:styleLbl name="fgAcc3">
+    <dgm:scene3d>
+      <a:camera prst="orthographicFront"/>
+      <a:lightRig rig="threePt" dir="t"/>
+    </dgm:scene3d>
+    <dgm:sp3d/>
+    <dgm:txPr/>
+    <dgm:style>
+      <a:lnRef idx="2">
+        <a:scrgbClr r="0" g="0" b="0"/>
+      </a:lnRef>
+      <a:fillRef idx="1">
+        <a:scrgbClr r="0" g="0" b="0"/>
+      </a:fillRef>
+      <a:effectRef idx="0">
+        <a:scrgbClr r="0" g="0" b="0"/>
+      </a:effectRef>
+      <a:fontRef idx="minor"/>
+    </dgm:style>
+  </dgm:styleLbl>
+  <dgm:styleLbl name="fgAcc4">
+    <dgm:scene3d>
+      <a:camera prst="orthographicFront"/>
+      <a:lightRig rig="threePt" dir="t"/>
+    </dgm:scene3d>
+    <dgm:sp3d/>
+    <dgm:txPr/>
+    <dgm:style>
+      <a:lnRef idx="2">
+        <a:scrgbClr r="0" g="0" b="0"/>
+      </a:lnRef>
+      <a:fillRef idx="1">
+        <a:scrgbClr r="0" g="0" b="0"/>
+      </a:fillRef>
+      <a:effectRef idx="0">
+        <a:scrgbClr r="0" g="0" b="0"/>
+      </a:effectRef>
+      <a:fontRef idx="minor"/>
+    </dgm:style>
+  </dgm:styleLbl>
+  <dgm:styleLbl name="bgShp">
+    <dgm:scene3d>
+      <a:camera prst="orthographicFront"/>
+      <a:lightRig rig="threePt" dir="t"/>
+    </dgm:scene3d>
+    <dgm:sp3d/>
+    <dgm:txPr/>
+    <dgm:style>
+      <a:lnRef idx="0">
+        <a:scrgbClr r="0" g="0" b="0"/>
+      </a:lnRef>
+      <a:fillRef idx="1">
+        <a:scrgbClr r="0" g="0" b="0"/>
+      </a:fillRef>
+      <a:effectRef idx="0">
+        <a:scrgbClr r="0" g="0" b="0"/>
+      </a:effectRef>
+      <a:fontRef idx="minor"/>
+    </dgm:style>
+  </dgm:styleLbl>
+  <dgm:styleLbl name="dkBgShp">
+    <dgm:scene3d>
+      <a:camera prst="orthographicFront"/>
+      <a:lightRig rig="threePt" dir="t"/>
+    </dgm:scene3d>
+    <dgm:sp3d/>
+    <dgm:txPr/>
+    <dgm:style>
+      <a:lnRef idx="0">
+        <a:scrgbClr r="0" g="0" b="0"/>
+      </a:lnRef>
+      <a:fillRef idx="1">
+        <a:scrgbClr r="0" g="0" b="0"/>
+      </a:fillRef>
+      <a:effectRef idx="0">
+        <a:scrgbClr r="0" g="0" b="0"/>
+      </a:effectRef>
+      <a:fontRef idx="minor"/>
+    </dgm:style>
+  </dgm:styleLbl>
+  <dgm:styleLbl name="trBgShp">
+    <dgm:scene3d>
+      <a:camera prst="orthographicFront"/>
+      <a:lightRig rig="threePt" dir="t"/>
+    </dgm:scene3d>
+    <dgm:sp3d/>
+    <dgm:txPr/>
+    <dgm:style>
+      <a:lnRef idx="0">
+        <a:scrgbClr r="0" g="0" b="0"/>
+      </a:lnRef>
+      <a:fillRef idx="1">
+        <a:scrgbClr r="0" g="0" b="0"/>
+      </a:fillRef>
+      <a:effectRef idx="0">
+        <a:scrgbClr r="0" g="0" b="0"/>
+      </a:effectRef>
+      <a:fontRef idx="minor"/>
+    </dgm:style>
+  </dgm:styleLbl>
+  <dgm:styleLbl name="fgShp">
+    <dgm:scene3d>
+      <a:camera prst="orthographicFront"/>
+      <a:lightRig rig="threePt" dir="t"/>
+    </dgm:scene3d>
+    <dgm:sp3d/>
+    <dgm:txPr/>
+    <dgm:style>
+      <a:lnRef idx="2">
+        <a:scrgbClr r="0" g="0" b="0"/>
+      </a:lnRef>
+      <a:fillRef idx="1">
+        <a:scrgbClr r="0" g="0" b="0"/>
+      </a:fillRef>
+      <a:effectRef idx="0">
+        <a:scrgbClr r="0" g="0" b="0"/>
+      </a:effectRef>
+      <a:fontRef idx="minor"/>
+    </dgm:style>
+  </dgm:styleLbl>
+  <dgm:styleLbl name="revTx">
+    <dgm:scene3d>
+      <a:camera prst="orthographicFront"/>
+      <a:lightRig rig="threePt" dir="t"/>
+    </dgm:scene3d>
+    <dgm:sp3d/>
+    <dgm:txPr/>
+    <dgm:style>
+      <a:lnRef idx="0">
+        <a:scrgbClr r="0" g="0" b="0"/>
+      </a:lnRef>
+      <a:fillRef idx="0">
+        <a:scrgbClr r="0" g="0" b="0"/>
+      </a:fillRef>
+      <a:effectRef idx="0">
+        <a:scrgbClr r="0" g="0" b="0"/>
+      </a:effectRef>
+      <a:fontRef idx="minor"/>
+    </dgm:style>
+  </dgm:styleLbl>
+</dgm:styleDef>
+</file>
+
 <file path=ppt/notesMasters/notesMaster1.xml><?xml version="1.0" encoding="utf-8"?>
 <p:notesMaster xmlns:a="http://schemas.openxmlformats.org/drawingml/2006/main" xmlns:r="http://schemas.openxmlformats.org/officeDocument/2006/relationships" xmlns:p="http://schemas.openxmlformats.org/presentationml/2006/main">
   <p:cSld>
@@ -218,7 +3244,7 @@
           <a:p>
             <a:fld id="{C3DCE7EF-75D0-4DB7-BD1A-FC94188B4058}" type="datetimeFigureOut">
               <a:rPr lang="en-US" smtClean="0"/>
-              <a:t>24-Nov-24</a:t>
+              <a:t>11/29/2024</a:t>
             </a:fld>
             <a:endParaRPr lang="en-US"/>
           </a:p>
@@ -550,6 +3576,90 @@
           <a:p>
             <a:fld id="{E30B86DD-1E4E-4BA9-90B9-02C65521F8DF}" type="slidenum">
               <a:rPr lang="en-US" smtClean="0"/>
+              <a:t>5</a:t>
+            </a:fld>
+            <a:endParaRPr lang="en-US"/>
+          </a:p>
+        </p:txBody>
+      </p:sp>
+    </p:spTree>
+    <p:extLst>
+      <p:ext uri="{BB962C8B-B14F-4D97-AF65-F5344CB8AC3E}">
+        <p14:creationId xmlns:p14="http://schemas.microsoft.com/office/powerpoint/2010/main" val="1883119255"/>
+      </p:ext>
+    </p:extLst>
+  </p:cSld>
+  <p:clrMapOvr>
+    <a:masterClrMapping/>
+  </p:clrMapOvr>
+</p:notes>
+</file>
+
+<file path=ppt/notesSlides/notesSlide2.xml><?xml version="1.0" encoding="utf-8"?>
+<p:notes xmlns:a="http://schemas.openxmlformats.org/drawingml/2006/main" xmlns:r="http://schemas.openxmlformats.org/officeDocument/2006/relationships" xmlns:p="http://schemas.openxmlformats.org/presentationml/2006/main">
+  <p:cSld>
+    <p:spTree>
+      <p:nvGrpSpPr>
+        <p:cNvPr id="1" name=""/>
+        <p:cNvGrpSpPr/>
+        <p:nvPr/>
+      </p:nvGrpSpPr>
+      <p:grpSpPr>
+        <a:xfrm>
+          <a:off x="0" y="0"/>
+          <a:ext cx="0" cy="0"/>
+          <a:chOff x="0" y="0"/>
+          <a:chExt cx="0" cy="0"/>
+        </a:xfrm>
+      </p:grpSpPr>
+      <p:sp>
+        <p:nvSpPr>
+          <p:cNvPr id="2" name="Slide Image Placeholder 1"/>
+          <p:cNvSpPr>
+            <a:spLocks noGrp="1" noRot="1" noChangeAspect="1"/>
+          </p:cNvSpPr>
+          <p:nvPr>
+            <p:ph type="sldImg"/>
+          </p:nvPr>
+        </p:nvSpPr>
+        <p:spPr/>
+      </p:sp>
+      <p:sp>
+        <p:nvSpPr>
+          <p:cNvPr id="3" name="Notes Placeholder 2"/>
+          <p:cNvSpPr>
+            <a:spLocks noGrp="1"/>
+          </p:cNvSpPr>
+          <p:nvPr>
+            <p:ph type="body" idx="1"/>
+          </p:nvPr>
+        </p:nvSpPr>
+        <p:spPr/>
+        <p:txBody>
+          <a:bodyPr/>
+          <a:lstStyle/>
+          <a:p>
+            <a:endParaRPr lang="en-US" dirty="0"/>
+          </a:p>
+        </p:txBody>
+      </p:sp>
+      <p:sp>
+        <p:nvSpPr>
+          <p:cNvPr id="4" name="Slide Number Placeholder 3"/>
+          <p:cNvSpPr>
+            <a:spLocks noGrp="1"/>
+          </p:cNvSpPr>
+          <p:nvPr>
+            <p:ph type="sldNum" sz="quarter" idx="5"/>
+          </p:nvPr>
+        </p:nvSpPr>
+        <p:spPr/>
+        <p:txBody>
+          <a:bodyPr/>
+          <a:lstStyle/>
+          <a:p>
+            <a:fld id="{E30B86DD-1E4E-4BA9-90B9-02C65521F8DF}" type="slidenum">
+              <a:rPr lang="en-US" smtClean="0"/>
               <a:t>7</a:t>
             </a:fld>
             <a:endParaRPr lang="en-US"/>
@@ -716,7 +3826,7 @@
           <a:p>
             <a:fld id="{A749A21A-B890-4700-B57E-1CFFBFCC9631}" type="datetimeFigureOut">
               <a:rPr lang="en-US" smtClean="0"/>
-              <a:t>24-Nov-24</a:t>
+              <a:t>11/29/2024</a:t>
             </a:fld>
             <a:endParaRPr lang="en-US"/>
           </a:p>
@@ -914,7 +4024,7 @@
           <a:p>
             <a:fld id="{A749A21A-B890-4700-B57E-1CFFBFCC9631}" type="datetimeFigureOut">
               <a:rPr lang="en-US" smtClean="0"/>
-              <a:t>24-Nov-24</a:t>
+              <a:t>11/29/2024</a:t>
             </a:fld>
             <a:endParaRPr lang="en-US"/>
           </a:p>
@@ -1122,7 +4232,7 @@
           <a:p>
             <a:fld id="{A749A21A-B890-4700-B57E-1CFFBFCC9631}" type="datetimeFigureOut">
               <a:rPr lang="en-US" smtClean="0"/>
-              <a:t>24-Nov-24</a:t>
+              <a:t>11/29/2024</a:t>
             </a:fld>
             <a:endParaRPr lang="en-US"/>
           </a:p>
@@ -1320,7 +4430,7 @@
           <a:p>
             <a:fld id="{A749A21A-B890-4700-B57E-1CFFBFCC9631}" type="datetimeFigureOut">
               <a:rPr lang="en-US" smtClean="0"/>
-              <a:t>24-Nov-24</a:t>
+              <a:t>11/29/2024</a:t>
             </a:fld>
             <a:endParaRPr lang="en-US"/>
           </a:p>
@@ -1595,7 +4705,7 @@
           <a:p>
             <a:fld id="{A749A21A-B890-4700-B57E-1CFFBFCC9631}" type="datetimeFigureOut">
               <a:rPr lang="en-US" smtClean="0"/>
-              <a:t>24-Nov-24</a:t>
+              <a:t>11/29/2024</a:t>
             </a:fld>
             <a:endParaRPr lang="en-US"/>
           </a:p>
@@ -1860,7 +4970,7 @@
           <a:p>
             <a:fld id="{A749A21A-B890-4700-B57E-1CFFBFCC9631}" type="datetimeFigureOut">
               <a:rPr lang="en-US" smtClean="0"/>
-              <a:t>24-Nov-24</a:t>
+              <a:t>11/29/2024</a:t>
             </a:fld>
             <a:endParaRPr lang="en-US"/>
           </a:p>
@@ -2272,7 +5382,7 @@
           <a:p>
             <a:fld id="{A749A21A-B890-4700-B57E-1CFFBFCC9631}" type="datetimeFigureOut">
               <a:rPr lang="en-US" smtClean="0"/>
-              <a:t>24-Nov-24</a:t>
+              <a:t>11/29/2024</a:t>
             </a:fld>
             <a:endParaRPr lang="en-US"/>
           </a:p>
@@ -2413,7 +5523,7 @@
           <a:p>
             <a:fld id="{A749A21A-B890-4700-B57E-1CFFBFCC9631}" type="datetimeFigureOut">
               <a:rPr lang="en-US" smtClean="0"/>
-              <a:t>24-Nov-24</a:t>
+              <a:t>11/29/2024</a:t>
             </a:fld>
             <a:endParaRPr lang="en-US"/>
           </a:p>
@@ -2526,7 +5636,7 @@
           <a:p>
             <a:fld id="{A749A21A-B890-4700-B57E-1CFFBFCC9631}" type="datetimeFigureOut">
               <a:rPr lang="en-US" smtClean="0"/>
-              <a:t>24-Nov-24</a:t>
+              <a:t>11/29/2024</a:t>
             </a:fld>
             <a:endParaRPr lang="en-US"/>
           </a:p>
@@ -2837,7 +5947,7 @@
           <a:p>
             <a:fld id="{A749A21A-B890-4700-B57E-1CFFBFCC9631}" type="datetimeFigureOut">
               <a:rPr lang="en-US" smtClean="0"/>
-              <a:t>24-Nov-24</a:t>
+              <a:t>11/29/2024</a:t>
             </a:fld>
             <a:endParaRPr lang="en-US"/>
           </a:p>
@@ -3125,7 +6235,7 @@
           <a:p>
             <a:fld id="{A749A21A-B890-4700-B57E-1CFFBFCC9631}" type="datetimeFigureOut">
               <a:rPr lang="en-US" smtClean="0"/>
-              <a:t>24-Nov-24</a:t>
+              <a:t>11/29/2024</a:t>
             </a:fld>
             <a:endParaRPr lang="en-US"/>
           </a:p>
@@ -3366,7 +6476,7 @@
           <a:p>
             <a:fld id="{A749A21A-B890-4700-B57E-1CFFBFCC9631}" type="datetimeFigureOut">
               <a:rPr lang="en-US" smtClean="0"/>
-              <a:t>24-Nov-24</a:t>
+              <a:t>11/29/2024</a:t>
             </a:fld>
             <a:endParaRPr lang="en-US"/>
           </a:p>
@@ -9290,18 +12400,7 @@
           <a:p>
             <a:r>
               <a:rPr lang="en-US" sz="2200" dirty="0"/>
-              <a:t>JLC Assembly: Total ~ $120</a:t>
-            </a:r>
-          </a:p>
-          <a:p>
-            <a:pPr lvl="1"/>
-            <a:r>
-              <a:rPr lang="en-US" sz="1800" dirty="0">
-                <a:highlight>
-                  <a:srgbClr val="FFFF00"/>
-                </a:highlight>
-              </a:rPr>
-              <a:t>Get from Mayumi</a:t>
+              <a:t>JLCPCB &amp; Assembly: $124.82</a:t>
             </a:r>
           </a:p>
           <a:p>
@@ -18806,10 +21905,10 @@
       </p:grpSpPr>
       <p:sp useBgFill="1">
         <p:nvSpPr>
-          <p:cNvPr id="8" name="Rectangle 7">
+          <p:cNvPr id="28" name="Rectangle 27">
             <a:extLst>
               <a:ext uri="{FF2B5EF4-FFF2-40B4-BE49-F238E27FC236}">
-                <a16:creationId xmlns:a16="http://schemas.microsoft.com/office/drawing/2014/main" id="{100EDD19-6802-4EC3-95CE-CFFAB042CFD6}"/>
+                <a16:creationId xmlns:a16="http://schemas.microsoft.com/office/drawing/2014/main" id="{A2679492-7988-4050-9056-542444452411}"/>
               </a:ext>
               <a:ext uri="{C183D7F6-B498-43B3-948B-1728B52AA6E4}">
                 <adec:decorative xmlns:adec="http://schemas.microsoft.com/office/drawing/2017/decorative" val="1"/>
@@ -18830,7 +21929,7 @@
         <p:spPr>
           <a:xfrm>
             <a:off x="0" y="0"/>
-            <a:ext cx="12188952" cy="6858000"/>
+            <a:ext cx="12192000" cy="6858000"/>
           </a:xfrm>
           <a:prstGeom prst="rect">
             <a:avLst/>
@@ -18882,18 +21981,18 @@
         </p:nvSpPr>
         <p:spPr>
           <a:xfrm>
-            <a:off x="838200" y="365125"/>
-            <a:ext cx="10515600" cy="1325563"/>
+            <a:off x="6412091" y="501651"/>
+            <a:ext cx="4395340" cy="1716255"/>
           </a:xfrm>
         </p:spPr>
         <p:txBody>
-          <a:bodyPr>
+          <a:bodyPr anchor="b">
             <a:normAutofit/>
           </a:bodyPr>
           <a:lstStyle/>
           <a:p>
             <a:r>
-              <a:rPr lang="en-US" sz="5400"/>
+              <a:rPr lang="en-US" sz="5200"/>
               <a:t>Approach - Microcontroller</a:t>
             </a:r>
           </a:p>
@@ -18901,10 +22000,10 @@
       </p:sp>
       <p:sp>
         <p:nvSpPr>
-          <p:cNvPr id="10" name="sketch line">
+          <p:cNvPr id="30" name="Rectangle 29">
             <a:extLst>
               <a:ext uri="{FF2B5EF4-FFF2-40B4-BE49-F238E27FC236}">
-                <a16:creationId xmlns:a16="http://schemas.microsoft.com/office/drawing/2014/main" id="{DB17E863-922E-4C26-BD64-E8FD41D28661}"/>
+                <a16:creationId xmlns:a16="http://schemas.microsoft.com/office/drawing/2014/main" id="{B091B163-7D61-4891-ABCF-5C13D9C418D0}"/>
               </a:ext>
               <a:ext uri="{C183D7F6-B498-43B3-948B-1728B52AA6E4}">
                 <adec:decorative xmlns:adec="http://schemas.microsoft.com/office/drawing/2017/decorative" val="1"/>
@@ -18924,592 +22023,26 @@
         </p:nvSpPr>
         <p:spPr>
           <a:xfrm>
-            <a:off x="669036" y="1677373"/>
-            <a:ext cx="10853928" cy="18288"/>
+            <a:off x="0" y="0"/>
+            <a:ext cx="5779911" cy="6858000"/>
           </a:xfrm>
-          <a:custGeom>
+          <a:prstGeom prst="rect">
             <a:avLst/>
-            <a:gdLst>
-              <a:gd name="connsiteX0" fmla="*/ 0 w 10853928"/>
-              <a:gd name="connsiteY0" fmla="*/ 0 h 18288"/>
-              <a:gd name="connsiteX1" fmla="*/ 461292 w 10853928"/>
-              <a:gd name="connsiteY1" fmla="*/ 0 h 18288"/>
-              <a:gd name="connsiteX2" fmla="*/ 1139662 w 10853928"/>
-              <a:gd name="connsiteY2" fmla="*/ 0 h 18288"/>
-              <a:gd name="connsiteX3" fmla="*/ 1926572 w 10853928"/>
-              <a:gd name="connsiteY3" fmla="*/ 0 h 18288"/>
-              <a:gd name="connsiteX4" fmla="*/ 2279325 w 10853928"/>
-              <a:gd name="connsiteY4" fmla="*/ 0 h 18288"/>
-              <a:gd name="connsiteX5" fmla="*/ 2632078 w 10853928"/>
-              <a:gd name="connsiteY5" fmla="*/ 0 h 18288"/>
-              <a:gd name="connsiteX6" fmla="*/ 3527527 w 10853928"/>
-              <a:gd name="connsiteY6" fmla="*/ 0 h 18288"/>
-              <a:gd name="connsiteX7" fmla="*/ 4205897 w 10853928"/>
-              <a:gd name="connsiteY7" fmla="*/ 0 h 18288"/>
-              <a:gd name="connsiteX8" fmla="*/ 4558650 w 10853928"/>
-              <a:gd name="connsiteY8" fmla="*/ 0 h 18288"/>
-              <a:gd name="connsiteX9" fmla="*/ 5237020 w 10853928"/>
-              <a:gd name="connsiteY9" fmla="*/ 0 h 18288"/>
-              <a:gd name="connsiteX10" fmla="*/ 6132469 w 10853928"/>
-              <a:gd name="connsiteY10" fmla="*/ 0 h 18288"/>
-              <a:gd name="connsiteX11" fmla="*/ 6702301 w 10853928"/>
-              <a:gd name="connsiteY11" fmla="*/ 0 h 18288"/>
-              <a:gd name="connsiteX12" fmla="*/ 7272132 w 10853928"/>
-              <a:gd name="connsiteY12" fmla="*/ 0 h 18288"/>
-              <a:gd name="connsiteX13" fmla="*/ 7950502 w 10853928"/>
-              <a:gd name="connsiteY13" fmla="*/ 0 h 18288"/>
-              <a:gd name="connsiteX14" fmla="*/ 8737412 w 10853928"/>
-              <a:gd name="connsiteY14" fmla="*/ 0 h 18288"/>
-              <a:gd name="connsiteX15" fmla="*/ 9524322 w 10853928"/>
-              <a:gd name="connsiteY15" fmla="*/ 0 h 18288"/>
-              <a:gd name="connsiteX16" fmla="*/ 10853928 w 10853928"/>
-              <a:gd name="connsiteY16" fmla="*/ 0 h 18288"/>
-              <a:gd name="connsiteX17" fmla="*/ 10853928 w 10853928"/>
-              <a:gd name="connsiteY17" fmla="*/ 18288 h 18288"/>
-              <a:gd name="connsiteX18" fmla="*/ 10392636 w 10853928"/>
-              <a:gd name="connsiteY18" fmla="*/ 18288 h 18288"/>
-              <a:gd name="connsiteX19" fmla="*/ 9497187 w 10853928"/>
-              <a:gd name="connsiteY19" fmla="*/ 18288 h 18288"/>
-              <a:gd name="connsiteX20" fmla="*/ 8818817 w 10853928"/>
-              <a:gd name="connsiteY20" fmla="*/ 18288 h 18288"/>
-              <a:gd name="connsiteX21" fmla="*/ 8466064 w 10853928"/>
-              <a:gd name="connsiteY21" fmla="*/ 18288 h 18288"/>
-              <a:gd name="connsiteX22" fmla="*/ 7787693 w 10853928"/>
-              <a:gd name="connsiteY22" fmla="*/ 18288 h 18288"/>
-              <a:gd name="connsiteX23" fmla="*/ 7217862 w 10853928"/>
-              <a:gd name="connsiteY23" fmla="*/ 18288 h 18288"/>
-              <a:gd name="connsiteX24" fmla="*/ 6648031 w 10853928"/>
-              <a:gd name="connsiteY24" fmla="*/ 18288 h 18288"/>
-              <a:gd name="connsiteX25" fmla="*/ 6078200 w 10853928"/>
-              <a:gd name="connsiteY25" fmla="*/ 18288 h 18288"/>
-              <a:gd name="connsiteX26" fmla="*/ 5508368 w 10853928"/>
-              <a:gd name="connsiteY26" fmla="*/ 18288 h 18288"/>
-              <a:gd name="connsiteX27" fmla="*/ 4721459 w 10853928"/>
-              <a:gd name="connsiteY27" fmla="*/ 18288 h 18288"/>
-              <a:gd name="connsiteX28" fmla="*/ 4043088 w 10853928"/>
-              <a:gd name="connsiteY28" fmla="*/ 18288 h 18288"/>
-              <a:gd name="connsiteX29" fmla="*/ 3690336 w 10853928"/>
-              <a:gd name="connsiteY29" fmla="*/ 18288 h 18288"/>
-              <a:gd name="connsiteX30" fmla="*/ 3120504 w 10853928"/>
-              <a:gd name="connsiteY30" fmla="*/ 18288 h 18288"/>
-              <a:gd name="connsiteX31" fmla="*/ 2333595 w 10853928"/>
-              <a:gd name="connsiteY31" fmla="*/ 18288 h 18288"/>
-              <a:gd name="connsiteX32" fmla="*/ 1872303 w 10853928"/>
-              <a:gd name="connsiteY32" fmla="*/ 18288 h 18288"/>
-              <a:gd name="connsiteX33" fmla="*/ 976854 w 10853928"/>
-              <a:gd name="connsiteY33" fmla="*/ 18288 h 18288"/>
-              <a:gd name="connsiteX34" fmla="*/ 0 w 10853928"/>
-              <a:gd name="connsiteY34" fmla="*/ 18288 h 18288"/>
-              <a:gd name="connsiteX35" fmla="*/ 0 w 10853928"/>
-              <a:gd name="connsiteY35" fmla="*/ 0 h 18288"/>
-            </a:gdLst>
-            <a:ahLst/>
-            <a:cxnLst>
-              <a:cxn ang="0">
-                <a:pos x="connsiteX0" y="connsiteY0"/>
-              </a:cxn>
-              <a:cxn ang="0">
-                <a:pos x="connsiteX1" y="connsiteY1"/>
-              </a:cxn>
-              <a:cxn ang="0">
-                <a:pos x="connsiteX2" y="connsiteY2"/>
-              </a:cxn>
-              <a:cxn ang="0">
-                <a:pos x="connsiteX3" y="connsiteY3"/>
-              </a:cxn>
-              <a:cxn ang="0">
-                <a:pos x="connsiteX4" y="connsiteY4"/>
-              </a:cxn>
-              <a:cxn ang="0">
-                <a:pos x="connsiteX5" y="connsiteY5"/>
-              </a:cxn>
-              <a:cxn ang="0">
-                <a:pos x="connsiteX6" y="connsiteY6"/>
-              </a:cxn>
-              <a:cxn ang="0">
-                <a:pos x="connsiteX7" y="connsiteY7"/>
-              </a:cxn>
-              <a:cxn ang="0">
-                <a:pos x="connsiteX8" y="connsiteY8"/>
-              </a:cxn>
-              <a:cxn ang="0">
-                <a:pos x="connsiteX9" y="connsiteY9"/>
-              </a:cxn>
-              <a:cxn ang="0">
-                <a:pos x="connsiteX10" y="connsiteY10"/>
-              </a:cxn>
-              <a:cxn ang="0">
-                <a:pos x="connsiteX11" y="connsiteY11"/>
-              </a:cxn>
-              <a:cxn ang="0">
-                <a:pos x="connsiteX12" y="connsiteY12"/>
-              </a:cxn>
-              <a:cxn ang="0">
-                <a:pos x="connsiteX13" y="connsiteY13"/>
-              </a:cxn>
-              <a:cxn ang="0">
-                <a:pos x="connsiteX14" y="connsiteY14"/>
-              </a:cxn>
-              <a:cxn ang="0">
-                <a:pos x="connsiteX15" y="connsiteY15"/>
-              </a:cxn>
-              <a:cxn ang="0">
-                <a:pos x="connsiteX16" y="connsiteY16"/>
-              </a:cxn>
-              <a:cxn ang="0">
-                <a:pos x="connsiteX17" y="connsiteY17"/>
-              </a:cxn>
-              <a:cxn ang="0">
-                <a:pos x="connsiteX18" y="connsiteY18"/>
-              </a:cxn>
-              <a:cxn ang="0">
-                <a:pos x="connsiteX19" y="connsiteY19"/>
-              </a:cxn>
-              <a:cxn ang="0">
-                <a:pos x="connsiteX20" y="connsiteY20"/>
-              </a:cxn>
-              <a:cxn ang="0">
-                <a:pos x="connsiteX21" y="connsiteY21"/>
-              </a:cxn>
-              <a:cxn ang="0">
-                <a:pos x="connsiteX22" y="connsiteY22"/>
-              </a:cxn>
-              <a:cxn ang="0">
-                <a:pos x="connsiteX23" y="connsiteY23"/>
-              </a:cxn>
-              <a:cxn ang="0">
-                <a:pos x="connsiteX24" y="connsiteY24"/>
-              </a:cxn>
-              <a:cxn ang="0">
-                <a:pos x="connsiteX25" y="connsiteY25"/>
-              </a:cxn>
-              <a:cxn ang="0">
-                <a:pos x="connsiteX26" y="connsiteY26"/>
-              </a:cxn>
-              <a:cxn ang="0">
-                <a:pos x="connsiteX27" y="connsiteY27"/>
-              </a:cxn>
-              <a:cxn ang="0">
-                <a:pos x="connsiteX28" y="connsiteY28"/>
-              </a:cxn>
-              <a:cxn ang="0">
-                <a:pos x="connsiteX29" y="connsiteY29"/>
-              </a:cxn>
-              <a:cxn ang="0">
-                <a:pos x="connsiteX30" y="connsiteY30"/>
-              </a:cxn>
-              <a:cxn ang="0">
-                <a:pos x="connsiteX31" y="connsiteY31"/>
-              </a:cxn>
-              <a:cxn ang="0">
-                <a:pos x="connsiteX32" y="connsiteY32"/>
-              </a:cxn>
-              <a:cxn ang="0">
-                <a:pos x="connsiteX33" y="connsiteY33"/>
-              </a:cxn>
-              <a:cxn ang="0">
-                <a:pos x="connsiteX34" y="connsiteY34"/>
-              </a:cxn>
-              <a:cxn ang="0">
-                <a:pos x="connsiteX35" y="connsiteY35"/>
-              </a:cxn>
-            </a:cxnLst>
-            <a:rect l="l" t="t" r="r" b="b"/>
-            <a:pathLst>
-              <a:path w="10853928" h="18288" fill="none" extrusionOk="0">
-                <a:moveTo>
-                  <a:pt x="0" y="0"/>
-                </a:moveTo>
-                <a:cubicBezTo>
-                  <a:pt x="146993" y="-19076"/>
-                  <a:pt x="347684" y="-4790"/>
-                  <a:pt x="461292" y="0"/>
-                </a:cubicBezTo>
-                <a:cubicBezTo>
-                  <a:pt x="574900" y="4790"/>
-                  <a:pt x="808367" y="19821"/>
-                  <a:pt x="1139662" y="0"/>
-                </a:cubicBezTo>
-                <a:cubicBezTo>
-                  <a:pt x="1470957" y="-19821"/>
-                  <a:pt x="1627405" y="5721"/>
-                  <a:pt x="1926572" y="0"/>
-                </a:cubicBezTo>
-                <a:cubicBezTo>
-                  <a:pt x="2225739" y="-5721"/>
-                  <a:pt x="2137730" y="-3235"/>
-                  <a:pt x="2279325" y="0"/>
-                </a:cubicBezTo>
-                <a:cubicBezTo>
-                  <a:pt x="2420920" y="3235"/>
-                  <a:pt x="2456518" y="9685"/>
-                  <a:pt x="2632078" y="0"/>
-                </a:cubicBezTo>
-                <a:cubicBezTo>
-                  <a:pt x="2807638" y="-9685"/>
-                  <a:pt x="3211516" y="-43007"/>
-                  <a:pt x="3527527" y="0"/>
-                </a:cubicBezTo>
-                <a:cubicBezTo>
-                  <a:pt x="3843538" y="43007"/>
-                  <a:pt x="4058833" y="22042"/>
-                  <a:pt x="4205897" y="0"/>
-                </a:cubicBezTo>
-                <a:cubicBezTo>
-                  <a:pt x="4352961" y="-22042"/>
-                  <a:pt x="4474805" y="-11846"/>
-                  <a:pt x="4558650" y="0"/>
-                </a:cubicBezTo>
-                <a:cubicBezTo>
-                  <a:pt x="4642495" y="11846"/>
-                  <a:pt x="5041928" y="-6069"/>
-                  <a:pt x="5237020" y="0"/>
-                </a:cubicBezTo>
-                <a:cubicBezTo>
-                  <a:pt x="5432112" y="6069"/>
-                  <a:pt x="5943266" y="-17479"/>
-                  <a:pt x="6132469" y="0"/>
-                </a:cubicBezTo>
-                <a:cubicBezTo>
-                  <a:pt x="6321672" y="17479"/>
-                  <a:pt x="6483872" y="26234"/>
-                  <a:pt x="6702301" y="0"/>
-                </a:cubicBezTo>
-                <a:cubicBezTo>
-                  <a:pt x="6920730" y="-26234"/>
-                  <a:pt x="6991194" y="-15156"/>
-                  <a:pt x="7272132" y="0"/>
-                </a:cubicBezTo>
-                <a:cubicBezTo>
-                  <a:pt x="7553070" y="15156"/>
-                  <a:pt x="7684444" y="-32961"/>
-                  <a:pt x="7950502" y="0"/>
-                </a:cubicBezTo>
-                <a:cubicBezTo>
-                  <a:pt x="8216560" y="32961"/>
-                  <a:pt x="8493290" y="-10491"/>
-                  <a:pt x="8737412" y="0"/>
-                </a:cubicBezTo>
-                <a:cubicBezTo>
-                  <a:pt x="8981534" y="10491"/>
-                  <a:pt x="9191586" y="-13899"/>
-                  <a:pt x="9524322" y="0"/>
-                </a:cubicBezTo>
-                <a:cubicBezTo>
-                  <a:pt x="9857058" y="13899"/>
-                  <a:pt x="10297509" y="7485"/>
-                  <a:pt x="10853928" y="0"/>
-                </a:cubicBezTo>
-                <a:cubicBezTo>
-                  <a:pt x="10854574" y="4451"/>
-                  <a:pt x="10854418" y="9226"/>
-                  <a:pt x="10853928" y="18288"/>
-                </a:cubicBezTo>
-                <a:cubicBezTo>
-                  <a:pt x="10691638" y="28522"/>
-                  <a:pt x="10574319" y="29578"/>
-                  <a:pt x="10392636" y="18288"/>
-                </a:cubicBezTo>
-                <a:cubicBezTo>
-                  <a:pt x="10210953" y="6998"/>
-                  <a:pt x="9836277" y="-16742"/>
-                  <a:pt x="9497187" y="18288"/>
-                </a:cubicBezTo>
-                <a:cubicBezTo>
-                  <a:pt x="9158097" y="53318"/>
-                  <a:pt x="9119479" y="30714"/>
-                  <a:pt x="8818817" y="18288"/>
-                </a:cubicBezTo>
-                <a:cubicBezTo>
-                  <a:pt x="8518155" y="5863"/>
-                  <a:pt x="8640037" y="6483"/>
-                  <a:pt x="8466064" y="18288"/>
-                </a:cubicBezTo>
-                <a:cubicBezTo>
-                  <a:pt x="8292091" y="30093"/>
-                  <a:pt x="7997656" y="18914"/>
-                  <a:pt x="7787693" y="18288"/>
-                </a:cubicBezTo>
-                <a:cubicBezTo>
-                  <a:pt x="7577730" y="17662"/>
-                  <a:pt x="7412468" y="21416"/>
-                  <a:pt x="7217862" y="18288"/>
-                </a:cubicBezTo>
-                <a:cubicBezTo>
-                  <a:pt x="7023256" y="15160"/>
-                  <a:pt x="6898018" y="14824"/>
-                  <a:pt x="6648031" y="18288"/>
-                </a:cubicBezTo>
-                <a:cubicBezTo>
-                  <a:pt x="6398044" y="21752"/>
-                  <a:pt x="6254402" y="38625"/>
-                  <a:pt x="6078200" y="18288"/>
-                </a:cubicBezTo>
-                <a:cubicBezTo>
-                  <a:pt x="5901998" y="-2049"/>
-                  <a:pt x="5622886" y="3213"/>
-                  <a:pt x="5508368" y="18288"/>
-                </a:cubicBezTo>
-                <a:cubicBezTo>
-                  <a:pt x="5393850" y="33363"/>
-                  <a:pt x="5036260" y="26830"/>
-                  <a:pt x="4721459" y="18288"/>
-                </a:cubicBezTo>
-                <a:cubicBezTo>
-                  <a:pt x="4406658" y="9746"/>
-                  <a:pt x="4239221" y="41551"/>
-                  <a:pt x="4043088" y="18288"/>
-                </a:cubicBezTo>
-                <a:cubicBezTo>
-                  <a:pt x="3846955" y="-4975"/>
-                  <a:pt x="3818802" y="34658"/>
-                  <a:pt x="3690336" y="18288"/>
-                </a:cubicBezTo>
-                <a:cubicBezTo>
-                  <a:pt x="3561870" y="1918"/>
-                  <a:pt x="3265491" y="42194"/>
-                  <a:pt x="3120504" y="18288"/>
-                </a:cubicBezTo>
-                <a:cubicBezTo>
-                  <a:pt x="2975517" y="-5618"/>
-                  <a:pt x="2720254" y="36673"/>
-                  <a:pt x="2333595" y="18288"/>
-                </a:cubicBezTo>
-                <a:cubicBezTo>
-                  <a:pt x="1946936" y="-97"/>
-                  <a:pt x="2097241" y="5776"/>
-                  <a:pt x="1872303" y="18288"/>
-                </a:cubicBezTo>
-                <a:cubicBezTo>
-                  <a:pt x="1647365" y="30800"/>
-                  <a:pt x="1282708" y="45380"/>
-                  <a:pt x="976854" y="18288"/>
-                </a:cubicBezTo>
-                <a:cubicBezTo>
-                  <a:pt x="671000" y="-8804"/>
-                  <a:pt x="408401" y="-12775"/>
-                  <a:pt x="0" y="18288"/>
-                </a:cubicBezTo>
-                <a:cubicBezTo>
-                  <a:pt x="-213" y="9468"/>
-                  <a:pt x="187" y="4459"/>
-                  <a:pt x="0" y="0"/>
-                </a:cubicBezTo>
-                <a:close/>
-              </a:path>
-              <a:path w="10853928" h="18288" stroke="0" extrusionOk="0">
-                <a:moveTo>
-                  <a:pt x="0" y="0"/>
-                </a:moveTo>
-                <a:cubicBezTo>
-                  <a:pt x="267322" y="15284"/>
-                  <a:pt x="415388" y="-21048"/>
-                  <a:pt x="569831" y="0"/>
-                </a:cubicBezTo>
-                <a:cubicBezTo>
-                  <a:pt x="724274" y="21048"/>
-                  <a:pt x="769333" y="-2353"/>
-                  <a:pt x="922584" y="0"/>
-                </a:cubicBezTo>
-                <a:cubicBezTo>
-                  <a:pt x="1075835" y="2353"/>
-                  <a:pt x="1399490" y="-145"/>
-                  <a:pt x="1818033" y="0"/>
-                </a:cubicBezTo>
-                <a:cubicBezTo>
-                  <a:pt x="2236576" y="145"/>
-                  <a:pt x="2145330" y="5482"/>
-                  <a:pt x="2387864" y="0"/>
-                </a:cubicBezTo>
-                <a:cubicBezTo>
-                  <a:pt x="2630398" y="-5482"/>
-                  <a:pt x="2793207" y="18487"/>
-                  <a:pt x="2957695" y="0"/>
-                </a:cubicBezTo>
-                <a:cubicBezTo>
-                  <a:pt x="3122183" y="-18487"/>
-                  <a:pt x="3579141" y="19003"/>
-                  <a:pt x="3853144" y="0"/>
-                </a:cubicBezTo>
-                <a:cubicBezTo>
-                  <a:pt x="4127147" y="-19003"/>
-                  <a:pt x="4209857" y="12211"/>
-                  <a:pt x="4314436" y="0"/>
-                </a:cubicBezTo>
-                <a:cubicBezTo>
-                  <a:pt x="4419015" y="-12211"/>
-                  <a:pt x="4762459" y="-17220"/>
-                  <a:pt x="5209885" y="0"/>
-                </a:cubicBezTo>
-                <a:cubicBezTo>
-                  <a:pt x="5657311" y="17220"/>
-                  <a:pt x="5692663" y="-3290"/>
-                  <a:pt x="6105335" y="0"/>
-                </a:cubicBezTo>
-                <a:cubicBezTo>
-                  <a:pt x="6518007" y="3290"/>
-                  <a:pt x="6455516" y="-5124"/>
-                  <a:pt x="6783705" y="0"/>
-                </a:cubicBezTo>
-                <a:cubicBezTo>
-                  <a:pt x="7111894" y="5124"/>
-                  <a:pt x="7441941" y="-17829"/>
-                  <a:pt x="7679154" y="0"/>
-                </a:cubicBezTo>
-                <a:cubicBezTo>
-                  <a:pt x="7916367" y="17829"/>
-                  <a:pt x="8102967" y="-24363"/>
-                  <a:pt x="8248985" y="0"/>
-                </a:cubicBezTo>
-                <a:cubicBezTo>
-                  <a:pt x="8395003" y="24363"/>
-                  <a:pt x="8552393" y="25505"/>
-                  <a:pt x="8818817" y="0"/>
-                </a:cubicBezTo>
-                <a:cubicBezTo>
-                  <a:pt x="9085241" y="-25505"/>
-                  <a:pt x="9411308" y="38000"/>
-                  <a:pt x="9605726" y="0"/>
-                </a:cubicBezTo>
-                <a:cubicBezTo>
-                  <a:pt x="9800144" y="-38000"/>
-                  <a:pt x="10006468" y="-25741"/>
-                  <a:pt x="10175558" y="0"/>
-                </a:cubicBezTo>
-                <a:cubicBezTo>
-                  <a:pt x="10344648" y="25741"/>
-                  <a:pt x="10696282" y="695"/>
-                  <a:pt x="10853928" y="0"/>
-                </a:cubicBezTo>
-                <a:cubicBezTo>
-                  <a:pt x="10853521" y="8690"/>
-                  <a:pt x="10853774" y="14141"/>
-                  <a:pt x="10853928" y="18288"/>
-                </a:cubicBezTo>
-                <a:cubicBezTo>
-                  <a:pt x="10608124" y="24255"/>
-                  <a:pt x="10343415" y="22307"/>
-                  <a:pt x="10067018" y="18288"/>
-                </a:cubicBezTo>
-                <a:cubicBezTo>
-                  <a:pt x="9790621" y="14270"/>
-                  <a:pt x="9843266" y="3564"/>
-                  <a:pt x="9714266" y="18288"/>
-                </a:cubicBezTo>
-                <a:cubicBezTo>
-                  <a:pt x="9585266" y="33012"/>
-                  <a:pt x="9379484" y="1875"/>
-                  <a:pt x="9252974" y="18288"/>
-                </a:cubicBezTo>
-                <a:cubicBezTo>
-                  <a:pt x="9126464" y="34701"/>
-                  <a:pt x="8580678" y="-4904"/>
-                  <a:pt x="8357525" y="18288"/>
-                </a:cubicBezTo>
-                <a:cubicBezTo>
-                  <a:pt x="8134372" y="41480"/>
-                  <a:pt x="7903199" y="26458"/>
-                  <a:pt x="7679154" y="18288"/>
-                </a:cubicBezTo>
-                <a:cubicBezTo>
-                  <a:pt x="7455109" y="10118"/>
-                  <a:pt x="7435944" y="27109"/>
-                  <a:pt x="7217862" y="18288"/>
-                </a:cubicBezTo>
-                <a:cubicBezTo>
-                  <a:pt x="6999780" y="9467"/>
-                  <a:pt x="6680409" y="18985"/>
-                  <a:pt x="6539492" y="18288"/>
-                </a:cubicBezTo>
-                <a:cubicBezTo>
-                  <a:pt x="6398575" y="17592"/>
-                  <a:pt x="6312077" y="33018"/>
-                  <a:pt x="6186739" y="18288"/>
-                </a:cubicBezTo>
-                <a:cubicBezTo>
-                  <a:pt x="6061401" y="3558"/>
-                  <a:pt x="5947033" y="12075"/>
-                  <a:pt x="5833986" y="18288"/>
-                </a:cubicBezTo>
-                <a:cubicBezTo>
-                  <a:pt x="5720939" y="24501"/>
-                  <a:pt x="5482226" y="8586"/>
-                  <a:pt x="5155616" y="18288"/>
-                </a:cubicBezTo>
-                <a:cubicBezTo>
-                  <a:pt x="4829006" y="27991"/>
-                  <a:pt x="4841274" y="29316"/>
-                  <a:pt x="4694324" y="18288"/>
-                </a:cubicBezTo>
-                <a:cubicBezTo>
-                  <a:pt x="4547374" y="7260"/>
-                  <a:pt x="4077675" y="7013"/>
-                  <a:pt x="3907414" y="18288"/>
-                </a:cubicBezTo>
-                <a:cubicBezTo>
-                  <a:pt x="3737153" y="29564"/>
-                  <a:pt x="3538393" y="21630"/>
-                  <a:pt x="3446122" y="18288"/>
-                </a:cubicBezTo>
-                <a:cubicBezTo>
-                  <a:pt x="3353851" y="14946"/>
-                  <a:pt x="2990320" y="-8091"/>
-                  <a:pt x="2659212" y="18288"/>
-                </a:cubicBezTo>
-                <a:cubicBezTo>
-                  <a:pt x="2328104" y="44667"/>
-                  <a:pt x="2427653" y="9607"/>
-                  <a:pt x="2306460" y="18288"/>
-                </a:cubicBezTo>
-                <a:cubicBezTo>
-                  <a:pt x="2185267" y="26969"/>
-                  <a:pt x="1719763" y="3717"/>
-                  <a:pt x="1519550" y="18288"/>
-                </a:cubicBezTo>
-                <a:cubicBezTo>
-                  <a:pt x="1319337" y="32860"/>
-                  <a:pt x="1167371" y="17040"/>
-                  <a:pt x="1058258" y="18288"/>
-                </a:cubicBezTo>
-                <a:cubicBezTo>
-                  <a:pt x="949145" y="19536"/>
-                  <a:pt x="780234" y="31447"/>
-                  <a:pt x="705505" y="18288"/>
-                </a:cubicBezTo>
-                <a:cubicBezTo>
-                  <a:pt x="630776" y="5129"/>
-                  <a:pt x="215796" y="30056"/>
-                  <a:pt x="0" y="18288"/>
-                </a:cubicBezTo>
-                <a:cubicBezTo>
-                  <a:pt x="-53" y="11301"/>
-                  <a:pt x="-649" y="7756"/>
-                  <a:pt x="0" y="0"/>
-                </a:cubicBezTo>
-                <a:close/>
-              </a:path>
-            </a:pathLst>
-          </a:custGeom>
-          <a:solidFill>
-            <a:schemeClr val="accent2"/>
-          </a:solidFill>
-          <a:ln w="41275" cap="rnd">
-            <a:solidFill>
-              <a:schemeClr val="accent2"/>
-            </a:solidFill>
-            <a:round/>
-            <a:extLst>
-              <a:ext uri="{C807C97D-BFC1-408E-A445-0C87EB9F89A2}">
-                <ask:lineSketchStyleProps xmlns:ask="http://schemas.microsoft.com/office/drawing/2018/sketchyshapes" sd="1219033472">
-                  <a:prstGeom prst="rect">
-                    <a:avLst/>
-                  </a:prstGeom>
-                  <ask:type>
-                    <ask:lineSketchFreehand/>
-                  </ask:type>
-                </ask:lineSketchStyleProps>
-              </a:ext>
-            </a:extLst>
+          </a:prstGeom>
+          <a:gradFill flip="none" rotWithShape="1">
+            <a:gsLst>
+              <a:gs pos="0">
+                <a:schemeClr val="accent1"/>
+              </a:gs>
+              <a:gs pos="100000">
+                <a:schemeClr val="accent2"/>
+              </a:gs>
+            </a:gsLst>
+            <a:lin ang="2700000" scaled="1"/>
+            <a:tileRect/>
+          </a:gradFill>
+          <a:ln>
+            <a:noFill/>
           </a:ln>
         </p:spPr>
         <p:style>
@@ -19537,6 +22070,89 @@
           </a:p>
         </p:txBody>
       </p:sp>
+      <p:pic>
+        <p:nvPicPr>
+          <p:cNvPr id="5" name="Picture 4" descr="A close up of a chip&#10;&#10;Description automatically generated">
+            <a:extLst>
+              <a:ext uri="{FF2B5EF4-FFF2-40B4-BE49-F238E27FC236}">
+                <a16:creationId xmlns:a16="http://schemas.microsoft.com/office/drawing/2014/main" id="{42933467-C06B-052A-8BB0-69BCD4C68F8E}"/>
+              </a:ext>
+            </a:extLst>
+          </p:cNvPr>
+          <p:cNvPicPr>
+            <a:picLocks noChangeAspect="1"/>
+          </p:cNvPicPr>
+          <p:nvPr/>
+        </p:nvPicPr>
+        <p:blipFill>
+          <a:blip r:embed="rId3">
+            <a:extLst>
+              <a:ext uri="{BEBA8EAE-BF5A-486C-A8C5-ECC9F3942E4B}">
+                <a14:imgProps xmlns:a14="http://schemas.microsoft.com/office/drawing/2010/main">
+                  <a14:imgLayer r:embed="rId4">
+                    <a14:imgEffect>
+                      <a14:backgroundRemoval t="8056" b="92500" l="9783" r="89493">
+                        <a14:foregroundMark x1="12319" y1="31667" x2="12319" y2="86111"/>
+                        <a14:foregroundMark x1="12319" y1="86111" x2="24638" y2="92500"/>
+                        <a14:foregroundMark x1="24638" y1="92500" x2="42029" y2="92222"/>
+                        <a14:foregroundMark x1="42029" y1="92222" x2="77536" y2="92778"/>
+                        <a14:foregroundMark x1="77536" y1="92778" x2="89493" y2="90278"/>
+                        <a14:foregroundMark x1="89493" y1="90278" x2="89493" y2="34444"/>
+                        <a14:foregroundMark x1="89493" y1="34444" x2="77174" y2="25833"/>
+                        <a14:foregroundMark x1="77174" y1="25833" x2="81159" y2="18611"/>
+                        <a14:foregroundMark x1="15217" y1="35000" x2="23188" y2="22500"/>
+                        <a14:foregroundMark x1="23188" y1="22500" x2="35507" y2="21667"/>
+                        <a14:foregroundMark x1="35507" y1="21667" x2="53986" y2="23889"/>
+                        <a14:foregroundMark x1="53986" y1="23889" x2="69565" y2="20556"/>
+                        <a14:foregroundMark x1="21014" y1="17222" x2="23913" y2="16111"/>
+                        <a14:foregroundMark x1="20652" y1="14167" x2="20652" y2="13889"/>
+                        <a14:foregroundMark x1="27536" y1="12500" x2="27536" y2="12500"/>
+                        <a14:foregroundMark x1="12681" y1="10000" x2="57246" y2="8333"/>
+                        <a14:foregroundMark x1="57246" y1="8333" x2="83696" y2="8889"/>
+                        <a14:foregroundMark x1="12681" y1="86944" x2="12681" y2="86944"/>
+                        <a14:foregroundMark x1="23188" y1="92500" x2="23188" y2="92500"/>
+                        <a14:foregroundMark x1="65942" y1="92500" x2="65942" y2="92500"/>
+                        <a14:foregroundMark x1="69203" y1="92500" x2="69203" y2="92500"/>
+                        <a14:foregroundMark x1="75362" y1="92500" x2="75362" y2="92500"/>
+                        <a14:foregroundMark x1="75362" y1="92500" x2="75362" y2="92500"/>
+                        <a14:foregroundMark x1="63043" y1="92500" x2="63043" y2="92500"/>
+                        <a14:foregroundMark x1="63043" y1="92222" x2="63043" y2="92222"/>
+                        <a14:foregroundMark x1="63043" y1="92222" x2="63043" y2="92222"/>
+                        <a14:foregroundMark x1="63406" y1="92222" x2="63768" y2="91944"/>
+                        <a14:foregroundMark x1="63768" y1="91944" x2="63406" y2="92500"/>
+                        <a14:foregroundMark x1="65942" y1="92222" x2="65942" y2="92222"/>
+                        <a14:foregroundMark x1="77536" y1="92500" x2="77174" y2="92500"/>
+                        <a14:foregroundMark x1="77174" y1="92500" x2="77174" y2="92500"/>
+                        <a14:foregroundMark x1="77174" y1="92500" x2="77174" y2="92500"/>
+                        <a14:backgroundMark x1="725" y1="20000" x2="725" y2="20000"/>
+                        <a14:backgroundMark x1="2899" y1="20000" x2="3986" y2="20278"/>
+                        <a14:backgroundMark x1="75362" y1="93333" x2="75362" y2="93333"/>
+                        <a14:backgroundMark x1="75725" y1="93056" x2="75725" y2="93056"/>
+                        <a14:backgroundMark x1="75000" y1="93056" x2="75000" y2="93056"/>
+                        <a14:backgroundMark x1="75000" y1="93056" x2="75000" y2="93056"/>
+                        <a14:backgroundMark x1="69928" y1="93056" x2="69928" y2="93056"/>
+                        <a14:backgroundMark x1="26812" y1="93056" x2="26812" y2="93056"/>
+                      </a14:backgroundRemoval>
+                    </a14:imgEffect>
+                  </a14:imgLayer>
+                </a14:imgProps>
+              </a:ext>
+            </a:extLst>
+          </a:blip>
+          <a:stretch>
+            <a:fillRect/>
+          </a:stretch>
+        </p:blipFill>
+        <p:spPr>
+          <a:xfrm>
+            <a:off x="490679" y="299509"/>
+            <a:ext cx="4798553" cy="6258983"/>
+          </a:xfrm>
+          <a:prstGeom prst="rect">
+            <a:avLst/>
+          </a:prstGeom>
+        </p:spPr>
+      </p:pic>
       <p:sp>
         <p:nvSpPr>
           <p:cNvPr id="3" name="Content Placeholder 2">
@@ -19555,23 +22171,153 @@
         </p:nvSpPr>
         <p:spPr>
           <a:xfrm>
-            <a:off x="838200" y="1929384"/>
-            <a:ext cx="10515600" cy="4251960"/>
+            <a:off x="6392583" y="2645922"/>
+            <a:ext cx="4434721" cy="3710427"/>
           </a:xfrm>
         </p:spPr>
         <p:txBody>
-          <a:bodyPr>
+          <a:bodyPr anchor="t">
             <a:normAutofit/>
           </a:bodyPr>
           <a:lstStyle/>
           <a:p>
             <a:r>
-              <a:rPr lang="en-US" sz="2200" dirty="0"/>
-              <a:t>Gannon and Ethan</a:t>
+              <a:rPr lang="en-US" sz="2000" dirty="0">
+                <a:solidFill>
+                  <a:schemeClr val="tx1">
+                    <a:alpha val="80000"/>
+                  </a:schemeClr>
+                </a:solidFill>
+              </a:rPr>
+              <a:t>ESP32-S3-WROOM-1 Module</a:t>
+            </a:r>
+          </a:p>
+          <a:p>
+            <a:pPr lvl="1"/>
+            <a:r>
+              <a:rPr lang="en-US" sz="2000" dirty="0">
+                <a:solidFill>
+                  <a:schemeClr val="tx1">
+                    <a:alpha val="80000"/>
+                  </a:schemeClr>
+                </a:solidFill>
+              </a:rPr>
+              <a:t>Contains ESP32-S3 dual core SOC </a:t>
+            </a:r>
+          </a:p>
+          <a:p>
+            <a:pPr lvl="1"/>
+            <a:r>
+              <a:rPr lang="en-US" sz="2000" dirty="0">
+                <a:solidFill>
+                  <a:schemeClr val="tx1">
+                    <a:alpha val="80000"/>
+                  </a:schemeClr>
+                </a:solidFill>
+              </a:rPr>
+              <a:t>Build in Antenna with Impedance matching</a:t>
+            </a:r>
+          </a:p>
+          <a:p>
+            <a:r>
+              <a:rPr lang="en-US" sz="2000" dirty="0">
+                <a:solidFill>
+                  <a:schemeClr val="tx1">
+                    <a:alpha val="80000"/>
+                  </a:schemeClr>
+                </a:solidFill>
+              </a:rPr>
+              <a:t>Makes dropping MCU onto board easier</a:t>
+            </a:r>
+          </a:p>
+          <a:p>
+            <a:r>
+              <a:rPr lang="en-US" sz="2000" dirty="0">
+                <a:solidFill>
+                  <a:schemeClr val="tx1">
+                    <a:alpha val="80000"/>
+                  </a:schemeClr>
+                </a:solidFill>
+              </a:rPr>
+              <a:t>Plethora of free and open SDK’s</a:t>
+            </a:r>
+          </a:p>
+          <a:p>
+            <a:r>
+              <a:rPr lang="en-US" sz="2000" dirty="0">
+                <a:solidFill>
+                  <a:schemeClr val="tx1">
+                    <a:alpha val="80000"/>
+                  </a:schemeClr>
+                </a:solidFill>
+              </a:rPr>
+              <a:t>Need for external flash to store flight data</a:t>
             </a:r>
           </a:p>
         </p:txBody>
       </p:sp>
+      <p:cxnSp>
+        <p:nvCxnSpPr>
+          <p:cNvPr id="32" name="Straight Connector 31">
+            <a:extLst>
+              <a:ext uri="{FF2B5EF4-FFF2-40B4-BE49-F238E27FC236}">
+                <a16:creationId xmlns:a16="http://schemas.microsoft.com/office/drawing/2014/main" id="{C49DA8F6-BCC1-4447-B54C-57856834B94B}"/>
+              </a:ext>
+              <a:ext uri="{C183D7F6-B498-43B3-948B-1728B52AA6E4}">
+                <adec:decorative xmlns:adec="http://schemas.microsoft.com/office/drawing/2017/decorative" val="1"/>
+              </a:ext>
+            </a:extLst>
+          </p:cNvPr>
+          <p:cNvCxnSpPr>
+            <a:cxnSpLocks noGrp="1" noRot="1" noChangeAspect="1" noMove="1" noResize="1" noEditPoints="1" noAdjustHandles="1" noChangeArrowheads="1" noChangeShapeType="1"/>
+          </p:cNvCxnSpPr>
+          <p:nvPr>
+            <p:extLst>
+              <p:ext uri="{386F3935-93C4-4BCD-93E2-E3B085C9AB24}">
+                <p16:designElem xmlns:p16="http://schemas.microsoft.com/office/powerpoint/2015/main" val="1"/>
+              </p:ext>
+            </p:extLst>
+          </p:nvPr>
+        </p:nvCxnSpPr>
+        <p:spPr>
+          <a:xfrm>
+            <a:off x="11586162" y="3610394"/>
+            <a:ext cx="0" cy="3238728"/>
+          </a:xfrm>
+          <a:prstGeom prst="line">
+            <a:avLst/>
+          </a:prstGeom>
+          <a:ln w="25400" cap="sq">
+            <a:gradFill flip="none" rotWithShape="1">
+              <a:gsLst>
+                <a:gs pos="0">
+                  <a:schemeClr val="accent1"/>
+                </a:gs>
+                <a:gs pos="100000">
+                  <a:schemeClr val="accent2"/>
+                </a:gs>
+              </a:gsLst>
+              <a:lin ang="16200000" scaled="1"/>
+              <a:tileRect/>
+            </a:gradFill>
+            <a:bevel/>
+          </a:ln>
+        </p:spPr>
+        <p:style>
+          <a:lnRef idx="1">
+            <a:schemeClr val="accent1"/>
+          </a:lnRef>
+          <a:fillRef idx="0">
+            <a:schemeClr val="accent1"/>
+          </a:fillRef>
+          <a:effectRef idx="0">
+            <a:schemeClr val="accent1"/>
+          </a:effectRef>
+          <a:fontRef idx="minor">
+            <a:schemeClr val="tx1"/>
+          </a:fontRef>
+        </p:style>
+      </p:cxnSp>
     </p:spTree>
     <p:extLst>
       <p:ext uri="{BB962C8B-B14F-4D97-AF65-F5344CB8AC3E}">
@@ -20863,10 +23609,10 @@
       </p:grpSpPr>
       <p:sp useBgFill="1">
         <p:nvSpPr>
-          <p:cNvPr id="22" name="Rectangle 21">
+          <p:cNvPr id="30" name="Rectangle 29">
             <a:extLst>
               <a:ext uri="{FF2B5EF4-FFF2-40B4-BE49-F238E27FC236}">
-                <a16:creationId xmlns:a16="http://schemas.microsoft.com/office/drawing/2014/main" id="{2B97F24A-32CE-4C1C-A50D-3016B394DCFB}"/>
+                <a16:creationId xmlns:a16="http://schemas.microsoft.com/office/drawing/2014/main" id="{2659FDB4-FCBE-4A89-B46D-43D4FA54464D}"/>
               </a:ext>
               <a:ext uri="{C183D7F6-B498-43B3-948B-1728B52AA6E4}">
                 <adec:decorative xmlns:adec="http://schemas.microsoft.com/office/drawing/2017/decorative" val="1"/>
@@ -20886,7 +23632,7 @@
         </p:nvSpPr>
         <p:spPr>
           <a:xfrm>
-            <a:off x="0" y="0"/>
+            <a:off x="0" y="8313"/>
             <a:ext cx="12192000" cy="6858000"/>
           </a:xfrm>
           <a:prstGeom prst="rect">
@@ -20917,7 +23663,11 @@
           <a:lstStyle/>
           <a:p>
             <a:pPr algn="ctr"/>
-            <a:endParaRPr lang="en-US"/>
+            <a:endParaRPr lang="en-US">
+              <a:solidFill>
+                <a:schemeClr val="bg1"/>
+              </a:solidFill>
+            </a:endParaRPr>
           </a:p>
         </p:txBody>
       </p:sp>
@@ -20939,38 +23689,39 @@
         </p:nvSpPr>
         <p:spPr>
           <a:xfrm>
-            <a:off x="630936" y="639520"/>
-            <a:ext cx="3429000" cy="1719072"/>
+            <a:off x="479394" y="1070800"/>
+            <a:ext cx="3939688" cy="5583126"/>
           </a:xfrm>
         </p:spPr>
         <p:txBody>
-          <a:bodyPr anchor="b">
+          <a:bodyPr>
             <a:normAutofit/>
           </a:bodyPr>
           <a:lstStyle/>
           <a:p>
+            <a:pPr algn="r"/>
             <a:r>
-              <a:rPr lang="en-US" sz="5000" dirty="0"/>
+              <a:rPr lang="en-US" sz="7400"/>
               <a:t>Approach – PCB Design</a:t>
             </a:r>
           </a:p>
         </p:txBody>
       </p:sp>
-      <p:sp>
-        <p:nvSpPr>
-          <p:cNvPr id="24" name="sketch line">
+      <p:cxnSp>
+        <p:nvCxnSpPr>
+          <p:cNvPr id="32" name="Straight Connector 31">
             <a:extLst>
               <a:ext uri="{FF2B5EF4-FFF2-40B4-BE49-F238E27FC236}">
-                <a16:creationId xmlns:a16="http://schemas.microsoft.com/office/drawing/2014/main" id="{CD8B4F24-440B-49E9-B85D-733523DC064B}"/>
+                <a16:creationId xmlns:a16="http://schemas.microsoft.com/office/drawing/2014/main" id="{C8F51B3F-8331-4E4A-AE96-D47B1006EEAD}"/>
               </a:ext>
               <a:ext uri="{C183D7F6-B498-43B3-948B-1728B52AA6E4}">
                 <adec:decorative xmlns:adec="http://schemas.microsoft.com/office/drawing/2017/decorative" val="1"/>
               </a:ext>
             </a:extLst>
           </p:cNvPr>
-          <p:cNvSpPr>
-            <a:spLocks noGrp="1" noRot="1" noChangeAspect="1" noMove="1" noResize="1" noEditPoints="1" noAdjustHandles="1" noChangeArrowheads="1" noChangeShapeType="1" noTextEdit="1"/>
-          </p:cNvSpPr>
+          <p:cNvCxnSpPr>
+            <a:cxnSpLocks noGrp="1" noRot="1" noChangeAspect="1" noMove="1" noResize="1" noEditPoints="1" noAdjustHandles="1" noChangeArrowheads="1" noChangeShapeType="1"/>
+          </p:cNvCxnSpPr>
           <p:nvPr>
             <p:extLst>
               <p:ext uri="{386F3935-93C4-4BCD-93E2-E3B085C9AB24}">
@@ -20978,366 +23729,77 @@
               </p:ext>
             </p:extLst>
           </p:nvPr>
-        </p:nvSpPr>
+        </p:nvCxnSpPr>
         <p:spPr>
           <a:xfrm>
-            <a:off x="643278" y="2573756"/>
-            <a:ext cx="3255095" cy="18288"/>
+            <a:off x="4728053" y="1132114"/>
+            <a:ext cx="0" cy="5717573"/>
           </a:xfrm>
-          <a:custGeom>
+          <a:prstGeom prst="line">
             <a:avLst/>
-            <a:gdLst>
-              <a:gd name="connsiteX0" fmla="*/ 0 w 3255095"/>
-              <a:gd name="connsiteY0" fmla="*/ 0 h 18288"/>
-              <a:gd name="connsiteX1" fmla="*/ 618468 w 3255095"/>
-              <a:gd name="connsiteY1" fmla="*/ 0 h 18288"/>
-              <a:gd name="connsiteX2" fmla="*/ 1269487 w 3255095"/>
-              <a:gd name="connsiteY2" fmla="*/ 0 h 18288"/>
-              <a:gd name="connsiteX3" fmla="*/ 1953057 w 3255095"/>
-              <a:gd name="connsiteY3" fmla="*/ 0 h 18288"/>
-              <a:gd name="connsiteX4" fmla="*/ 2636627 w 3255095"/>
-              <a:gd name="connsiteY4" fmla="*/ 0 h 18288"/>
-              <a:gd name="connsiteX5" fmla="*/ 3255095 w 3255095"/>
-              <a:gd name="connsiteY5" fmla="*/ 0 h 18288"/>
-              <a:gd name="connsiteX6" fmla="*/ 3255095 w 3255095"/>
-              <a:gd name="connsiteY6" fmla="*/ 18288 h 18288"/>
-              <a:gd name="connsiteX7" fmla="*/ 2538974 w 3255095"/>
-              <a:gd name="connsiteY7" fmla="*/ 18288 h 18288"/>
-              <a:gd name="connsiteX8" fmla="*/ 1822853 w 3255095"/>
-              <a:gd name="connsiteY8" fmla="*/ 18288 h 18288"/>
-              <a:gd name="connsiteX9" fmla="*/ 1171834 w 3255095"/>
-              <a:gd name="connsiteY9" fmla="*/ 18288 h 18288"/>
-              <a:gd name="connsiteX10" fmla="*/ 0 w 3255095"/>
-              <a:gd name="connsiteY10" fmla="*/ 18288 h 18288"/>
-              <a:gd name="connsiteX11" fmla="*/ 0 w 3255095"/>
-              <a:gd name="connsiteY11" fmla="*/ 0 h 18288"/>
-            </a:gdLst>
-            <a:ahLst/>
-            <a:cxnLst>
-              <a:cxn ang="0">
-                <a:pos x="connsiteX0" y="connsiteY0"/>
-              </a:cxn>
-              <a:cxn ang="0">
-                <a:pos x="connsiteX1" y="connsiteY1"/>
-              </a:cxn>
-              <a:cxn ang="0">
-                <a:pos x="connsiteX2" y="connsiteY2"/>
-              </a:cxn>
-              <a:cxn ang="0">
-                <a:pos x="connsiteX3" y="connsiteY3"/>
-              </a:cxn>
-              <a:cxn ang="0">
-                <a:pos x="connsiteX4" y="connsiteY4"/>
-              </a:cxn>
-              <a:cxn ang="0">
-                <a:pos x="connsiteX5" y="connsiteY5"/>
-              </a:cxn>
-              <a:cxn ang="0">
-                <a:pos x="connsiteX6" y="connsiteY6"/>
-              </a:cxn>
-              <a:cxn ang="0">
-                <a:pos x="connsiteX7" y="connsiteY7"/>
-              </a:cxn>
-              <a:cxn ang="0">
-                <a:pos x="connsiteX8" y="connsiteY8"/>
-              </a:cxn>
-              <a:cxn ang="0">
-                <a:pos x="connsiteX9" y="connsiteY9"/>
-              </a:cxn>
-              <a:cxn ang="0">
-                <a:pos x="connsiteX10" y="connsiteY10"/>
-              </a:cxn>
-              <a:cxn ang="0">
-                <a:pos x="connsiteX11" y="connsiteY11"/>
-              </a:cxn>
-            </a:cxnLst>
-            <a:rect l="l" t="t" r="r" b="b"/>
-            <a:pathLst>
-              <a:path w="3255095" h="18288" fill="none" extrusionOk="0">
-                <a:moveTo>
-                  <a:pt x="0" y="0"/>
-                </a:moveTo>
-                <a:cubicBezTo>
-                  <a:pt x="240201" y="-22123"/>
-                  <a:pt x="462021" y="-19623"/>
-                  <a:pt x="618468" y="0"/>
-                </a:cubicBezTo>
-                <a:cubicBezTo>
-                  <a:pt x="774915" y="19623"/>
-                  <a:pt x="974734" y="2035"/>
-                  <a:pt x="1269487" y="0"/>
-                </a:cubicBezTo>
-                <a:cubicBezTo>
-                  <a:pt x="1564240" y="-2035"/>
-                  <a:pt x="1733579" y="10639"/>
-                  <a:pt x="1953057" y="0"/>
-                </a:cubicBezTo>
-                <a:cubicBezTo>
-                  <a:pt x="2172535" y="-10639"/>
-                  <a:pt x="2453962" y="14018"/>
-                  <a:pt x="2636627" y="0"/>
-                </a:cubicBezTo>
-                <a:cubicBezTo>
-                  <a:pt x="2819292" y="-14018"/>
-                  <a:pt x="3121375" y="5399"/>
-                  <a:pt x="3255095" y="0"/>
-                </a:cubicBezTo>
-                <a:cubicBezTo>
-                  <a:pt x="3254386" y="8157"/>
-                  <a:pt x="3254682" y="12125"/>
-                  <a:pt x="3255095" y="18288"/>
-                </a:cubicBezTo>
-                <a:cubicBezTo>
-                  <a:pt x="3088545" y="23203"/>
-                  <a:pt x="2687475" y="7419"/>
-                  <a:pt x="2538974" y="18288"/>
-                </a:cubicBezTo>
-                <a:cubicBezTo>
-                  <a:pt x="2390473" y="29157"/>
-                  <a:pt x="2137381" y="-8959"/>
-                  <a:pt x="1822853" y="18288"/>
-                </a:cubicBezTo>
-                <a:cubicBezTo>
-                  <a:pt x="1508325" y="45535"/>
-                  <a:pt x="1466437" y="20385"/>
-                  <a:pt x="1171834" y="18288"/>
-                </a:cubicBezTo>
-                <a:cubicBezTo>
-                  <a:pt x="877231" y="16191"/>
-                  <a:pt x="561097" y="37643"/>
-                  <a:pt x="0" y="18288"/>
-                </a:cubicBezTo>
-                <a:cubicBezTo>
-                  <a:pt x="-46" y="12483"/>
-                  <a:pt x="-203" y="6491"/>
-                  <a:pt x="0" y="0"/>
-                </a:cubicBezTo>
-                <a:close/>
-              </a:path>
-              <a:path w="3255095" h="18288" stroke="0" extrusionOk="0">
-                <a:moveTo>
-                  <a:pt x="0" y="0"/>
-                </a:moveTo>
-                <a:cubicBezTo>
-                  <a:pt x="291965" y="19429"/>
-                  <a:pt x="363155" y="8568"/>
-                  <a:pt x="618468" y="0"/>
-                </a:cubicBezTo>
-                <a:cubicBezTo>
-                  <a:pt x="873781" y="-8568"/>
-                  <a:pt x="904459" y="-19505"/>
-                  <a:pt x="1171834" y="0"/>
-                </a:cubicBezTo>
-                <a:cubicBezTo>
-                  <a:pt x="1439209" y="19505"/>
-                  <a:pt x="1744369" y="9790"/>
-                  <a:pt x="1887955" y="0"/>
-                </a:cubicBezTo>
-                <a:cubicBezTo>
-                  <a:pt x="2031541" y="-9790"/>
-                  <a:pt x="2346378" y="21240"/>
-                  <a:pt x="2506423" y="0"/>
-                </a:cubicBezTo>
-                <a:cubicBezTo>
-                  <a:pt x="2666468" y="-21240"/>
-                  <a:pt x="2990257" y="30414"/>
-                  <a:pt x="3255095" y="0"/>
-                </a:cubicBezTo>
-                <a:cubicBezTo>
-                  <a:pt x="3254831" y="4493"/>
-                  <a:pt x="3255479" y="9472"/>
-                  <a:pt x="3255095" y="18288"/>
-                </a:cubicBezTo>
-                <a:cubicBezTo>
-                  <a:pt x="3120743" y="16690"/>
-                  <a:pt x="2759628" y="42462"/>
-                  <a:pt x="2604076" y="18288"/>
-                </a:cubicBezTo>
-                <a:cubicBezTo>
-                  <a:pt x="2448524" y="-5886"/>
-                  <a:pt x="2184336" y="19599"/>
-                  <a:pt x="1887955" y="18288"/>
-                </a:cubicBezTo>
-                <a:cubicBezTo>
-                  <a:pt x="1591574" y="16977"/>
-                  <a:pt x="1548845" y="6870"/>
-                  <a:pt x="1334589" y="18288"/>
-                </a:cubicBezTo>
-                <a:cubicBezTo>
-                  <a:pt x="1120333" y="29706"/>
-                  <a:pt x="996014" y="9662"/>
-                  <a:pt x="683570" y="18288"/>
-                </a:cubicBezTo>
-                <a:cubicBezTo>
-                  <a:pt x="371126" y="26914"/>
-                  <a:pt x="198687" y="16167"/>
-                  <a:pt x="0" y="18288"/>
-                </a:cubicBezTo>
-                <a:cubicBezTo>
-                  <a:pt x="843" y="9577"/>
-                  <a:pt x="371" y="6900"/>
-                  <a:pt x="0" y="0"/>
-                </a:cubicBezTo>
-                <a:close/>
-              </a:path>
-            </a:pathLst>
-          </a:custGeom>
-          <a:solidFill>
-            <a:schemeClr val="accent2"/>
-          </a:solidFill>
-          <a:ln w="38100" cap="rnd">
-            <a:solidFill>
-              <a:schemeClr val="accent2"/>
-            </a:solidFill>
-            <a:round/>
-            <a:extLst>
-              <a:ext uri="{C807C97D-BFC1-408E-A445-0C87EB9F89A2}">
-                <ask:lineSketchStyleProps xmlns:ask="http://schemas.microsoft.com/office/drawing/2018/sketchyshapes" sd="1219033472">
-                  <a:prstGeom prst="rect">
-                    <a:avLst/>
-                  </a:prstGeom>
-                  <ask:type>
-                    <ask:lineSketchFreehand/>
-                  </ask:type>
-                </ask:lineSketchStyleProps>
-              </a:ext>
-            </a:extLst>
+          </a:prstGeom>
+          <a:ln w="25400" cap="sq">
+            <a:gradFill flip="none" rotWithShape="1">
+              <a:gsLst>
+                <a:gs pos="0">
+                  <a:schemeClr val="accent1"/>
+                </a:gs>
+                <a:gs pos="100000">
+                  <a:schemeClr val="accent2"/>
+                </a:gs>
+              </a:gsLst>
+              <a:lin ang="16200000" scaled="1"/>
+              <a:tileRect/>
+            </a:gradFill>
+            <a:bevel/>
           </a:ln>
         </p:spPr>
         <p:style>
-          <a:lnRef idx="2">
-            <a:schemeClr val="accent1">
-              <a:shade val="50000"/>
-            </a:schemeClr>
+          <a:lnRef idx="1">
+            <a:schemeClr val="accent1"/>
           </a:lnRef>
-          <a:fillRef idx="1">
+          <a:fillRef idx="0">
             <a:schemeClr val="accent1"/>
           </a:fillRef>
           <a:effectRef idx="0">
             <a:schemeClr val="accent1"/>
           </a:effectRef>
           <a:fontRef idx="minor">
-            <a:schemeClr val="lt1"/>
+            <a:schemeClr val="tx1"/>
           </a:fontRef>
         </p:style>
-        <p:txBody>
-          <a:bodyPr rtlCol="0" anchor="ctr"/>
-          <a:lstStyle/>
-          <a:p>
-            <a:pPr algn="ctr"/>
-            <a:endParaRPr lang="en-US"/>
-          </a:p>
-        </p:txBody>
-      </p:sp>
-      <p:sp>
-        <p:nvSpPr>
-          <p:cNvPr id="3" name="Content Placeholder 2">
+      </p:cxnSp>
+      <p:graphicFrame>
+        <p:nvGraphicFramePr>
+          <p:cNvPr id="26" name="Content Placeholder 2">
             <a:extLst>
               <a:ext uri="{FF2B5EF4-FFF2-40B4-BE49-F238E27FC236}">
-                <a16:creationId xmlns:a16="http://schemas.microsoft.com/office/drawing/2014/main" id="{0E530206-C89A-547A-CF4C-4CA30390F5BC}"/>
+                <a16:creationId xmlns:a16="http://schemas.microsoft.com/office/drawing/2014/main" id="{0005DF20-3C7C-68EF-C906-065885064866}"/>
               </a:ext>
             </a:extLst>
           </p:cNvPr>
-          <p:cNvSpPr>
-            <a:spLocks noGrp="1"/>
-          </p:cNvSpPr>
+          <p:cNvGraphicFramePr>
+            <a:graphicFrameLocks noGrp="1"/>
+          </p:cNvGraphicFramePr>
           <p:nvPr>
             <p:ph idx="1"/>
+            <p:extLst>
+              <p:ext uri="{D42A27DB-BD31-4B8C-83A1-F6EECF244321}">
+                <p14:modId xmlns:p14="http://schemas.microsoft.com/office/powerpoint/2010/main" val="2941829953"/>
+              </p:ext>
+            </p:extLst>
           </p:nvPr>
-        </p:nvSpPr>
-        <p:spPr>
-          <a:xfrm>
-            <a:off x="630936" y="2807208"/>
-            <a:ext cx="3429000" cy="3410712"/>
-          </a:xfrm>
-        </p:spPr>
-        <p:txBody>
-          <a:bodyPr anchor="t">
-            <a:normAutofit/>
-          </a:bodyPr>
-          <a:lstStyle/>
-          <a:p>
-            <a:r>
-              <a:rPr lang="en-US" sz="2200" dirty="0"/>
-              <a:t>Designed in KiCAD, board manufactured and populated by JLCPCB</a:t>
-            </a:r>
-          </a:p>
-          <a:p>
-            <a:r>
-              <a:rPr lang="en-US" sz="2200" dirty="0"/>
-              <a:t>Hierarchical design, each member design at least one schematic</a:t>
-            </a:r>
-          </a:p>
-          <a:p>
-            <a:r>
-              <a:rPr lang="en-US" sz="2200" dirty="0"/>
-              <a:t>Switched from initial IMU pick to another to avoid level shifting data line</a:t>
-            </a:r>
-          </a:p>
-        </p:txBody>
-      </p:sp>
-      <p:sp>
-        <p:nvSpPr>
-          <p:cNvPr id="4" name="Title 1">
-            <a:extLst>
-              <a:ext uri="{FF2B5EF4-FFF2-40B4-BE49-F238E27FC236}">
-                <a16:creationId xmlns:a16="http://schemas.microsoft.com/office/drawing/2014/main" id="{5627FFDC-0B3E-65D7-4216-A6867E2CD6E1}"/>
-              </a:ext>
-            </a:extLst>
-          </p:cNvPr>
-          <p:cNvSpPr txBox="1">
-            <a:spLocks/>
-          </p:cNvSpPr>
-          <p:nvPr/>
-        </p:nvSpPr>
-        <p:spPr>
-          <a:xfrm>
-            <a:off x="6227694" y="1732508"/>
-            <a:ext cx="3429000" cy="1719072"/>
-          </a:xfrm>
-          <a:prstGeom prst="rect">
-            <a:avLst/>
-          </a:prstGeom>
-        </p:spPr>
-        <p:txBody>
-          <a:bodyPr vert="horz" lIns="91440" tIns="45720" rIns="91440" bIns="45720" rtlCol="0" anchor="b">
-            <a:normAutofit fontScale="47500" lnSpcReduction="20000"/>
-          </a:bodyPr>
-          <a:lstStyle>
-            <a:lvl1pPr algn="l" defTabSz="914400" rtl="0" eaLnBrk="1" latinLnBrk="0" hangingPunct="1">
-              <a:lnSpc>
-                <a:spcPct val="90000"/>
-              </a:lnSpc>
-              <a:spcBef>
-                <a:spcPct val="0"/>
-              </a:spcBef>
-              <a:buNone/>
-              <a:defRPr sz="4400" kern="1200">
-                <a:solidFill>
-                  <a:schemeClr val="tx1"/>
-                </a:solidFill>
-                <a:latin typeface="+mj-lt"/>
-                <a:ea typeface="+mj-ea"/>
-                <a:cs typeface="+mj-cs"/>
-              </a:defRPr>
-            </a:lvl1pPr>
-          </a:lstStyle>
-          <a:p>
-            <a:r>
-              <a:rPr lang="en-US" sz="5000" dirty="0"/>
-              <a:t>Picture or just make text across screen. Moved the schematic to its own slide to make it readable-</a:t>
-            </a:r>
-            <a:r>
-              <a:rPr lang="en-US" sz="5000" dirty="0" err="1"/>
-              <a:t>ish</a:t>
-            </a:r>
-            <a:r>
-              <a:rPr lang="en-US" sz="5000" dirty="0"/>
-              <a:t> during presentation.</a:t>
-            </a:r>
-          </a:p>
-        </p:txBody>
-      </p:sp>
+        </p:nvGraphicFramePr>
+        <p:xfrm>
+          <a:off x="5108535" y="1070800"/>
+          <a:ext cx="6245265" cy="5589347"/>
+        </p:xfrm>
+        <a:graphic>
+          <a:graphicData uri="http://schemas.openxmlformats.org/drawingml/2006/diagram">
+            <dgm:relIds xmlns:dgm="http://schemas.openxmlformats.org/drawingml/2006/diagram" xmlns:r="http://schemas.openxmlformats.org/officeDocument/2006/relationships" r:dm="rId2" r:lo="rId3" r:qs="rId4" r:cs="rId5"/>
+          </a:graphicData>
+        </a:graphic>
+      </p:graphicFrame>
     </p:spTree>
     <p:extLst>
       <p:ext uri="{BB962C8B-B14F-4D97-AF65-F5344CB8AC3E}">
@@ -21990,15 +24452,6 @@
 </file>
 
 <file path=customXml/item2.xml><?xml version="1.0" encoding="utf-8"?>
-<?mso-contentType ?>
-<FormTemplates xmlns="http://schemas.microsoft.com/sharepoint/v3/contenttype/forms">
-  <Display>DocumentLibraryForm</Display>
-  <Edit>DocumentLibraryForm</Edit>
-  <New>DocumentLibraryForm</New>
-</FormTemplates>
-</file>
-
-<file path=customXml/item3.xml><?xml version="1.0" encoding="utf-8"?>
 <ct:contentTypeSchema xmlns:ct="http://schemas.microsoft.com/office/2006/metadata/contentType" xmlns:ma="http://schemas.microsoft.com/office/2006/metadata/properties/metaAttributes" ct:_="" ma:_="" ma:contentTypeName="Document" ma:contentTypeID="0x0101009ADC84C2C2689F418E5BAD3CA70F51C1" ma:contentTypeVersion="15" ma:contentTypeDescription="Create a new document." ma:contentTypeScope="" ma:versionID="dfa36a507fa972b0dae0ef5557aeb3eb">
   <xsd:schema xmlns:xsd="http://www.w3.org/2001/XMLSchema" xmlns:xs="http://www.w3.org/2001/XMLSchema" xmlns:p="http://schemas.microsoft.com/office/2006/metadata/properties" xmlns:ns3="218cae68-0ddc-43bb-9a29-52a0402d6cb9" xmlns:ns4="703aeb73-56ce-48f3-9277-f60cff690132" targetNamespace="http://schemas.microsoft.com/office/2006/metadata/properties" ma:root="true" ma:fieldsID="cb78c5b39430d5080de0e1d97c12cd45" ns3:_="" ns4:_="">
     <xsd:import namespace="218cae68-0ddc-43bb-9a29-52a0402d6cb9"/>
@@ -22231,6 +24684,15 @@
 </ct:contentTypeSchema>
 </file>
 
+<file path=customXml/item3.xml><?xml version="1.0" encoding="utf-8"?>
+<?mso-contentType ?>
+<FormTemplates xmlns="http://schemas.microsoft.com/sharepoint/v3/contenttype/forms">
+  <Display>DocumentLibraryForm</Display>
+  <Edit>DocumentLibraryForm</Edit>
+  <New>DocumentLibraryForm</New>
+</FormTemplates>
+</file>
+
 <file path=customXml/itemProps1.xml><?xml version="1.0" encoding="utf-8"?>
 <ds:datastoreItem xmlns:ds="http://schemas.openxmlformats.org/officeDocument/2006/customXml" ds:itemID="{B218F515-3D1B-44A5-8439-DF0479902099}">
   <ds:schemaRefs>
@@ -22249,14 +24711,6 @@
 </file>
 
 <file path=customXml/itemProps2.xml><?xml version="1.0" encoding="utf-8"?>
-<ds:datastoreItem xmlns:ds="http://schemas.openxmlformats.org/officeDocument/2006/customXml" ds:itemID="{3A69843A-82BD-41BC-9CFD-7A6BCBCF50D4}">
-  <ds:schemaRefs>
-    <ds:schemaRef ds:uri="http://schemas.microsoft.com/sharepoint/v3/contenttype/forms"/>
-  </ds:schemaRefs>
-</ds:datastoreItem>
-</file>
-
-<file path=customXml/itemProps3.xml><?xml version="1.0" encoding="utf-8"?>
 <ds:datastoreItem xmlns:ds="http://schemas.openxmlformats.org/officeDocument/2006/customXml" ds:itemID="{0058B037-F10E-47D7-816C-415ABC0EB55F}">
   <ds:schemaRefs>
     <ds:schemaRef ds:uri="http://schemas.microsoft.com/office/2006/metadata/contentType"/>
@@ -22273,4 +24727,12 @@
     <ds:schemaRef ds:uri="http://schemas.microsoft.com/internal/obd"/>
   </ds:schemaRefs>
 </ds:datastoreItem>
+</file>
+
+<file path=customXml/itemProps3.xml><?xml version="1.0" encoding="utf-8"?>
+<ds:datastoreItem xmlns:ds="http://schemas.openxmlformats.org/officeDocument/2006/customXml" ds:itemID="{3A69843A-82BD-41BC-9CFD-7A6BCBCF50D4}">
+  <ds:schemaRefs>
+    <ds:schemaRef ds:uri="http://schemas.microsoft.com/sharepoint/v3/contenttype/forms"/>
+  </ds:schemaRefs>
+</ds:datastoreItem>
 </file>
</xml_diff>

<commit_message>
did references hehe might delete later
</commit_message>
<xml_diff>
--- a/Documents/FInal Presentation/Final_Presentation.pptx
+++ b/Documents/FInal Presentation/Final_Presentation.pptx
@@ -3243,7 +3243,7 @@
           <a:p>
             <a:fld id="{C3DCE7EF-75D0-4DB7-BD1A-FC94188B4058}" type="datetimeFigureOut">
               <a:rPr lang="en-US" smtClean="0"/>
-              <a:t>01-Dec-24</a:t>
+              <a:t>03-Dec-24</a:t>
             </a:fld>
             <a:endParaRPr lang="en-US"/>
           </a:p>
@@ -5397,7 +5397,7 @@
           <a:p>
             <a:fld id="{A749A21A-B890-4700-B57E-1CFFBFCC9631}" type="datetimeFigureOut">
               <a:rPr lang="en-US" smtClean="0"/>
-              <a:t>01-Dec-24</a:t>
+              <a:t>03-Dec-24</a:t>
             </a:fld>
             <a:endParaRPr lang="en-US"/>
           </a:p>
@@ -5595,7 +5595,7 @@
           <a:p>
             <a:fld id="{A749A21A-B890-4700-B57E-1CFFBFCC9631}" type="datetimeFigureOut">
               <a:rPr lang="en-US" smtClean="0"/>
-              <a:t>01-Dec-24</a:t>
+              <a:t>03-Dec-24</a:t>
             </a:fld>
             <a:endParaRPr lang="en-US"/>
           </a:p>
@@ -5803,7 +5803,7 @@
           <a:p>
             <a:fld id="{A749A21A-B890-4700-B57E-1CFFBFCC9631}" type="datetimeFigureOut">
               <a:rPr lang="en-US" smtClean="0"/>
-              <a:t>01-Dec-24</a:t>
+              <a:t>03-Dec-24</a:t>
             </a:fld>
             <a:endParaRPr lang="en-US"/>
           </a:p>
@@ -6001,7 +6001,7 @@
           <a:p>
             <a:fld id="{A749A21A-B890-4700-B57E-1CFFBFCC9631}" type="datetimeFigureOut">
               <a:rPr lang="en-US" smtClean="0"/>
-              <a:t>01-Dec-24</a:t>
+              <a:t>03-Dec-24</a:t>
             </a:fld>
             <a:endParaRPr lang="en-US"/>
           </a:p>
@@ -6276,7 +6276,7 @@
           <a:p>
             <a:fld id="{A749A21A-B890-4700-B57E-1CFFBFCC9631}" type="datetimeFigureOut">
               <a:rPr lang="en-US" smtClean="0"/>
-              <a:t>01-Dec-24</a:t>
+              <a:t>03-Dec-24</a:t>
             </a:fld>
             <a:endParaRPr lang="en-US"/>
           </a:p>
@@ -6541,7 +6541,7 @@
           <a:p>
             <a:fld id="{A749A21A-B890-4700-B57E-1CFFBFCC9631}" type="datetimeFigureOut">
               <a:rPr lang="en-US" smtClean="0"/>
-              <a:t>01-Dec-24</a:t>
+              <a:t>03-Dec-24</a:t>
             </a:fld>
             <a:endParaRPr lang="en-US"/>
           </a:p>
@@ -6953,7 +6953,7 @@
           <a:p>
             <a:fld id="{A749A21A-B890-4700-B57E-1CFFBFCC9631}" type="datetimeFigureOut">
               <a:rPr lang="en-US" smtClean="0"/>
-              <a:t>01-Dec-24</a:t>
+              <a:t>03-Dec-24</a:t>
             </a:fld>
             <a:endParaRPr lang="en-US"/>
           </a:p>
@@ -7094,7 +7094,7 @@
           <a:p>
             <a:fld id="{A749A21A-B890-4700-B57E-1CFFBFCC9631}" type="datetimeFigureOut">
               <a:rPr lang="en-US" smtClean="0"/>
-              <a:t>01-Dec-24</a:t>
+              <a:t>03-Dec-24</a:t>
             </a:fld>
             <a:endParaRPr lang="en-US"/>
           </a:p>
@@ -7207,7 +7207,7 @@
           <a:p>
             <a:fld id="{A749A21A-B890-4700-B57E-1CFFBFCC9631}" type="datetimeFigureOut">
               <a:rPr lang="en-US" smtClean="0"/>
-              <a:t>01-Dec-24</a:t>
+              <a:t>03-Dec-24</a:t>
             </a:fld>
             <a:endParaRPr lang="en-US"/>
           </a:p>
@@ -7518,7 +7518,7 @@
           <a:p>
             <a:fld id="{A749A21A-B890-4700-B57E-1CFFBFCC9631}" type="datetimeFigureOut">
               <a:rPr lang="en-US" smtClean="0"/>
-              <a:t>01-Dec-24</a:t>
+              <a:t>03-Dec-24</a:t>
             </a:fld>
             <a:endParaRPr lang="en-US"/>
           </a:p>
@@ -7806,7 +7806,7 @@
           <a:p>
             <a:fld id="{A749A21A-B890-4700-B57E-1CFFBFCC9631}" type="datetimeFigureOut">
               <a:rPr lang="en-US" smtClean="0"/>
-              <a:t>01-Dec-24</a:t>
+              <a:t>03-Dec-24</a:t>
             </a:fld>
             <a:endParaRPr lang="en-US"/>
           </a:p>
@@ -8047,7 +8047,7 @@
           <a:p>
             <a:fld id="{A749A21A-B890-4700-B57E-1CFFBFCC9631}" type="datetimeFigureOut">
               <a:rPr lang="en-US" smtClean="0"/>
-              <a:t>01-Dec-24</a:t>
+              <a:t>03-Dec-24</a:t>
             </a:fld>
             <a:endParaRPr lang="en-US"/>
           </a:p>
@@ -19231,27 +19231,134 @@
           </a:bodyPr>
           <a:lstStyle/>
           <a:p>
-            <a:pPr lvl="1"/>
-            <a:r>
-              <a:rPr lang="en-US" sz="1800" dirty="0"/>
-              <a:t>Nathan will do this near the end c:</a:t>
-            </a:r>
-          </a:p>
-          <a:p>
-            <a:pPr lvl="1"/>
-            <a:r>
-              <a:rPr lang="en-US" sz="1800" dirty="0"/>
-              <a:t>This will be mostly referencing data sheets, guides, stuff like that</a:t>
-            </a:r>
-          </a:p>
-          <a:p>
-            <a:pPr marL="457200" lvl="1" indent="0">
+            <a:pPr marL="0" marR="0" indent="0">
+              <a:lnSpc>
+                <a:spcPct val="107000"/>
+              </a:lnSpc>
+              <a:spcAft>
+                <a:spcPts val="800"/>
+              </a:spcAft>
               <a:buNone/>
             </a:pPr>
             <a:r>
-              <a:rPr lang="en-US" sz="1800" dirty="0"/>
-              <a:t>Standards:</a:t>
+              <a:rPr lang="en-US" sz="1800" kern="0" dirty="0">
+                <a:effectLst/>
+                <a:latin typeface="Calibri" panose="020F0502020204030204" pitchFamily="34" charset="0"/>
+                <a:ea typeface="Calibri" panose="020F0502020204030204" pitchFamily="34" charset="0"/>
+                <a:cs typeface="Calibri" panose="020F0502020204030204" pitchFamily="34" charset="0"/>
+              </a:rPr>
+              <a:t>	“I2C-bus specification and user manual,” vol. 2021, 2021.</a:t>
             </a:r>
+            <a:endParaRPr lang="en-US" sz="1800" kern="100" dirty="0">
+              <a:effectLst/>
+              <a:latin typeface="Calibri" panose="020F0502020204030204" pitchFamily="34" charset="0"/>
+              <a:ea typeface="Calibri" panose="020F0502020204030204" pitchFamily="34" charset="0"/>
+              <a:cs typeface="Times New Roman" panose="02020603050405020304" pitchFamily="18" charset="0"/>
+            </a:endParaRPr>
+          </a:p>
+          <a:p>
+            <a:pPr marL="0" marR="0" indent="0">
+              <a:lnSpc>
+                <a:spcPct val="107000"/>
+              </a:lnSpc>
+              <a:spcAft>
+                <a:spcPts val="800"/>
+              </a:spcAft>
+              <a:buNone/>
+            </a:pPr>
+            <a:r>
+              <a:rPr lang="en-US" sz="1800" kern="0" dirty="0">
+                <a:effectLst/>
+                <a:latin typeface="Calibri" panose="020F0502020204030204" pitchFamily="34" charset="0"/>
+                <a:ea typeface="Calibri" panose="020F0502020204030204" pitchFamily="34" charset="0"/>
+                <a:cs typeface="Calibri" panose="020F0502020204030204" pitchFamily="34" charset="0"/>
+              </a:rPr>
+              <a:t>	“The Standard : Standard C++.” Accessed: Nov. 24, 2024. [Online]. Available: https://isocpp.org/std/the-standard</a:t>
+            </a:r>
+            <a:endParaRPr lang="en-US" sz="1800" kern="100" dirty="0">
+              <a:effectLst/>
+              <a:latin typeface="Calibri" panose="020F0502020204030204" pitchFamily="34" charset="0"/>
+              <a:ea typeface="Calibri" panose="020F0502020204030204" pitchFamily="34" charset="0"/>
+              <a:cs typeface="Times New Roman" panose="02020603050405020304" pitchFamily="18" charset="0"/>
+            </a:endParaRPr>
+          </a:p>
+          <a:p>
+            <a:pPr marL="0" marR="0" indent="0">
+              <a:lnSpc>
+                <a:spcPct val="107000"/>
+              </a:lnSpc>
+              <a:spcAft>
+                <a:spcPts val="800"/>
+              </a:spcAft>
+              <a:buNone/>
+            </a:pPr>
+            <a:r>
+              <a:rPr lang="en-US" sz="1800" kern="0" dirty="0">
+                <a:effectLst/>
+                <a:latin typeface="Calibri" panose="020F0502020204030204" pitchFamily="34" charset="0"/>
+                <a:ea typeface="Calibri" panose="020F0502020204030204" pitchFamily="34" charset="0"/>
+                <a:cs typeface="Calibri" panose="020F0502020204030204" pitchFamily="34" charset="0"/>
+              </a:rPr>
+              <a:t>	“IEEE Standards Association,” IEEE Standards Association. Accessed: Dec. 03, 2024. [Online]. Available: https://standards.ieee.org/ieee/802.11n/3952/</a:t>
+            </a:r>
+            <a:endParaRPr lang="en-US" sz="1800" kern="100" dirty="0">
+              <a:effectLst/>
+              <a:latin typeface="Calibri" panose="020F0502020204030204" pitchFamily="34" charset="0"/>
+              <a:ea typeface="Calibri" panose="020F0502020204030204" pitchFamily="34" charset="0"/>
+              <a:cs typeface="Times New Roman" panose="02020603050405020304" pitchFamily="18" charset="0"/>
+            </a:endParaRPr>
+          </a:p>
+          <a:p>
+            <a:pPr marL="0" marR="0" indent="0">
+              <a:lnSpc>
+                <a:spcPct val="107000"/>
+              </a:lnSpc>
+              <a:spcAft>
+                <a:spcPts val="800"/>
+              </a:spcAft>
+              <a:buNone/>
+            </a:pPr>
+            <a:r>
+              <a:rPr lang="en-US" sz="1800" kern="0" dirty="0">
+                <a:effectLst/>
+                <a:latin typeface="Calibri" panose="020F0502020204030204" pitchFamily="34" charset="0"/>
+                <a:ea typeface="Calibri" panose="020F0502020204030204" pitchFamily="34" charset="0"/>
+                <a:cs typeface="Calibri" panose="020F0502020204030204" pitchFamily="34" charset="0"/>
+              </a:rPr>
+              <a:t>	“ESP32-S3-WROOM-1  ESP32-S3-WROOM-1U  Datasheet Version 1.4.” Accessed: Dec. 03, 2024. [Online]. Available: https://www.espressif.com/sites/default/files/documentation/esp32-s3-wroom-1_wroom-1u_datasheet_en.pdf</a:t>
+            </a:r>
+            <a:endParaRPr lang="en-US" sz="1800" kern="100" dirty="0">
+              <a:effectLst/>
+              <a:latin typeface="Calibri" panose="020F0502020204030204" pitchFamily="34" charset="0"/>
+              <a:ea typeface="Calibri" panose="020F0502020204030204" pitchFamily="34" charset="0"/>
+              <a:cs typeface="Times New Roman" panose="02020603050405020304" pitchFamily="18" charset="0"/>
+            </a:endParaRPr>
+          </a:p>
+          <a:p>
+            <a:pPr marL="0" marR="0" indent="0">
+              <a:lnSpc>
+                <a:spcPct val="107000"/>
+              </a:lnSpc>
+              <a:spcAft>
+                <a:spcPts val="800"/>
+              </a:spcAft>
+              <a:buNone/>
+            </a:pPr>
+            <a:r>
+              <a:rPr lang="en-US" sz="1800" kern="0" dirty="0">
+                <a:effectLst/>
+                <a:latin typeface="Calibri" panose="020F0502020204030204" pitchFamily="34" charset="0"/>
+                <a:ea typeface="Calibri" panose="020F0502020204030204" pitchFamily="34" charset="0"/>
+                <a:cs typeface="Calibri" panose="020F0502020204030204" pitchFamily="34" charset="0"/>
+              </a:rPr>
+              <a:t>	“BNO08X Data Sheet.” 2023. Accessed: Dec. 03, 2024. [Online]. Available: https://www.mouser.com/datasheet/2/1480/BNO080_085_Datasheet-3196201.pdf</a:t>
+            </a:r>
+            <a:endParaRPr lang="en-US" sz="1800" kern="100" dirty="0">
+              <a:effectLst/>
+              <a:latin typeface="Calibri" panose="020F0502020204030204" pitchFamily="34" charset="0"/>
+              <a:ea typeface="Calibri" panose="020F0502020204030204" pitchFamily="34" charset="0"/>
+              <a:cs typeface="Times New Roman" panose="02020603050405020304" pitchFamily="18" charset="0"/>
+            </a:endParaRPr>
           </a:p>
           <a:p>
             <a:pPr marL="457200" lvl="1" indent="0">
@@ -24861,23 +24968,6 @@
 </file>
 
 <file path=customXml/item1.xml><?xml version="1.0" encoding="utf-8"?>
-<?mso-contentType ?>
-<FormTemplates xmlns="http://schemas.microsoft.com/sharepoint/v3/contenttype/forms">
-  <Display>DocumentLibraryForm</Display>
-  <Edit>DocumentLibraryForm</Edit>
-  <New>DocumentLibraryForm</New>
-</FormTemplates>
-</file>
-
-<file path=customXml/item2.xml><?xml version="1.0" encoding="utf-8"?>
-<p:properties xmlns:p="http://schemas.microsoft.com/office/2006/metadata/properties" xmlns:xsi="http://www.w3.org/2001/XMLSchema-instance" xmlns:pc="http://schemas.microsoft.com/office/infopath/2007/PartnerControls">
-  <documentManagement>
-    <_activity xmlns="218cae68-0ddc-43bb-9a29-52a0402d6cb9" xsi:nil="true"/>
-  </documentManagement>
-</p:properties>
-</file>
-
-<file path=customXml/item3.xml><?xml version="1.0" encoding="utf-8"?>
 <ct:contentTypeSchema xmlns:ct="http://schemas.microsoft.com/office/2006/metadata/contentType" xmlns:ma="http://schemas.microsoft.com/office/2006/metadata/properties/metaAttributes" ct:_="" ma:_="" ma:contentTypeName="Document" ma:contentTypeID="0x0101009ADC84C2C2689F418E5BAD3CA70F51C1" ma:contentTypeVersion="15" ma:contentTypeDescription="Create a new document." ma:contentTypeScope="" ma:versionID="dfa36a507fa972b0dae0ef5557aeb3eb">
   <xsd:schema xmlns:xsd="http://www.w3.org/2001/XMLSchema" xmlns:xs="http://www.w3.org/2001/XMLSchema" xmlns:p="http://schemas.microsoft.com/office/2006/metadata/properties" xmlns:ns3="218cae68-0ddc-43bb-9a29-52a0402d6cb9" xmlns:ns4="703aeb73-56ce-48f3-9277-f60cff690132" targetNamespace="http://schemas.microsoft.com/office/2006/metadata/properties" ma:root="true" ma:fieldsID="cb78c5b39430d5080de0e1d97c12cd45" ns3:_="" ns4:_="">
     <xsd:import namespace="218cae68-0ddc-43bb-9a29-52a0402d6cb9"/>
@@ -25110,10 +25200,38 @@
 </ct:contentTypeSchema>
 </file>
 
+<file path=customXml/item2.xml><?xml version="1.0" encoding="utf-8"?>
+<p:properties xmlns:p="http://schemas.microsoft.com/office/2006/metadata/properties" xmlns:xsi="http://www.w3.org/2001/XMLSchema-instance" xmlns:pc="http://schemas.microsoft.com/office/infopath/2007/PartnerControls">
+  <documentManagement>
+    <_activity xmlns="218cae68-0ddc-43bb-9a29-52a0402d6cb9" xsi:nil="true"/>
+  </documentManagement>
+</p:properties>
+</file>
+
+<file path=customXml/item3.xml><?xml version="1.0" encoding="utf-8"?>
+<?mso-contentType ?>
+<FormTemplates xmlns="http://schemas.microsoft.com/sharepoint/v3/contenttype/forms">
+  <Display>DocumentLibraryForm</Display>
+  <Edit>DocumentLibraryForm</Edit>
+  <New>DocumentLibraryForm</New>
+</FormTemplates>
+</file>
+
 <file path=customXml/itemProps1.xml><?xml version="1.0" encoding="utf-8"?>
-<ds:datastoreItem xmlns:ds="http://schemas.openxmlformats.org/officeDocument/2006/customXml" ds:itemID="{3A69843A-82BD-41BC-9CFD-7A6BCBCF50D4}">
+<ds:datastoreItem xmlns:ds="http://schemas.openxmlformats.org/officeDocument/2006/customXml" ds:itemID="{0058B037-F10E-47D7-816C-415ABC0EB55F}">
   <ds:schemaRefs>
-    <ds:schemaRef ds:uri="http://schemas.microsoft.com/sharepoint/v3/contenttype/forms"/>
+    <ds:schemaRef ds:uri="http://schemas.microsoft.com/office/2006/metadata/contentType"/>
+    <ds:schemaRef ds:uri="http://schemas.microsoft.com/office/2006/metadata/properties/metaAttributes"/>
+    <ds:schemaRef ds:uri="http://www.w3.org/2001/XMLSchema"/>
+    <ds:schemaRef ds:uri="http://schemas.microsoft.com/office/2006/metadata/properties"/>
+    <ds:schemaRef ds:uri="218cae68-0ddc-43bb-9a29-52a0402d6cb9"/>
+    <ds:schemaRef ds:uri="703aeb73-56ce-48f3-9277-f60cff690132"/>
+    <ds:schemaRef ds:uri="http://schemas.microsoft.com/office/2006/documentManagement/types"/>
+    <ds:schemaRef ds:uri="http://schemas.microsoft.com/office/infopath/2007/PartnerControls"/>
+    <ds:schemaRef ds:uri="http://schemas.openxmlformats.org/package/2006/metadata/core-properties"/>
+    <ds:schemaRef ds:uri="http://purl.org/dc/elements/1.1/"/>
+    <ds:schemaRef ds:uri="http://purl.org/dc/terms/"/>
+    <ds:schemaRef ds:uri="http://schemas.microsoft.com/internal/obd"/>
   </ds:schemaRefs>
 </ds:datastoreItem>
 </file>
@@ -25136,20 +25254,9 @@
 </file>
 
 <file path=customXml/itemProps3.xml><?xml version="1.0" encoding="utf-8"?>
-<ds:datastoreItem xmlns:ds="http://schemas.openxmlformats.org/officeDocument/2006/customXml" ds:itemID="{0058B037-F10E-47D7-816C-415ABC0EB55F}">
+<ds:datastoreItem xmlns:ds="http://schemas.openxmlformats.org/officeDocument/2006/customXml" ds:itemID="{3A69843A-82BD-41BC-9CFD-7A6BCBCF50D4}">
   <ds:schemaRefs>
-    <ds:schemaRef ds:uri="http://schemas.microsoft.com/office/2006/metadata/contentType"/>
-    <ds:schemaRef ds:uri="http://schemas.microsoft.com/office/2006/metadata/properties/metaAttributes"/>
-    <ds:schemaRef ds:uri="http://www.w3.org/2001/XMLSchema"/>
-    <ds:schemaRef ds:uri="http://schemas.microsoft.com/office/2006/metadata/properties"/>
-    <ds:schemaRef ds:uri="218cae68-0ddc-43bb-9a29-52a0402d6cb9"/>
-    <ds:schemaRef ds:uri="703aeb73-56ce-48f3-9277-f60cff690132"/>
-    <ds:schemaRef ds:uri="http://schemas.microsoft.com/office/2006/documentManagement/types"/>
-    <ds:schemaRef ds:uri="http://schemas.microsoft.com/office/infopath/2007/PartnerControls"/>
-    <ds:schemaRef ds:uri="http://schemas.openxmlformats.org/package/2006/metadata/core-properties"/>
-    <ds:schemaRef ds:uri="http://purl.org/dc/elements/1.1/"/>
-    <ds:schemaRef ds:uri="http://purl.org/dc/terms/"/>
-    <ds:schemaRef ds:uri="http://schemas.microsoft.com/internal/obd"/>
+    <ds:schemaRef ds:uri="http://schemas.microsoft.com/sharepoint/v3/contenttype/forms"/>
   </ds:schemaRefs>
 </ds:datastoreItem>
 </file>
</xml_diff>